<commit_message>
Merge Jeff's Spec Slide
</commit_message>
<xml_diff>
--- a/Presentations/DesignPres/DesignPres-75.pptx
+++ b/Presentations/DesignPres/DesignPres-75.pptx
@@ -16,7 +16,7 @@
     <p:sldId id="260" r:id="rId10"/>
     <p:sldId id="279" r:id="rId11"/>
     <p:sldId id="265" r:id="rId12"/>
-    <p:sldId id="274" r:id="rId13"/>
+    <p:sldId id="292" r:id="rId13"/>
     <p:sldId id="263" r:id="rId14"/>
     <p:sldId id="281" r:id="rId15"/>
     <p:sldId id="282" r:id="rId16"/>
@@ -6739,7 +6739,7 @@
             </a:r>
             <a:r>
               <a:rPr lang="en-US" dirty="0" smtClean="0"/>
-              <a:t>PM </a:t>
+              <a:t>PM, Nathaniel Tyler (ME) </a:t>
             </a:r>
             <a:endParaRPr lang="en-US" dirty="0"/>
           </a:p>
@@ -7890,11 +7890,7 @@
           <a:p>
             <a:r>
               <a:rPr lang="en-US" dirty="0" smtClean="0"/>
-              <a:t>Team 75 </a:t>
-            </a:r>
-            <a:r>
-              <a:rPr lang="en-US" dirty="0" smtClean="0"/>
-              <a:t>Organization</a:t>
+              <a:t>Team 75 Organization</a:t>
             </a:r>
             <a:endParaRPr lang="en-US" dirty="0"/>
           </a:p>
@@ -10062,16 +10058,12 @@
             <a:graphicFrameLocks/>
           </p:cNvGraphicFramePr>
           <p:nvPr>
-            <p:extLst>
-              <p:ext uri="{D42A27DB-BD31-4B8C-83A1-F6EECF244321}">
-                <p14:modId xmlns:p14="http://schemas.microsoft.com/office/powerpoint/2010/main" val="2704818691"/>
-              </p:ext>
-            </p:extLst>
+            <p:extLst/>
           </p:nvPr>
         </p:nvGraphicFramePr>
         <p:xfrm>
           <a:off x="1970468" y="2288539"/>
-          <a:ext cx="8991746" cy="3200400"/>
+          <a:ext cx="8991746" cy="3840480"/>
         </p:xfrm>
         <a:graphic>
           <a:graphicData uri="http://schemas.openxmlformats.org/drawingml/2006/table">
@@ -10123,6 +10115,41 @@
                     <a:p>
                       <a:r>
                         <a:rPr lang="en-US" dirty="0" smtClean="0"/>
+                        <a:t>Build Volume Size</a:t>
+                      </a:r>
+                      <a:endParaRPr lang="en-US" dirty="0"/>
+                    </a:p>
+                  </a:txBody>
+                  <a:tcPr anchor="ctr"/>
+                </a:tc>
+                <a:tc>
+                  <a:txBody>
+                    <a:bodyPr/>
+                    <a:lstStyle/>
+                    <a:p>
+                      <a:pPr algn="r"/>
+                      <a:r>
+                        <a:rPr lang="en-US" dirty="0" smtClean="0"/>
+                        <a:t>192</a:t>
+                      </a:r>
+                      <a:r>
+                        <a:rPr lang="en-US" baseline="0" dirty="0" smtClean="0"/>
+                        <a:t> mm x 216 mm x 216 mm</a:t>
+                      </a:r>
+                      <a:endParaRPr lang="en-US" dirty="0"/>
+                    </a:p>
+                  </a:txBody>
+                  <a:tcPr anchor="ctr"/>
+                </a:tc>
+              </a:tr>
+              <a:tr h="640080">
+                <a:tc>
+                  <a:txBody>
+                    <a:bodyPr/>
+                    <a:lstStyle/>
+                    <a:p>
+                      <a:r>
+                        <a:rPr lang="en-US" dirty="0" smtClean="0"/>
                         <a:t>X</a:t>
                       </a:r>
                       <a:r>
@@ -10158,7 +10185,11 @@
                     <a:p>
                       <a:r>
                         <a:rPr lang="en-US" dirty="0" smtClean="0"/>
-                        <a:t>Z Axis Resolution</a:t>
+                        <a:t>Minimum</a:t>
+                      </a:r>
+                      <a:r>
+                        <a:rPr lang="en-US" baseline="0" dirty="0" smtClean="0"/>
+                        <a:t> Layer Height</a:t>
                       </a:r>
                       <a:endParaRPr lang="en-US" dirty="0"/>
                     </a:p>
@@ -10188,8 +10219,12 @@
                         <a:defRPr/>
                       </a:pPr>
                       <a:r>
+                        <a:rPr lang="en-US" smtClean="0"/>
+                        <a:t>0.015 ± 0.002 </a:t>
+                      </a:r>
+                      <a:r>
                         <a:rPr lang="en-US" dirty="0" smtClean="0"/>
-                        <a:t>0.100 ± 0.005 mm</a:t>
+                        <a:t>mm</a:t>
                       </a:r>
                     </a:p>
                   </a:txBody>
@@ -10269,12 +10304,8 @@
                         <a:defRPr/>
                       </a:pPr>
                       <a:r>
-                        <a:rPr lang="en-US" smtClean="0"/>
-                        <a:t>± 0.050 </a:t>
-                      </a:r>
-                      <a:r>
                         <a:rPr lang="en-US" dirty="0" smtClean="0"/>
-                        <a:t>mm</a:t>
+                        <a:t>± 0.050 mm</a:t>
                       </a:r>
                     </a:p>
                     <a:p>
@@ -10292,7 +10323,7 @@
     </p:spTree>
     <p:extLst>
       <p:ext uri="{BB962C8B-B14F-4D97-AF65-F5344CB8AC3E}">
-        <p14:creationId xmlns:p14="http://schemas.microsoft.com/office/powerpoint/2010/main" val="245815682"/>
+        <p14:creationId xmlns:p14="http://schemas.microsoft.com/office/powerpoint/2010/main" val="2245365680"/>
       </p:ext>
     </p:extLst>
   </p:cSld>
@@ -10984,8 +11015,15 @@
 <file path=customXml/itemProps1.xml><?xml version="1.0" encoding="utf-8"?>
 <ds:datastoreItem xmlns:ds="http://schemas.openxmlformats.org/officeDocument/2006/customXml" ds:itemID="{7D5E529B-E2B8-4FF4-96DC-717B6A9731D6}">
   <ds:schemaRefs>
+    <ds:schemaRef ds:uri="http://schemas.openxmlformats.org/package/2006/metadata/core-properties"/>
+    <ds:schemaRef ds:uri="http://purl.org/dc/terms/"/>
+    <ds:schemaRef ds:uri="http://purl.org/dc/elements/1.1/"/>
     <ds:schemaRef ds:uri="http://schemas.microsoft.com/office/2006/metadata/properties"/>
+    <ds:schemaRef ds:uri="4c2e6f55-8abc-4b5b-a4f7-930d3885115f"/>
+    <ds:schemaRef ds:uri="http://purl.org/dc/dcmitype/"/>
+    <ds:schemaRef ds:uri="http://schemas.microsoft.com/office/2006/documentManagement/types"/>
     <ds:schemaRef ds:uri="http://schemas.microsoft.com/office/infopath/2007/PartnerControls"/>
+    <ds:schemaRef ds:uri="http://www.w3.org/XML/1998/namespace"/>
   </ds:schemaRefs>
 </ds:datastoreItem>
 </file>

</xml_diff>

<commit_message>
revert design pres on Exec Sum branch
</commit_message>
<xml_diff>
--- a/Presentations/DesignPres/DesignPres-75.pptx
+++ b/Presentations/DesignPres/DesignPres-75.pptx
@@ -16,7 +16,7 @@
     <p:sldId id="260" r:id="rId10"/>
     <p:sldId id="279" r:id="rId11"/>
     <p:sldId id="265" r:id="rId12"/>
-    <p:sldId id="292" r:id="rId13"/>
+    <p:sldId id="274" r:id="rId13"/>
     <p:sldId id="263" r:id="rId14"/>
     <p:sldId id="281" r:id="rId15"/>
     <p:sldId id="282" r:id="rId16"/>
@@ -6739,7 +6739,7 @@
             </a:r>
             <a:r>
               <a:rPr lang="en-US" dirty="0" smtClean="0"/>
-              <a:t>PM, Nathaniel Tyler (ME) </a:t>
+              <a:t>PM </a:t>
             </a:r>
             <a:endParaRPr lang="en-US" dirty="0"/>
           </a:p>
@@ -7890,7 +7890,11 @@
           <a:p>
             <a:r>
               <a:rPr lang="en-US" dirty="0" smtClean="0"/>
-              <a:t>Team 75 Organization</a:t>
+              <a:t>Team 75 </a:t>
+            </a:r>
+            <a:r>
+              <a:rPr lang="en-US" dirty="0" smtClean="0"/>
+              <a:t>Organization</a:t>
             </a:r>
             <a:endParaRPr lang="en-US" dirty="0"/>
           </a:p>
@@ -10058,12 +10062,16 @@
             <a:graphicFrameLocks/>
           </p:cNvGraphicFramePr>
           <p:nvPr>
-            <p:extLst/>
+            <p:extLst>
+              <p:ext uri="{D42A27DB-BD31-4B8C-83A1-F6EECF244321}">
+                <p14:modId xmlns:p14="http://schemas.microsoft.com/office/powerpoint/2010/main" val="2704818691"/>
+              </p:ext>
+            </p:extLst>
           </p:nvPr>
         </p:nvGraphicFramePr>
         <p:xfrm>
           <a:off x="1970468" y="2288539"/>
-          <a:ext cx="8991746" cy="3840480"/>
+          <a:ext cx="8991746" cy="3200400"/>
         </p:xfrm>
         <a:graphic>
           <a:graphicData uri="http://schemas.openxmlformats.org/drawingml/2006/table">
@@ -10115,41 +10123,6 @@
                     <a:p>
                       <a:r>
                         <a:rPr lang="en-US" dirty="0" smtClean="0"/>
-                        <a:t>Build Volume Size</a:t>
-                      </a:r>
-                      <a:endParaRPr lang="en-US" dirty="0"/>
-                    </a:p>
-                  </a:txBody>
-                  <a:tcPr anchor="ctr"/>
-                </a:tc>
-                <a:tc>
-                  <a:txBody>
-                    <a:bodyPr/>
-                    <a:lstStyle/>
-                    <a:p>
-                      <a:pPr algn="r"/>
-                      <a:r>
-                        <a:rPr lang="en-US" dirty="0" smtClean="0"/>
-                        <a:t>192</a:t>
-                      </a:r>
-                      <a:r>
-                        <a:rPr lang="en-US" baseline="0" dirty="0" smtClean="0"/>
-                        <a:t> mm x 216 mm x 216 mm</a:t>
-                      </a:r>
-                      <a:endParaRPr lang="en-US" dirty="0"/>
-                    </a:p>
-                  </a:txBody>
-                  <a:tcPr anchor="ctr"/>
-                </a:tc>
-              </a:tr>
-              <a:tr h="640080">
-                <a:tc>
-                  <a:txBody>
-                    <a:bodyPr/>
-                    <a:lstStyle/>
-                    <a:p>
-                      <a:r>
-                        <a:rPr lang="en-US" dirty="0" smtClean="0"/>
                         <a:t>X</a:t>
                       </a:r>
                       <a:r>
@@ -10185,11 +10158,7 @@
                     <a:p>
                       <a:r>
                         <a:rPr lang="en-US" dirty="0" smtClean="0"/>
-                        <a:t>Minimum</a:t>
-                      </a:r>
-                      <a:r>
-                        <a:rPr lang="en-US" baseline="0" dirty="0" smtClean="0"/>
-                        <a:t> Layer Height</a:t>
+                        <a:t>Z Axis Resolution</a:t>
                       </a:r>
                       <a:endParaRPr lang="en-US" dirty="0"/>
                     </a:p>
@@ -10219,12 +10188,8 @@
                         <a:defRPr/>
                       </a:pPr>
                       <a:r>
-                        <a:rPr lang="en-US" smtClean="0"/>
-                        <a:t>0.015 ± 0.002 </a:t>
-                      </a:r>
-                      <a:r>
                         <a:rPr lang="en-US" dirty="0" smtClean="0"/>
-                        <a:t>mm</a:t>
+                        <a:t>0.100 ± 0.005 mm</a:t>
                       </a:r>
                     </a:p>
                   </a:txBody>
@@ -10304,8 +10269,12 @@
                         <a:defRPr/>
                       </a:pPr>
                       <a:r>
+                        <a:rPr lang="en-US" smtClean="0"/>
+                        <a:t>± 0.050 </a:t>
+                      </a:r>
+                      <a:r>
                         <a:rPr lang="en-US" dirty="0" smtClean="0"/>
-                        <a:t>± 0.050 mm</a:t>
+                        <a:t>mm</a:t>
                       </a:r>
                     </a:p>
                     <a:p>
@@ -10323,7 +10292,7 @@
     </p:spTree>
     <p:extLst>
       <p:ext uri="{BB962C8B-B14F-4D97-AF65-F5344CB8AC3E}">
-        <p14:creationId xmlns:p14="http://schemas.microsoft.com/office/powerpoint/2010/main" val="2245365680"/>
+        <p14:creationId xmlns:p14="http://schemas.microsoft.com/office/powerpoint/2010/main" val="245815682"/>
       </p:ext>
     </p:extLst>
   </p:cSld>
@@ -11015,15 +10984,8 @@
 <file path=customXml/itemProps1.xml><?xml version="1.0" encoding="utf-8"?>
 <ds:datastoreItem xmlns:ds="http://schemas.openxmlformats.org/officeDocument/2006/customXml" ds:itemID="{7D5E529B-E2B8-4FF4-96DC-717B6A9731D6}">
   <ds:schemaRefs>
-    <ds:schemaRef ds:uri="http://schemas.openxmlformats.org/package/2006/metadata/core-properties"/>
-    <ds:schemaRef ds:uri="http://purl.org/dc/terms/"/>
-    <ds:schemaRef ds:uri="http://purl.org/dc/elements/1.1/"/>
     <ds:schemaRef ds:uri="http://schemas.microsoft.com/office/2006/metadata/properties"/>
-    <ds:schemaRef ds:uri="4c2e6f55-8abc-4b5b-a4f7-930d3885115f"/>
-    <ds:schemaRef ds:uri="http://purl.org/dc/dcmitype/"/>
-    <ds:schemaRef ds:uri="http://schemas.microsoft.com/office/2006/documentManagement/types"/>
     <ds:schemaRef ds:uri="http://schemas.microsoft.com/office/infopath/2007/PartnerControls"/>
-    <ds:schemaRef ds:uri="http://www.w3.org/XML/1998/namespace"/>
   </ds:schemaRefs>
 </ds:datastoreItem>
 </file>

</xml_diff>

<commit_message>
merge acks, chances slide, exec sum, market, spec
</commit_message>
<xml_diff>
--- a/Presentations/DesignPres/DesignPres-75.pptx
+++ b/Presentations/DesignPres/DesignPres-75.pptx
@@ -5,32 +5,31 @@
     <p:sldMasterId id="2147483678" r:id="rId4"/>
   </p:sldMasterIdLst>
   <p:notesMasterIdLst>
-    <p:notesMasterId r:id="rId28"/>
+    <p:notesMasterId r:id="rId27"/>
   </p:notesMasterIdLst>
   <p:sldIdLst>
     <p:sldId id="256" r:id="rId5"/>
     <p:sldId id="261" r:id="rId6"/>
     <p:sldId id="272" r:id="rId7"/>
-    <p:sldId id="273" r:id="rId8"/>
-    <p:sldId id="269" r:id="rId9"/>
-    <p:sldId id="260" r:id="rId10"/>
-    <p:sldId id="279" r:id="rId11"/>
-    <p:sldId id="265" r:id="rId12"/>
-    <p:sldId id="274" r:id="rId13"/>
-    <p:sldId id="263" r:id="rId14"/>
-    <p:sldId id="281" r:id="rId15"/>
-    <p:sldId id="282" r:id="rId16"/>
-    <p:sldId id="283" r:id="rId17"/>
-    <p:sldId id="284" r:id="rId18"/>
-    <p:sldId id="285" r:id="rId19"/>
-    <p:sldId id="286" r:id="rId20"/>
-    <p:sldId id="287" r:id="rId21"/>
-    <p:sldId id="288" r:id="rId22"/>
-    <p:sldId id="276" r:id="rId23"/>
-    <p:sldId id="289" r:id="rId24"/>
-    <p:sldId id="278" r:id="rId25"/>
-    <p:sldId id="291" r:id="rId26"/>
-    <p:sldId id="270" r:id="rId27"/>
+    <p:sldId id="294" r:id="rId8"/>
+    <p:sldId id="292" r:id="rId9"/>
+    <p:sldId id="279" r:id="rId10"/>
+    <p:sldId id="265" r:id="rId11"/>
+    <p:sldId id="263" r:id="rId12"/>
+    <p:sldId id="293" r:id="rId13"/>
+    <p:sldId id="281" r:id="rId14"/>
+    <p:sldId id="282" r:id="rId15"/>
+    <p:sldId id="283" r:id="rId16"/>
+    <p:sldId id="284" r:id="rId17"/>
+    <p:sldId id="285" r:id="rId18"/>
+    <p:sldId id="296" r:id="rId19"/>
+    <p:sldId id="287" r:id="rId20"/>
+    <p:sldId id="288" r:id="rId21"/>
+    <p:sldId id="276" r:id="rId22"/>
+    <p:sldId id="289" r:id="rId23"/>
+    <p:sldId id="278" r:id="rId24"/>
+    <p:sldId id="295" r:id="rId25"/>
+    <p:sldId id="270" r:id="rId26"/>
   </p:sldIdLst>
   <p:sldSz cx="12192000" cy="6858000"/>
   <p:notesSz cx="6858000" cy="9144000"/>
@@ -135,6 +134,1406 @@
     </p:ext>
   </p:extLst>
 </p:presentation>
+</file>
+
+<file path=ppt/charts/chart1.xml><?xml version="1.0" encoding="utf-8"?>
+<c:chartSpace xmlns:c="http://schemas.openxmlformats.org/drawingml/2006/chart" xmlns:a="http://schemas.openxmlformats.org/drawingml/2006/main" xmlns:r="http://schemas.openxmlformats.org/officeDocument/2006/relationships">
+  <c:date1904 val="0"/>
+  <c:lang val="en-US"/>
+  <c:roundedCorners val="0"/>
+  <mc:AlternateContent xmlns:mc="http://schemas.openxmlformats.org/markup-compatibility/2006">
+    <mc:Choice xmlns:c14="http://schemas.microsoft.com/office/drawing/2007/8/2/chart" Requires="c14">
+      <c14:style val="102"/>
+    </mc:Choice>
+    <mc:Fallback>
+      <c:style val="2"/>
+    </mc:Fallback>
+  </mc:AlternateContent>
+  <c:chart>
+    <c:title>
+      <c:tx>
+        <c:rich>
+          <a:bodyPr rot="0" spcFirstLastPara="1" vertOverflow="ellipsis" vert="horz" wrap="square" anchor="ctr" anchorCtr="1"/>
+          <a:lstStyle/>
+          <a:p>
+            <a:pPr>
+              <a:defRPr sz="1600" b="0" i="0" u="none" strike="noStrike" kern="1200" spc="0" baseline="0">
+                <a:solidFill>
+                  <a:schemeClr val="tx1">
+                    <a:lumMod val="65000"/>
+                    <a:lumOff val="35000"/>
+                  </a:schemeClr>
+                </a:solidFill>
+                <a:latin typeface="+mn-lt"/>
+                <a:ea typeface="+mn-ea"/>
+                <a:cs typeface="+mn-cs"/>
+              </a:defRPr>
+            </a:pPr>
+            <a:r>
+              <a:rPr lang="en-US" sz="1600"/>
+              <a:t>System</a:t>
+            </a:r>
+            <a:r>
+              <a:rPr lang="en-US" sz="1600" baseline="0"/>
+              <a:t> Cost with Respect to Area and Volume</a:t>
+            </a:r>
+            <a:endParaRPr lang="en-US" sz="1600"/>
+          </a:p>
+        </c:rich>
+      </c:tx>
+      <c:layout/>
+      <c:overlay val="0"/>
+      <c:spPr>
+        <a:noFill/>
+        <a:ln>
+          <a:noFill/>
+        </a:ln>
+        <a:effectLst/>
+      </c:spPr>
+      <c:txPr>
+        <a:bodyPr rot="0" spcFirstLastPara="1" vertOverflow="ellipsis" vert="horz" wrap="square" anchor="ctr" anchorCtr="1"/>
+        <a:lstStyle/>
+        <a:p>
+          <a:pPr>
+            <a:defRPr sz="1600" b="0" i="0" u="none" strike="noStrike" kern="1200" spc="0" baseline="0">
+              <a:solidFill>
+                <a:schemeClr val="tx1">
+                  <a:lumMod val="65000"/>
+                  <a:lumOff val="35000"/>
+                </a:schemeClr>
+              </a:solidFill>
+              <a:latin typeface="+mn-lt"/>
+              <a:ea typeface="+mn-ea"/>
+              <a:cs typeface="+mn-cs"/>
+            </a:defRPr>
+          </a:pPr>
+          <a:endParaRPr lang="en-US"/>
+        </a:p>
+      </c:txPr>
+    </c:title>
+    <c:autoTitleDeleted val="0"/>
+    <c:plotArea>
+      <c:layout/>
+      <c:bubbleChart>
+        <c:varyColors val="0"/>
+        <c:ser>
+          <c:idx val="0"/>
+          <c:order val="0"/>
+          <c:tx>
+            <c:strRef>
+              <c:f>Sheet1!$B$2</c:f>
+              <c:strCache>
+                <c:ptCount val="1"/>
+                <c:pt idx="0">
+                  <c:v>FDM</c:v>
+                </c:pt>
+              </c:strCache>
+            </c:strRef>
+          </c:tx>
+          <c:spPr>
+            <a:noFill/>
+            <a:ln w="38100">
+              <a:solidFill>
+                <a:srgbClr val="00B0F0"/>
+              </a:solidFill>
+            </a:ln>
+            <a:effectLst/>
+          </c:spPr>
+          <c:invertIfNegative val="0"/>
+          <c:xVal>
+            <c:numRef>
+              <c:f>Sheet1!$G$2:$G$21</c:f>
+              <c:numCache>
+                <c:formatCode>#,##0</c:formatCode>
+                <c:ptCount val="20"/>
+                <c:pt idx="0">
+                  <c:v>10411.967999999997</c:v>
+                </c:pt>
+                <c:pt idx="1">
+                  <c:v>9812.8835999999974</c:v>
+                </c:pt>
+                <c:pt idx="2">
+                  <c:v>70553.949389535599</c:v>
+                </c:pt>
+                <c:pt idx="3">
+                  <c:v>19354.799999999996</c:v>
+                </c:pt>
+                <c:pt idx="4">
+                  <c:v>51103.123599999999</c:v>
+                </c:pt>
+                <c:pt idx="5">
+                  <c:v>19516.089999999997</c:v>
+                </c:pt>
+                <c:pt idx="6">
+                  <c:v>19516.089999999997</c:v>
+                </c:pt>
+                <c:pt idx="7">
+                  <c:v>14251.5844</c:v>
+                </c:pt>
+                <c:pt idx="8">
+                  <c:v>51612.799999999996</c:v>
+                </c:pt>
+                <c:pt idx="9">
+                  <c:v>38588.632499999992</c:v>
+                </c:pt>
+                <c:pt idx="10">
+                  <c:v>92903.039999999979</c:v>
+                </c:pt>
+                <c:pt idx="11">
+                  <c:v>81522.417599999986</c:v>
+                </c:pt>
+                <c:pt idx="12">
+                  <c:v>41290.239999999998</c:v>
+                </c:pt>
+                <c:pt idx="13">
+                  <c:v>41290.239999999998</c:v>
+                </c:pt>
+                <c:pt idx="14">
+                  <c:v>45774.101999999992</c:v>
+                </c:pt>
+                <c:pt idx="15">
+                  <c:v>41290.239999999998</c:v>
+                </c:pt>
+                <c:pt idx="16">
+                  <c:v>61249.877499999995</c:v>
+                </c:pt>
+                <c:pt idx="17">
+                  <c:v>61161.167999999991</c:v>
+                </c:pt>
+                <c:pt idx="18">
+                  <c:v>60967.619999999995</c:v>
+                </c:pt>
+                <c:pt idx="19">
+                  <c:v>59516.009999999987</c:v>
+                </c:pt>
+              </c:numCache>
+            </c:numRef>
+          </c:xVal>
+          <c:yVal>
+            <c:numRef>
+              <c:f>Sheet1!$C$2:$C$21</c:f>
+              <c:numCache>
+                <c:formatCode>_("$"* #,##0.00_);_("$"* \(#,##0.00\);_("$"* "-"??_);_(@_)</c:formatCode>
+                <c:ptCount val="20"/>
+                <c:pt idx="0">
+                  <c:v>2199</c:v>
+                </c:pt>
+                <c:pt idx="1">
+                  <c:v>399</c:v>
+                </c:pt>
+                <c:pt idx="2">
+                  <c:v>900</c:v>
+                </c:pt>
+                <c:pt idx="3">
+                  <c:v>799</c:v>
+                </c:pt>
+                <c:pt idx="4">
+                  <c:v>2565</c:v>
+                </c:pt>
+                <c:pt idx="5">
+                  <c:v>1649</c:v>
+                </c:pt>
+                <c:pt idx="6">
+                  <c:v>1299</c:v>
+                </c:pt>
+                <c:pt idx="7">
+                  <c:v>899</c:v>
+                </c:pt>
+                <c:pt idx="8">
+                  <c:v>1949</c:v>
+                </c:pt>
+                <c:pt idx="9">
+                  <c:v>1549</c:v>
+                </c:pt>
+                <c:pt idx="10">
+                  <c:v>2295</c:v>
+                </c:pt>
+                <c:pt idx="11">
+                  <c:v>2195</c:v>
+                </c:pt>
+                <c:pt idx="12">
+                  <c:v>1299</c:v>
+                </c:pt>
+                <c:pt idx="13">
+                  <c:v>999</c:v>
+                </c:pt>
+                <c:pt idx="14">
+                  <c:v>1688</c:v>
+                </c:pt>
+                <c:pt idx="15">
+                  <c:v>799</c:v>
+                </c:pt>
+                <c:pt idx="16">
+                  <c:v>2195</c:v>
+                </c:pt>
+                <c:pt idx="17">
+                  <c:v>2399</c:v>
+                </c:pt>
+                <c:pt idx="18">
+                  <c:v>2500</c:v>
+                </c:pt>
+                <c:pt idx="19">
+                  <c:v>1399</c:v>
+                </c:pt>
+              </c:numCache>
+            </c:numRef>
+          </c:yVal>
+          <c:bubbleSize>
+            <c:numRef>
+              <c:f>Sheet1!$H$2:$H$21</c:f>
+              <c:numCache>
+                <c:formatCode>#,##0</c:formatCode>
+                <c:ptCount val="20"/>
+                <c:pt idx="0">
+                  <c:v>1613230.3219199993</c:v>
+                </c:pt>
+                <c:pt idx="1">
+                  <c:v>972064.24941599963</c:v>
+                </c:pt>
+                <c:pt idx="2">
+                  <c:v>12544492.201459428</c:v>
+                </c:pt>
+                <c:pt idx="3">
+                  <c:v>2458059.5999999996</c:v>
+                </c:pt>
+                <c:pt idx="4">
+                  <c:v>10513956.649463998</c:v>
+                </c:pt>
+                <c:pt idx="5">
+                  <c:v>2602470.6014999994</c:v>
+                </c:pt>
+                <c:pt idx="6">
+                  <c:v>2726397.7729999991</c:v>
+                </c:pt>
+                <c:pt idx="7">
+                  <c:v>1701354.145672</c:v>
+                </c:pt>
+                <c:pt idx="8">
+                  <c:v>12126427.359999998</c:v>
+                </c:pt>
+                <c:pt idx="9">
+                  <c:v>8821361.3894999977</c:v>
+                </c:pt>
+                <c:pt idx="10">
+                  <c:v>28316846.591999989</c:v>
+                </c:pt>
+                <c:pt idx="11">
+                  <c:v>20292560.188991997</c:v>
+                </c:pt>
+                <c:pt idx="12">
+                  <c:v>8390176.7679999992</c:v>
+                </c:pt>
+                <c:pt idx="13">
+                  <c:v>8390176.7679999992</c:v>
+                </c:pt>
+                <c:pt idx="14">
+                  <c:v>8022369.1165199978</c:v>
+                </c:pt>
+                <c:pt idx="15">
+                  <c:v>8390176.7679999992</c:v>
+                </c:pt>
+                <c:pt idx="16">
+                  <c:v>13612785.274374999</c:v>
+                </c:pt>
+                <c:pt idx="17">
+                  <c:v>10874455.670399997</c:v>
+                </c:pt>
+                <c:pt idx="18">
+                  <c:v>12078904.874399997</c:v>
+                </c:pt>
+                <c:pt idx="19">
+                  <c:v>11715726.568499997</c:v>
+                </c:pt>
+              </c:numCache>
+            </c:numRef>
+          </c:bubbleSize>
+          <c:bubble3D val="0"/>
+        </c:ser>
+        <c:ser>
+          <c:idx val="1"/>
+          <c:order val="1"/>
+          <c:tx>
+            <c:strRef>
+              <c:f>Sheet1!$B$22</c:f>
+              <c:strCache>
+                <c:ptCount val="1"/>
+                <c:pt idx="0">
+                  <c:v>PAM</c:v>
+                </c:pt>
+              </c:strCache>
+            </c:strRef>
+          </c:tx>
+          <c:spPr>
+            <a:noFill/>
+            <a:ln w="38100">
+              <a:solidFill>
+                <a:srgbClr val="00B050"/>
+              </a:solidFill>
+            </a:ln>
+            <a:effectLst/>
+          </c:spPr>
+          <c:invertIfNegative val="0"/>
+          <c:xVal>
+            <c:numRef>
+              <c:f>(Sheet1!$G$22,Sheet1!$G$24,Sheet1!$G$25,Sheet1!$G$26,Sheet1!$G$27)</c:f>
+              <c:numCache>
+                <c:formatCode>#,##0</c:formatCode>
+                <c:ptCount val="5"/>
+                <c:pt idx="0">
+                  <c:v>7741.9199999999983</c:v>
+                </c:pt>
+                <c:pt idx="1">
+                  <c:v>15490.291600000002</c:v>
+                </c:pt>
+                <c:pt idx="2">
+                  <c:v>1161</c:v>
+                </c:pt>
+                <c:pt idx="3">
+                  <c:v>2880</c:v>
+                </c:pt>
+                <c:pt idx="4">
+                  <c:v>4554</c:v>
+                </c:pt>
+              </c:numCache>
+            </c:numRef>
+          </c:xVal>
+          <c:yVal>
+            <c:numRef>
+              <c:f>(Sheet1!$C$22,Sheet1!$C$24,Sheet1!$C$25,Sheet1!$C$26,Sheet1!$C$27)</c:f>
+              <c:numCache>
+                <c:formatCode>_("$"* #,##0.00_);_("$"* \(#,##0.00\);_("$"* "-"??_);_(@_)</c:formatCode>
+                <c:ptCount val="5"/>
+                <c:pt idx="0">
+                  <c:v>3375</c:v>
+                </c:pt>
+                <c:pt idx="1">
+                  <c:v>3299</c:v>
+                </c:pt>
+                <c:pt idx="2">
+                  <c:v>1999</c:v>
+                </c:pt>
+                <c:pt idx="3">
+                  <c:v>499</c:v>
+                </c:pt>
+                <c:pt idx="4">
+                  <c:v>399</c:v>
+                </c:pt>
+              </c:numCache>
+            </c:numRef>
+          </c:yVal>
+          <c:bubbleSize>
+            <c:numRef>
+              <c:f>(Sheet1!$H$22,Sheet1!$H$24,Sheet1!$H$25,Sheet1!$H$26,Sheet1!$H$27)</c:f>
+              <c:numCache>
+                <c:formatCode>#,##0</c:formatCode>
+                <c:ptCount val="5"/>
+                <c:pt idx="0">
+                  <c:v>1597738.7399999995</c:v>
+                </c:pt>
+                <c:pt idx="1">
+                  <c:v>2557447.1431600004</c:v>
+                </c:pt>
+                <c:pt idx="2">
+                  <c:v>208980</c:v>
+                </c:pt>
+                <c:pt idx="3">
+                  <c:v>288000</c:v>
+                </c:pt>
+                <c:pt idx="4">
+                  <c:v>694160</c:v>
+                </c:pt>
+              </c:numCache>
+            </c:numRef>
+          </c:bubbleSize>
+          <c:bubble3D val="0"/>
+        </c:ser>
+        <c:ser>
+          <c:idx val="2"/>
+          <c:order val="2"/>
+          <c:tx>
+            <c:strRef>
+              <c:f>Sheet1!$A$23</c:f>
+              <c:strCache>
+                <c:ptCount val="1"/>
+                <c:pt idx="0">
+                  <c:v>Project PAM</c:v>
+                </c:pt>
+              </c:strCache>
+            </c:strRef>
+          </c:tx>
+          <c:spPr>
+            <a:solidFill>
+              <a:schemeClr val="accent4"/>
+            </a:solidFill>
+            <a:ln w="25400">
+              <a:solidFill>
+                <a:schemeClr val="accent4"/>
+              </a:solidFill>
+            </a:ln>
+            <a:effectLst/>
+          </c:spPr>
+          <c:invertIfNegative val="0"/>
+          <c:xVal>
+            <c:numRef>
+              <c:f>Sheet1!$G$23</c:f>
+              <c:numCache>
+                <c:formatCode>#,##0</c:formatCode>
+                <c:ptCount val="1"/>
+                <c:pt idx="0">
+                  <c:v>41472</c:v>
+                </c:pt>
+              </c:numCache>
+            </c:numRef>
+          </c:xVal>
+          <c:yVal>
+            <c:numRef>
+              <c:f>Sheet1!$C$23</c:f>
+              <c:numCache>
+                <c:formatCode>_("$"* #,##0.00_);_("$"* \(#,##0.00\);_("$"* "-"??_);_(@_)</c:formatCode>
+                <c:ptCount val="1"/>
+                <c:pt idx="0">
+                  <c:v>1000</c:v>
+                </c:pt>
+              </c:numCache>
+            </c:numRef>
+          </c:yVal>
+          <c:bubbleSize>
+            <c:numRef>
+              <c:f>Sheet1!$H$23</c:f>
+              <c:numCache>
+                <c:formatCode>#,##0</c:formatCode>
+                <c:ptCount val="1"/>
+                <c:pt idx="0">
+                  <c:v>8957952</c:v>
+                </c:pt>
+              </c:numCache>
+            </c:numRef>
+          </c:bubbleSize>
+          <c:bubble3D val="0"/>
+        </c:ser>
+        <c:dLbls>
+          <c:showLegendKey val="0"/>
+          <c:showVal val="0"/>
+          <c:showCatName val="0"/>
+          <c:showSerName val="0"/>
+          <c:showPercent val="0"/>
+          <c:showBubbleSize val="0"/>
+        </c:dLbls>
+        <c:bubbleScale val="100"/>
+        <c:showNegBubbles val="0"/>
+        <c:axId val="296971152"/>
+        <c:axId val="296962992"/>
+      </c:bubbleChart>
+      <c:valAx>
+        <c:axId val="296971152"/>
+        <c:scaling>
+          <c:orientation val="minMax"/>
+          <c:min val="0"/>
+        </c:scaling>
+        <c:delete val="0"/>
+        <c:axPos val="b"/>
+        <c:majorGridlines>
+          <c:spPr>
+            <a:ln w="9525" cap="flat" cmpd="sng" algn="ctr">
+              <a:solidFill>
+                <a:schemeClr val="tx1">
+                  <a:lumMod val="15000"/>
+                  <a:lumOff val="85000"/>
+                </a:schemeClr>
+              </a:solidFill>
+              <a:round/>
+            </a:ln>
+            <a:effectLst/>
+          </c:spPr>
+        </c:majorGridlines>
+        <c:title>
+          <c:tx>
+            <c:rich>
+              <a:bodyPr rot="0" spcFirstLastPara="1" vertOverflow="ellipsis" vert="horz" wrap="square" anchor="ctr" anchorCtr="1"/>
+              <a:lstStyle/>
+              <a:p>
+                <a:pPr>
+                  <a:defRPr sz="1600" b="0" i="0" u="none" strike="noStrike" kern="1200" baseline="0">
+                    <a:solidFill>
+                      <a:schemeClr val="tx1">
+                        <a:lumMod val="65000"/>
+                        <a:lumOff val="35000"/>
+                      </a:schemeClr>
+                    </a:solidFill>
+                    <a:latin typeface="+mn-lt"/>
+                    <a:ea typeface="+mn-ea"/>
+                    <a:cs typeface="+mn-cs"/>
+                  </a:defRPr>
+                </a:pPr>
+                <a:r>
+                  <a:rPr lang="en-US" sz="1600"/>
+                  <a:t>Build Area (mm</a:t>
+                </a:r>
+                <a:r>
+                  <a:rPr lang="en-US" sz="1600" baseline="30000"/>
+                  <a:t>2</a:t>
+                </a:r>
+                <a:r>
+                  <a:rPr lang="en-US" sz="1600"/>
+                  <a:t>)</a:t>
+                </a:r>
+              </a:p>
+            </c:rich>
+          </c:tx>
+          <c:layout/>
+          <c:overlay val="0"/>
+          <c:spPr>
+            <a:noFill/>
+            <a:ln>
+              <a:noFill/>
+            </a:ln>
+            <a:effectLst/>
+          </c:spPr>
+          <c:txPr>
+            <a:bodyPr rot="0" spcFirstLastPara="1" vertOverflow="ellipsis" vert="horz" wrap="square" anchor="ctr" anchorCtr="1"/>
+            <a:lstStyle/>
+            <a:p>
+              <a:pPr>
+                <a:defRPr sz="1600" b="0" i="0" u="none" strike="noStrike" kern="1200" baseline="0">
+                  <a:solidFill>
+                    <a:schemeClr val="tx1">
+                      <a:lumMod val="65000"/>
+                      <a:lumOff val="35000"/>
+                    </a:schemeClr>
+                  </a:solidFill>
+                  <a:latin typeface="+mn-lt"/>
+                  <a:ea typeface="+mn-ea"/>
+                  <a:cs typeface="+mn-cs"/>
+                </a:defRPr>
+              </a:pPr>
+              <a:endParaRPr lang="en-US"/>
+            </a:p>
+          </c:txPr>
+        </c:title>
+        <c:numFmt formatCode="#,##0" sourceLinked="1"/>
+        <c:majorTickMark val="none"/>
+        <c:minorTickMark val="none"/>
+        <c:tickLblPos val="nextTo"/>
+        <c:spPr>
+          <a:noFill/>
+          <a:ln>
+            <a:solidFill>
+              <a:schemeClr val="bg1">
+                <a:lumMod val="65000"/>
+              </a:schemeClr>
+            </a:solidFill>
+          </a:ln>
+          <a:effectLst/>
+        </c:spPr>
+        <c:txPr>
+          <a:bodyPr rot="-60000000" spcFirstLastPara="1" vertOverflow="ellipsis" vert="horz" wrap="square" anchor="ctr" anchorCtr="1"/>
+          <a:lstStyle/>
+          <a:p>
+            <a:pPr>
+              <a:defRPr sz="1600" b="0" i="0" u="none" strike="noStrike" kern="1200" baseline="0">
+                <a:solidFill>
+                  <a:schemeClr val="tx1">
+                    <a:lumMod val="65000"/>
+                    <a:lumOff val="35000"/>
+                  </a:schemeClr>
+                </a:solidFill>
+                <a:latin typeface="+mn-lt"/>
+                <a:ea typeface="+mn-ea"/>
+                <a:cs typeface="+mn-cs"/>
+              </a:defRPr>
+            </a:pPr>
+            <a:endParaRPr lang="en-US"/>
+          </a:p>
+        </c:txPr>
+        <c:crossAx val="296962992"/>
+        <c:crosses val="autoZero"/>
+        <c:crossBetween val="midCat"/>
+      </c:valAx>
+      <c:valAx>
+        <c:axId val="296962992"/>
+        <c:scaling>
+          <c:orientation val="minMax"/>
+          <c:max val="3500"/>
+          <c:min val="0"/>
+        </c:scaling>
+        <c:delete val="0"/>
+        <c:axPos val="l"/>
+        <c:majorGridlines>
+          <c:spPr>
+            <a:ln w="9525" cap="flat" cmpd="sng" algn="ctr">
+              <a:solidFill>
+                <a:schemeClr val="tx1">
+                  <a:lumMod val="15000"/>
+                  <a:lumOff val="85000"/>
+                </a:schemeClr>
+              </a:solidFill>
+              <a:round/>
+            </a:ln>
+            <a:effectLst/>
+          </c:spPr>
+        </c:majorGridlines>
+        <c:title>
+          <c:tx>
+            <c:rich>
+              <a:bodyPr rot="-5400000" spcFirstLastPara="1" vertOverflow="ellipsis" vert="horz" wrap="square" anchor="ctr" anchorCtr="1"/>
+              <a:lstStyle/>
+              <a:p>
+                <a:pPr>
+                  <a:defRPr sz="1600" b="0" i="0" u="none" strike="noStrike" kern="1200" baseline="0">
+                    <a:solidFill>
+                      <a:schemeClr val="tx1">
+                        <a:lumMod val="65000"/>
+                        <a:lumOff val="35000"/>
+                      </a:schemeClr>
+                    </a:solidFill>
+                    <a:latin typeface="+mn-lt"/>
+                    <a:ea typeface="+mn-ea"/>
+                    <a:cs typeface="+mn-cs"/>
+                  </a:defRPr>
+                </a:pPr>
+                <a:r>
+                  <a:rPr lang="en-US" sz="1600"/>
+                  <a:t>Cost</a:t>
+                </a:r>
+                <a:r>
+                  <a:rPr lang="en-US" sz="1600" baseline="0"/>
+                  <a:t> ($)</a:t>
+                </a:r>
+                <a:endParaRPr lang="en-US" sz="1600"/>
+              </a:p>
+            </c:rich>
+          </c:tx>
+          <c:layout/>
+          <c:overlay val="0"/>
+          <c:spPr>
+            <a:noFill/>
+            <a:ln>
+              <a:noFill/>
+            </a:ln>
+            <a:effectLst/>
+          </c:spPr>
+          <c:txPr>
+            <a:bodyPr rot="-5400000" spcFirstLastPara="1" vertOverflow="ellipsis" vert="horz" wrap="square" anchor="ctr" anchorCtr="1"/>
+            <a:lstStyle/>
+            <a:p>
+              <a:pPr>
+                <a:defRPr sz="1600" b="0" i="0" u="none" strike="noStrike" kern="1200" baseline="0">
+                  <a:solidFill>
+                    <a:schemeClr val="tx1">
+                      <a:lumMod val="65000"/>
+                      <a:lumOff val="35000"/>
+                    </a:schemeClr>
+                  </a:solidFill>
+                  <a:latin typeface="+mn-lt"/>
+                  <a:ea typeface="+mn-ea"/>
+                  <a:cs typeface="+mn-cs"/>
+                </a:defRPr>
+              </a:pPr>
+              <a:endParaRPr lang="en-US"/>
+            </a:p>
+          </c:txPr>
+        </c:title>
+        <c:numFmt formatCode="_(&quot;$&quot;* #,##0_);_(&quot;$&quot;* \(#,##0\);_(&quot;$&quot;* &quot;-&quot;_);_(@_)" sourceLinked="0"/>
+        <c:majorTickMark val="none"/>
+        <c:minorTickMark val="none"/>
+        <c:tickLblPos val="nextTo"/>
+        <c:spPr>
+          <a:noFill/>
+          <a:ln>
+            <a:solidFill>
+              <a:schemeClr val="bg1">
+                <a:lumMod val="65000"/>
+              </a:schemeClr>
+            </a:solidFill>
+          </a:ln>
+          <a:effectLst/>
+        </c:spPr>
+        <c:txPr>
+          <a:bodyPr rot="-60000000" spcFirstLastPara="1" vertOverflow="ellipsis" vert="horz" wrap="square" anchor="ctr" anchorCtr="1"/>
+          <a:lstStyle/>
+          <a:p>
+            <a:pPr>
+              <a:defRPr sz="1600" b="0" i="0" u="none" strike="noStrike" kern="1200" baseline="0">
+                <a:solidFill>
+                  <a:schemeClr val="tx1">
+                    <a:lumMod val="65000"/>
+                    <a:lumOff val="35000"/>
+                  </a:schemeClr>
+                </a:solidFill>
+                <a:latin typeface="+mn-lt"/>
+                <a:ea typeface="+mn-ea"/>
+                <a:cs typeface="+mn-cs"/>
+              </a:defRPr>
+            </a:pPr>
+            <a:endParaRPr lang="en-US"/>
+          </a:p>
+        </c:txPr>
+        <c:crossAx val="296971152"/>
+        <c:crosses val="autoZero"/>
+        <c:crossBetween val="midCat"/>
+      </c:valAx>
+      <c:spPr>
+        <a:noFill/>
+        <a:ln>
+          <a:noFill/>
+        </a:ln>
+        <a:effectLst/>
+      </c:spPr>
+    </c:plotArea>
+    <c:legend>
+      <c:legendPos val="r"/>
+      <c:layout>
+        <c:manualLayout>
+          <c:xMode val="edge"/>
+          <c:yMode val="edge"/>
+          <c:x val="0.80156184031668198"/>
+          <c:y val="0.10487643491113739"/>
+          <c:w val="0.19843815968331802"/>
+          <c:h val="0.15200665107292949"/>
+        </c:manualLayout>
+      </c:layout>
+      <c:overlay val="1"/>
+      <c:spPr>
+        <a:noFill/>
+        <a:ln>
+          <a:noFill/>
+        </a:ln>
+        <a:effectLst/>
+      </c:spPr>
+      <c:txPr>
+        <a:bodyPr rot="0" spcFirstLastPara="1" vertOverflow="ellipsis" vert="horz" wrap="square" anchor="ctr" anchorCtr="1"/>
+        <a:lstStyle/>
+        <a:p>
+          <a:pPr>
+            <a:defRPr sz="1600" b="0" i="0" u="none" strike="noStrike" kern="1200" baseline="0">
+              <a:solidFill>
+                <a:schemeClr val="tx1">
+                  <a:lumMod val="65000"/>
+                  <a:lumOff val="35000"/>
+                </a:schemeClr>
+              </a:solidFill>
+              <a:latin typeface="+mn-lt"/>
+              <a:ea typeface="+mn-ea"/>
+              <a:cs typeface="+mn-cs"/>
+            </a:defRPr>
+          </a:pPr>
+          <a:endParaRPr lang="en-US"/>
+        </a:p>
+      </c:txPr>
+    </c:legend>
+    <c:plotVisOnly val="1"/>
+    <c:dispBlanksAs val="gap"/>
+    <c:showDLblsOverMax val="0"/>
+  </c:chart>
+  <c:spPr>
+    <a:noFill/>
+    <a:ln>
+      <a:noFill/>
+    </a:ln>
+    <a:effectLst/>
+  </c:spPr>
+  <c:txPr>
+    <a:bodyPr/>
+    <a:lstStyle/>
+    <a:p>
+      <a:pPr>
+        <a:defRPr/>
+      </a:pPr>
+      <a:endParaRPr lang="en-US"/>
+    </a:p>
+  </c:txPr>
+  <c:externalData r:id="rId3">
+    <c:autoUpdate val="0"/>
+  </c:externalData>
+  <c:userShapes r:id="rId4"/>
+</c:chartSpace>
+</file>
+
+<file path=ppt/charts/colors1.xml><?xml version="1.0" encoding="utf-8"?>
+<cs:colorStyle xmlns:cs="http://schemas.microsoft.com/office/drawing/2012/chartStyle" xmlns:a="http://schemas.openxmlformats.org/drawingml/2006/main" meth="cycle" id="10">
+  <a:schemeClr val="accent1"/>
+  <a:schemeClr val="accent2"/>
+  <a:schemeClr val="accent3"/>
+  <a:schemeClr val="accent4"/>
+  <a:schemeClr val="accent5"/>
+  <a:schemeClr val="accent6"/>
+  <cs:variation/>
+  <cs:variation>
+    <a:lumMod val="60000"/>
+  </cs:variation>
+  <cs:variation>
+    <a:lumMod val="80000"/>
+    <a:lumOff val="20000"/>
+  </cs:variation>
+  <cs:variation>
+    <a:lumMod val="80000"/>
+  </cs:variation>
+  <cs:variation>
+    <a:lumMod val="60000"/>
+    <a:lumOff val="40000"/>
+  </cs:variation>
+  <cs:variation>
+    <a:lumMod val="50000"/>
+  </cs:variation>
+  <cs:variation>
+    <a:lumMod val="70000"/>
+    <a:lumOff val="30000"/>
+  </cs:variation>
+  <cs:variation>
+    <a:lumMod val="70000"/>
+  </cs:variation>
+  <cs:variation>
+    <a:lumMod val="50000"/>
+    <a:lumOff val="50000"/>
+  </cs:variation>
+</cs:colorStyle>
+</file>
+
+<file path=ppt/charts/style1.xml><?xml version="1.0" encoding="utf-8"?>
+<cs:chartStyle xmlns:cs="http://schemas.microsoft.com/office/drawing/2012/chartStyle" xmlns:a="http://schemas.openxmlformats.org/drawingml/2006/main" id="201">
+  <cs:axisTitle>
+    <cs:lnRef idx="0"/>
+    <cs:fillRef idx="0"/>
+    <cs:effectRef idx="0"/>
+    <cs:fontRef idx="minor">
+      <a:schemeClr val="tx1">
+        <a:lumMod val="65000"/>
+        <a:lumOff val="35000"/>
+      </a:schemeClr>
+    </cs:fontRef>
+    <cs:defRPr sz="1000" kern="1200"/>
+  </cs:axisTitle>
+  <cs:categoryAxis>
+    <cs:lnRef idx="0"/>
+    <cs:fillRef idx="0"/>
+    <cs:effectRef idx="0"/>
+    <cs:fontRef idx="minor">
+      <a:schemeClr val="tx1">
+        <a:lumMod val="65000"/>
+        <a:lumOff val="35000"/>
+      </a:schemeClr>
+    </cs:fontRef>
+    <cs:spPr>
+      <a:ln w="9525" cap="flat" cmpd="sng" algn="ctr">
+        <a:solidFill>
+          <a:schemeClr val="tx1">
+            <a:lumMod val="15000"/>
+            <a:lumOff val="85000"/>
+          </a:schemeClr>
+        </a:solidFill>
+        <a:round/>
+      </a:ln>
+    </cs:spPr>
+    <cs:defRPr sz="900" kern="1200"/>
+  </cs:categoryAxis>
+  <cs:chartArea mods="allowNoFillOverride allowNoLineOverride">
+    <cs:lnRef idx="0"/>
+    <cs:fillRef idx="0"/>
+    <cs:effectRef idx="0"/>
+    <cs:fontRef idx="minor">
+      <a:schemeClr val="tx1"/>
+    </cs:fontRef>
+    <cs:spPr>
+      <a:solidFill>
+        <a:schemeClr val="bg1"/>
+      </a:solidFill>
+      <a:ln w="9525" cap="flat" cmpd="sng" algn="ctr">
+        <a:solidFill>
+          <a:schemeClr val="tx1">
+            <a:lumMod val="15000"/>
+            <a:lumOff val="85000"/>
+          </a:schemeClr>
+        </a:solidFill>
+        <a:round/>
+      </a:ln>
+    </cs:spPr>
+    <cs:defRPr sz="1000" kern="1200"/>
+  </cs:chartArea>
+  <cs:dataLabel>
+    <cs:lnRef idx="0"/>
+    <cs:fillRef idx="0"/>
+    <cs:effectRef idx="0"/>
+    <cs:fontRef idx="minor">
+      <a:schemeClr val="tx1">
+        <a:lumMod val="75000"/>
+        <a:lumOff val="25000"/>
+      </a:schemeClr>
+    </cs:fontRef>
+    <cs:defRPr sz="900" kern="1200"/>
+  </cs:dataLabel>
+  <cs:dataLabelCallout>
+    <cs:lnRef idx="0"/>
+    <cs:fillRef idx="0"/>
+    <cs:effectRef idx="0"/>
+    <cs:fontRef idx="minor">
+      <a:schemeClr val="dk1">
+        <a:lumMod val="65000"/>
+        <a:lumOff val="35000"/>
+      </a:schemeClr>
+    </cs:fontRef>
+    <cs:spPr>
+      <a:solidFill>
+        <a:schemeClr val="lt1"/>
+      </a:solidFill>
+      <a:ln>
+        <a:solidFill>
+          <a:schemeClr val="dk1">
+            <a:lumMod val="25000"/>
+            <a:lumOff val="75000"/>
+          </a:schemeClr>
+        </a:solidFill>
+      </a:ln>
+    </cs:spPr>
+    <cs:defRPr sz="900" kern="1200"/>
+    <cs:bodyPr rot="0" spcFirstLastPara="1" vertOverflow="clip" horzOverflow="clip" vert="horz" wrap="square" lIns="36576" tIns="18288" rIns="36576" bIns="18288" anchor="ctr" anchorCtr="1">
+      <a:spAutoFit/>
+    </cs:bodyPr>
+  </cs:dataLabelCallout>
+  <cs:dataPoint>
+    <cs:lnRef idx="0"/>
+    <cs:fillRef idx="1">
+      <cs:styleClr val="auto"/>
+    </cs:fillRef>
+    <cs:effectRef idx="0"/>
+    <cs:fontRef idx="minor">
+      <a:schemeClr val="tx1"/>
+    </cs:fontRef>
+  </cs:dataPoint>
+  <cs:dataPoint3D>
+    <cs:lnRef idx="0"/>
+    <cs:fillRef idx="1">
+      <cs:styleClr val="auto"/>
+    </cs:fillRef>
+    <cs:effectRef idx="0"/>
+    <cs:fontRef idx="minor">
+      <a:schemeClr val="tx1"/>
+    </cs:fontRef>
+  </cs:dataPoint3D>
+  <cs:dataPointLine>
+    <cs:lnRef idx="0">
+      <cs:styleClr val="auto"/>
+    </cs:lnRef>
+    <cs:fillRef idx="1"/>
+    <cs:effectRef idx="0"/>
+    <cs:fontRef idx="minor">
+      <a:schemeClr val="tx1"/>
+    </cs:fontRef>
+    <cs:spPr>
+      <a:ln w="28575" cap="rnd">
+        <a:solidFill>
+          <a:schemeClr val="phClr"/>
+        </a:solidFill>
+        <a:round/>
+      </a:ln>
+    </cs:spPr>
+  </cs:dataPointLine>
+  <cs:dataPointMarker>
+    <cs:lnRef idx="0">
+      <cs:styleClr val="auto"/>
+    </cs:lnRef>
+    <cs:fillRef idx="1">
+      <cs:styleClr val="auto"/>
+    </cs:fillRef>
+    <cs:effectRef idx="0"/>
+    <cs:fontRef idx="minor">
+      <a:schemeClr val="tx1"/>
+    </cs:fontRef>
+    <cs:spPr>
+      <a:ln w="9525">
+        <a:solidFill>
+          <a:schemeClr val="phClr"/>
+        </a:solidFill>
+      </a:ln>
+    </cs:spPr>
+  </cs:dataPointMarker>
+  <cs:dataPointMarkerLayout symbol="circle" size="5"/>
+  <cs:dataPointWireframe>
+    <cs:lnRef idx="0">
+      <cs:styleClr val="auto"/>
+    </cs:lnRef>
+    <cs:fillRef idx="1"/>
+    <cs:effectRef idx="0"/>
+    <cs:fontRef idx="minor">
+      <a:schemeClr val="tx1"/>
+    </cs:fontRef>
+    <cs:spPr>
+      <a:ln w="9525" cap="rnd">
+        <a:solidFill>
+          <a:schemeClr val="phClr"/>
+        </a:solidFill>
+        <a:round/>
+      </a:ln>
+    </cs:spPr>
+  </cs:dataPointWireframe>
+  <cs:dataTable>
+    <cs:lnRef idx="0"/>
+    <cs:fillRef idx="0"/>
+    <cs:effectRef idx="0"/>
+    <cs:fontRef idx="minor">
+      <a:schemeClr val="tx1">
+        <a:lumMod val="65000"/>
+        <a:lumOff val="35000"/>
+      </a:schemeClr>
+    </cs:fontRef>
+    <cs:spPr>
+      <a:noFill/>
+      <a:ln w="9525" cap="flat" cmpd="sng" algn="ctr">
+        <a:solidFill>
+          <a:schemeClr val="tx1">
+            <a:lumMod val="15000"/>
+            <a:lumOff val="85000"/>
+          </a:schemeClr>
+        </a:solidFill>
+        <a:round/>
+      </a:ln>
+    </cs:spPr>
+    <cs:defRPr sz="900" kern="1200"/>
+  </cs:dataTable>
+  <cs:downBar>
+    <cs:lnRef idx="0"/>
+    <cs:fillRef idx="0"/>
+    <cs:effectRef idx="0"/>
+    <cs:fontRef idx="minor">
+      <a:schemeClr val="dk1"/>
+    </cs:fontRef>
+    <cs:spPr>
+      <a:solidFill>
+        <a:schemeClr val="dk1">
+          <a:lumMod val="65000"/>
+          <a:lumOff val="35000"/>
+        </a:schemeClr>
+      </a:solidFill>
+      <a:ln w="9525">
+        <a:solidFill>
+          <a:schemeClr val="tx1">
+            <a:lumMod val="65000"/>
+            <a:lumOff val="35000"/>
+          </a:schemeClr>
+        </a:solidFill>
+      </a:ln>
+    </cs:spPr>
+  </cs:downBar>
+  <cs:dropLine>
+    <cs:lnRef idx="0"/>
+    <cs:fillRef idx="0"/>
+    <cs:effectRef idx="0"/>
+    <cs:fontRef idx="minor">
+      <a:schemeClr val="tx1"/>
+    </cs:fontRef>
+    <cs:spPr>
+      <a:ln w="9525" cap="flat" cmpd="sng" algn="ctr">
+        <a:solidFill>
+          <a:schemeClr val="tx1">
+            <a:lumMod val="35000"/>
+            <a:lumOff val="65000"/>
+          </a:schemeClr>
+        </a:solidFill>
+        <a:round/>
+      </a:ln>
+    </cs:spPr>
+  </cs:dropLine>
+  <cs:errorBar>
+    <cs:lnRef idx="0"/>
+    <cs:fillRef idx="0"/>
+    <cs:effectRef idx="0"/>
+    <cs:fontRef idx="minor">
+      <a:schemeClr val="tx1"/>
+    </cs:fontRef>
+    <cs:spPr>
+      <a:ln w="9525" cap="flat" cmpd="sng" algn="ctr">
+        <a:solidFill>
+          <a:schemeClr val="tx1">
+            <a:lumMod val="65000"/>
+            <a:lumOff val="35000"/>
+          </a:schemeClr>
+        </a:solidFill>
+        <a:round/>
+      </a:ln>
+    </cs:spPr>
+  </cs:errorBar>
+  <cs:floor>
+    <cs:lnRef idx="0"/>
+    <cs:fillRef idx="0"/>
+    <cs:effectRef idx="0"/>
+    <cs:fontRef idx="minor">
+      <a:schemeClr val="tx1"/>
+    </cs:fontRef>
+    <cs:spPr>
+      <a:noFill/>
+      <a:ln>
+        <a:noFill/>
+      </a:ln>
+    </cs:spPr>
+  </cs:floor>
+  <cs:gridlineMajor>
+    <cs:lnRef idx="0"/>
+    <cs:fillRef idx="0"/>
+    <cs:effectRef idx="0"/>
+    <cs:fontRef idx="minor">
+      <a:schemeClr val="tx1"/>
+    </cs:fontRef>
+    <cs:spPr>
+      <a:ln w="9525" cap="flat" cmpd="sng" algn="ctr">
+        <a:solidFill>
+          <a:schemeClr val="tx1">
+            <a:lumMod val="15000"/>
+            <a:lumOff val="85000"/>
+          </a:schemeClr>
+        </a:solidFill>
+        <a:round/>
+      </a:ln>
+    </cs:spPr>
+  </cs:gridlineMajor>
+  <cs:gridlineMinor>
+    <cs:lnRef idx="0"/>
+    <cs:fillRef idx="0"/>
+    <cs:effectRef idx="0"/>
+    <cs:fontRef idx="minor">
+      <a:schemeClr val="tx1"/>
+    </cs:fontRef>
+    <cs:spPr>
+      <a:ln w="9525" cap="flat" cmpd="sng" algn="ctr">
+        <a:solidFill>
+          <a:schemeClr val="tx1">
+            <a:lumMod val="5000"/>
+            <a:lumOff val="95000"/>
+          </a:schemeClr>
+        </a:solidFill>
+        <a:round/>
+      </a:ln>
+    </cs:spPr>
+  </cs:gridlineMinor>
+  <cs:hiLoLine>
+    <cs:lnRef idx="0"/>
+    <cs:fillRef idx="0"/>
+    <cs:effectRef idx="0"/>
+    <cs:fontRef idx="minor">
+      <a:schemeClr val="tx1"/>
+    </cs:fontRef>
+    <cs:spPr>
+      <a:ln w="9525" cap="flat" cmpd="sng" algn="ctr">
+        <a:solidFill>
+          <a:schemeClr val="tx1">
+            <a:lumMod val="75000"/>
+            <a:lumOff val="25000"/>
+          </a:schemeClr>
+        </a:solidFill>
+        <a:round/>
+      </a:ln>
+    </cs:spPr>
+  </cs:hiLoLine>
+  <cs:leaderLine>
+    <cs:lnRef idx="0"/>
+    <cs:fillRef idx="0"/>
+    <cs:effectRef idx="0"/>
+    <cs:fontRef idx="minor">
+      <a:schemeClr val="tx1"/>
+    </cs:fontRef>
+    <cs:spPr>
+      <a:ln w="9525" cap="flat" cmpd="sng" algn="ctr">
+        <a:solidFill>
+          <a:schemeClr val="tx1">
+            <a:lumMod val="35000"/>
+            <a:lumOff val="65000"/>
+          </a:schemeClr>
+        </a:solidFill>
+        <a:round/>
+      </a:ln>
+    </cs:spPr>
+  </cs:leaderLine>
+  <cs:legend>
+    <cs:lnRef idx="0"/>
+    <cs:fillRef idx="0"/>
+    <cs:effectRef idx="0"/>
+    <cs:fontRef idx="minor">
+      <a:schemeClr val="tx1">
+        <a:lumMod val="65000"/>
+        <a:lumOff val="35000"/>
+      </a:schemeClr>
+    </cs:fontRef>
+    <cs:defRPr sz="900" kern="1200"/>
+  </cs:legend>
+  <cs:plotArea mods="allowNoFillOverride allowNoLineOverride">
+    <cs:lnRef idx="0"/>
+    <cs:fillRef idx="0"/>
+    <cs:effectRef idx="0"/>
+    <cs:fontRef idx="minor">
+      <a:schemeClr val="tx1"/>
+    </cs:fontRef>
+  </cs:plotArea>
+  <cs:plotArea3D mods="allowNoFillOverride allowNoLineOverride">
+    <cs:lnRef idx="0"/>
+    <cs:fillRef idx="0"/>
+    <cs:effectRef idx="0"/>
+    <cs:fontRef idx="minor">
+      <a:schemeClr val="tx1"/>
+    </cs:fontRef>
+  </cs:plotArea3D>
+  <cs:seriesAxis>
+    <cs:lnRef idx="0"/>
+    <cs:fillRef idx="0"/>
+    <cs:effectRef idx="0"/>
+    <cs:fontRef idx="minor">
+      <a:schemeClr val="tx1">
+        <a:lumMod val="65000"/>
+        <a:lumOff val="35000"/>
+      </a:schemeClr>
+    </cs:fontRef>
+    <cs:defRPr sz="900" kern="1200"/>
+  </cs:seriesAxis>
+  <cs:seriesLine>
+    <cs:lnRef idx="0"/>
+    <cs:fillRef idx="0"/>
+    <cs:effectRef idx="0"/>
+    <cs:fontRef idx="minor">
+      <a:schemeClr val="tx1"/>
+    </cs:fontRef>
+    <cs:spPr>
+      <a:ln w="9525" cap="flat" cmpd="sng" algn="ctr">
+        <a:solidFill>
+          <a:schemeClr val="tx1">
+            <a:lumMod val="35000"/>
+            <a:lumOff val="65000"/>
+          </a:schemeClr>
+        </a:solidFill>
+        <a:round/>
+      </a:ln>
+    </cs:spPr>
+  </cs:seriesLine>
+  <cs:title>
+    <cs:lnRef idx="0"/>
+    <cs:fillRef idx="0"/>
+    <cs:effectRef idx="0"/>
+    <cs:fontRef idx="minor">
+      <a:schemeClr val="tx1">
+        <a:lumMod val="65000"/>
+        <a:lumOff val="35000"/>
+      </a:schemeClr>
+    </cs:fontRef>
+    <cs:defRPr sz="1400" b="0" kern="1200" spc="0" baseline="0"/>
+  </cs:title>
+  <cs:trendline>
+    <cs:lnRef idx="0">
+      <cs:styleClr val="auto"/>
+    </cs:lnRef>
+    <cs:fillRef idx="0"/>
+    <cs:effectRef idx="0"/>
+    <cs:fontRef idx="minor">
+      <a:schemeClr val="tx1"/>
+    </cs:fontRef>
+    <cs:spPr>
+      <a:ln w="19050" cap="rnd">
+        <a:solidFill>
+          <a:schemeClr val="phClr"/>
+        </a:solidFill>
+        <a:prstDash val="sysDot"/>
+      </a:ln>
+    </cs:spPr>
+  </cs:trendline>
+  <cs:trendlineLabel>
+    <cs:lnRef idx="0"/>
+    <cs:fillRef idx="0"/>
+    <cs:effectRef idx="0"/>
+    <cs:fontRef idx="minor">
+      <a:schemeClr val="tx1">
+        <a:lumMod val="65000"/>
+        <a:lumOff val="35000"/>
+      </a:schemeClr>
+    </cs:fontRef>
+    <cs:defRPr sz="900" kern="1200"/>
+  </cs:trendlineLabel>
+  <cs:upBar>
+    <cs:lnRef idx="0"/>
+    <cs:fillRef idx="0"/>
+    <cs:effectRef idx="0"/>
+    <cs:fontRef idx="minor">
+      <a:schemeClr val="dk1"/>
+    </cs:fontRef>
+    <cs:spPr>
+      <a:solidFill>
+        <a:schemeClr val="lt1"/>
+      </a:solidFill>
+      <a:ln w="9525">
+        <a:solidFill>
+          <a:schemeClr val="tx1">
+            <a:lumMod val="15000"/>
+            <a:lumOff val="85000"/>
+          </a:schemeClr>
+        </a:solidFill>
+      </a:ln>
+    </cs:spPr>
+  </cs:upBar>
+  <cs:valueAxis>
+    <cs:lnRef idx="0"/>
+    <cs:fillRef idx="0"/>
+    <cs:effectRef idx="0"/>
+    <cs:fontRef idx="minor">
+      <a:schemeClr val="tx1">
+        <a:lumMod val="65000"/>
+        <a:lumOff val="35000"/>
+      </a:schemeClr>
+    </cs:fontRef>
+    <cs:defRPr sz="900" kern="1200"/>
+  </cs:valueAxis>
+  <cs:wall>
+    <cs:lnRef idx="0"/>
+    <cs:fillRef idx="0"/>
+    <cs:effectRef idx="0"/>
+    <cs:fontRef idx="minor">
+      <a:schemeClr val="tx1"/>
+    </cs:fontRef>
+    <cs:spPr>
+      <a:noFill/>
+      <a:ln>
+        <a:noFill/>
+      </a:ln>
+    </cs:spPr>
+  </cs:wall>
+</cs:chartStyle>
+</file>
+
+<file path=ppt/drawings/drawing1.xml><?xml version="1.0" encoding="utf-8"?>
+<c:userShapes xmlns:c="http://schemas.openxmlformats.org/drawingml/2006/chart">
+  <cdr:relSizeAnchor xmlns:cdr="http://schemas.openxmlformats.org/drawingml/2006/chartDrawing">
+    <cdr:from>
+      <cdr:x>0.74789</cdr:x>
+      <cdr:y>0.62498</cdr:y>
+    </cdr:from>
+    <cdr:to>
+      <cdr:x>0.96318</cdr:x>
+      <cdr:y>0.83963</cdr:y>
+    </cdr:to>
+    <cdr:sp macro="" textlink="">
+      <cdr:nvSpPr>
+        <cdr:cNvPr id="2" name="TextBox 1"/>
+        <cdr:cNvSpPr txBox="1"/>
+      </cdr:nvSpPr>
+      <cdr:spPr>
+        <a:xfrm xmlns:a="http://schemas.openxmlformats.org/drawingml/2006/main">
+          <a:off x="5936060" y="3252002"/>
+          <a:ext cx="1708767" cy="1116904"/>
+        </a:xfrm>
+        <a:prstGeom xmlns:a="http://schemas.openxmlformats.org/drawingml/2006/main" prst="rect">
+          <a:avLst/>
+        </a:prstGeom>
+      </cdr:spPr>
+      <cdr:txBody>
+        <a:bodyPr xmlns:a="http://schemas.openxmlformats.org/drawingml/2006/main" vertOverflow="clip" wrap="square" rtlCol="0"/>
+        <a:lstStyle xmlns:a="http://schemas.openxmlformats.org/drawingml/2006/main"/>
+        <a:p xmlns:a="http://schemas.openxmlformats.org/drawingml/2006/main">
+          <a:r>
+            <a:rPr lang="en-US" sz="1600" dirty="0"/>
+            <a:t>Bubble size is build volume in mm</a:t>
+          </a:r>
+          <a:r>
+            <a:rPr lang="en-US" sz="1600" baseline="30000" dirty="0"/>
+            <a:t>3</a:t>
+          </a:r>
+        </a:p>
+      </cdr:txBody>
+    </cdr:sp>
+  </cdr:relSizeAnchor>
+</c:userShapes>
 </file>
 
 <file path=ppt/notesMasters/notesMaster1.xml><?xml version="1.0" encoding="utf-8"?>
@@ -6807,7 +8206,7 @@
       </p:grpSpPr>
       <p:sp>
         <p:nvSpPr>
-          <p:cNvPr id="5" name="Title 4"/>
+          <p:cNvPr id="2" name="Title 1"/>
           <p:cNvSpPr>
             <a:spLocks noGrp="1"/>
           </p:cNvSpPr>
@@ -6817,74 +8216,36 @@
         </p:nvSpPr>
         <p:spPr/>
         <p:txBody>
-          <a:bodyPr>
-            <a:normAutofit fontScale="90000"/>
-          </a:bodyPr>
+          <a:bodyPr/>
           <a:lstStyle/>
           <a:p>
             <a:r>
-              <a:rPr lang="en-US" dirty="0"/>
-              <a:t>Chassis Design</a:t>
-            </a:r>
-          </a:p>
-        </p:txBody>
-      </p:sp>
-      <p:pic>
-        <p:nvPicPr>
-          <p:cNvPr id="10" name="Content Placeholder 9"/>
-          <p:cNvPicPr>
-            <a:picLocks noGrp="1" noChangeAspect="1"/>
-          </p:cNvPicPr>
-          <p:nvPr>
-            <p:ph sz="half" idx="1"/>
-          </p:nvPr>
-        </p:nvPicPr>
-        <p:blipFill rotWithShape="1">
-          <a:blip r:embed="rId2" cstate="print">
-            <a:extLst>
-              <a:ext uri="{28A0092B-C50C-407E-A947-70E740481C1C}">
-                <a14:useLocalDpi xmlns:a14="http://schemas.microsoft.com/office/drawing/2010/main" val="0"/>
-              </a:ext>
-            </a:extLst>
-          </a:blip>
-          <a:srcRect t="19571"/>
-          <a:stretch/>
-        </p:blipFill>
-        <p:spPr>
-          <a:xfrm>
-            <a:off x="1484311" y="1910075"/>
-            <a:ext cx="6072843" cy="3460124"/>
-          </a:xfrm>
-        </p:spPr>
-      </p:pic>
-      <p:pic>
-        <p:nvPicPr>
-          <p:cNvPr id="9" name="Content Placeholder 8"/>
-          <p:cNvPicPr>
-            <a:picLocks noGrp="1" noChangeAspect="1"/>
-          </p:cNvPicPr>
-          <p:nvPr>
-            <p:ph sz="half" idx="2"/>
-          </p:nvPr>
-        </p:nvPicPr>
-        <p:blipFill rotWithShape="1">
-          <a:blip r:embed="rId3">
-            <a:extLst>
-              <a:ext uri="{28A0092B-C50C-407E-A947-70E740481C1C}">
-                <a14:useLocalDpi xmlns:a14="http://schemas.microsoft.com/office/drawing/2010/main" val="0"/>
-              </a:ext>
-            </a:extLst>
-          </a:blip>
-          <a:srcRect r="12302"/>
-          <a:stretch/>
-        </p:blipFill>
-        <p:spPr>
-          <a:xfrm>
-            <a:off x="8154545" y="1489074"/>
-            <a:ext cx="2843364" cy="4302125"/>
-          </a:xfrm>
-        </p:spPr>
-      </p:pic>
+              <a:rPr lang="en-US" dirty="0" smtClean="0"/>
+              <a:t>Technical Drawings</a:t>
+            </a:r>
+            <a:endParaRPr lang="en-US" dirty="0"/>
+          </a:p>
+        </p:txBody>
+      </p:sp>
+      <p:sp>
+        <p:nvSpPr>
+          <p:cNvPr id="3" name="Content Placeholder 2"/>
+          <p:cNvSpPr>
+            <a:spLocks noGrp="1"/>
+          </p:cNvSpPr>
+          <p:nvPr>
+            <p:ph idx="1"/>
+          </p:nvPr>
+        </p:nvSpPr>
+        <p:spPr/>
+        <p:txBody>
+          <a:bodyPr/>
+          <a:lstStyle/>
+          <a:p>
+            <a:endParaRPr lang="en-US"/>
+          </a:p>
+        </p:txBody>
+      </p:sp>
       <p:sp>
         <p:nvSpPr>
           <p:cNvPr id="4" name="Slide Number Placeholder 3"/>
@@ -6908,100 +8269,16 @@
           </a:p>
         </p:txBody>
       </p:sp>
-      <p:sp>
-        <p:nvSpPr>
-          <p:cNvPr id="6" name="TextBox 5"/>
-          <p:cNvSpPr txBox="1"/>
-          <p:nvPr/>
-        </p:nvSpPr>
-        <p:spPr>
-          <a:xfrm>
-            <a:off x="2823793" y="5513942"/>
-            <a:ext cx="3393878" cy="369332"/>
-          </a:xfrm>
-          <a:prstGeom prst="rect">
-            <a:avLst/>
-          </a:prstGeom>
-          <a:noFill/>
-        </p:spPr>
-        <p:txBody>
-          <a:bodyPr wrap="none" rtlCol="0">
-            <a:spAutoFit/>
-          </a:bodyPr>
-          <a:lstStyle/>
-          <a:p>
-            <a:r>
-              <a:rPr lang="en-US" dirty="0" smtClean="0"/>
-              <a:t>Figure 4. </a:t>
-            </a:r>
-            <a:r>
-              <a:rPr lang="en-US" dirty="0"/>
-              <a:t>Proposed chassis design </a:t>
-            </a:r>
-          </a:p>
-        </p:txBody>
-      </p:sp>
-      <p:sp>
-        <p:nvSpPr>
-          <p:cNvPr id="7" name="TextBox 6"/>
-          <p:cNvSpPr txBox="1"/>
-          <p:nvPr/>
-        </p:nvSpPr>
-        <p:spPr>
-          <a:xfrm>
-            <a:off x="8337747" y="5883273"/>
-            <a:ext cx="2476960" cy="646331"/>
-          </a:xfrm>
-          <a:prstGeom prst="rect">
-            <a:avLst/>
-          </a:prstGeom>
-          <a:noFill/>
-        </p:spPr>
-        <p:txBody>
-          <a:bodyPr wrap="none" rtlCol="0">
-            <a:spAutoFit/>
-          </a:bodyPr>
-          <a:lstStyle/>
-          <a:p>
-            <a:r>
-              <a:rPr lang="en-US" dirty="0" smtClean="0"/>
-              <a:t>Figure 5. </a:t>
-            </a:r>
-            <a:r>
-              <a:rPr lang="en-US" dirty="0"/>
-              <a:t>Isometric view </a:t>
-            </a:r>
-            <a:endParaRPr lang="en-US" dirty="0" smtClean="0"/>
-          </a:p>
-          <a:p>
-            <a:r>
-              <a:rPr lang="en-US" dirty="0" smtClean="0"/>
-              <a:t>of </a:t>
-            </a:r>
-            <a:r>
-              <a:rPr lang="en-US" dirty="0"/>
-              <a:t>proposed chassis </a:t>
-            </a:r>
-          </a:p>
-        </p:txBody>
-      </p:sp>
     </p:spTree>
     <p:extLst>
       <p:ext uri="{BB962C8B-B14F-4D97-AF65-F5344CB8AC3E}">
-        <p14:creationId xmlns:p14="http://schemas.microsoft.com/office/powerpoint/2010/main" val="341879816"/>
+        <p14:creationId xmlns:p14="http://schemas.microsoft.com/office/powerpoint/2010/main" val="2704906384"/>
       </p:ext>
     </p:extLst>
   </p:cSld>
   <p:clrMapOvr>
     <a:masterClrMapping/>
   </p:clrMapOvr>
-  <p:timing>
-    <p:tnLst>
-      <p:par>
-        <p:cTn id="1" dur="indefinite" restart="never" nodeType="tmRoot"/>
-      </p:par>
-    </p:tnLst>
-  </p:timing>
 </p:sld>
 </file>
 
@@ -7039,7 +8316,7 @@
           <a:p>
             <a:r>
               <a:rPr lang="en-US" dirty="0" smtClean="0"/>
-              <a:t>Technical Drawings</a:t>
+              <a:t>Vat Design</a:t>
             </a:r>
             <a:endParaRPr lang="en-US" dirty="0"/>
           </a:p>
@@ -7090,7 +8367,7 @@
     </p:spTree>
     <p:extLst>
       <p:ext uri="{BB962C8B-B14F-4D97-AF65-F5344CB8AC3E}">
-        <p14:creationId xmlns:p14="http://schemas.microsoft.com/office/powerpoint/2010/main" val="2704906384"/>
+        <p14:creationId xmlns:p14="http://schemas.microsoft.com/office/powerpoint/2010/main" val="795725223"/>
       </p:ext>
     </p:extLst>
   </p:cSld>
@@ -7134,7 +8411,7 @@
           <a:p>
             <a:r>
               <a:rPr lang="en-US" dirty="0" smtClean="0"/>
-              <a:t>Vat Design</a:t>
+              <a:t>Wire Diagram</a:t>
             </a:r>
             <a:endParaRPr lang="en-US" dirty="0"/>
           </a:p>
@@ -7185,7 +8462,7 @@
     </p:spTree>
     <p:extLst>
       <p:ext uri="{BB962C8B-B14F-4D97-AF65-F5344CB8AC3E}">
-        <p14:creationId xmlns:p14="http://schemas.microsoft.com/office/powerpoint/2010/main" val="795725223"/>
+        <p14:creationId xmlns:p14="http://schemas.microsoft.com/office/powerpoint/2010/main" val="4240055343"/>
       </p:ext>
     </p:extLst>
   </p:cSld>
@@ -7229,7 +8506,7 @@
           <a:p>
             <a:r>
               <a:rPr lang="en-US" dirty="0" smtClean="0"/>
-              <a:t>Wire Diagram</a:t>
+              <a:t>Hardware Software Interface</a:t>
             </a:r>
             <a:endParaRPr lang="en-US" dirty="0"/>
           </a:p>
@@ -7280,7 +8557,7 @@
     </p:spTree>
     <p:extLst>
       <p:ext uri="{BB962C8B-B14F-4D97-AF65-F5344CB8AC3E}">
-        <p14:creationId xmlns:p14="http://schemas.microsoft.com/office/powerpoint/2010/main" val="4240055343"/>
+        <p14:creationId xmlns:p14="http://schemas.microsoft.com/office/powerpoint/2010/main" val="3374279974"/>
       </p:ext>
     </p:extLst>
   </p:cSld>
@@ -7323,8 +8600,12 @@
           <a:lstStyle/>
           <a:p>
             <a:r>
+              <a:rPr lang="en-US" dirty="0"/>
+              <a:t>Hardware Software </a:t>
+            </a:r>
+            <a:r>
               <a:rPr lang="en-US" dirty="0" smtClean="0"/>
-              <a:t>Hardware Software Interface</a:t>
+              <a:t>Interface contd.</a:t>
             </a:r>
             <a:endParaRPr lang="en-US" dirty="0"/>
           </a:p>
@@ -7375,7 +8656,7 @@
     </p:spTree>
     <p:extLst>
       <p:ext uri="{BB962C8B-B14F-4D97-AF65-F5344CB8AC3E}">
-        <p14:creationId xmlns:p14="http://schemas.microsoft.com/office/powerpoint/2010/main" val="3374279974"/>
+        <p14:creationId xmlns:p14="http://schemas.microsoft.com/office/powerpoint/2010/main" val="1320030583"/>
       </p:ext>
     </p:extLst>
   </p:cSld>
@@ -7418,12 +8699,8 @@
           <a:lstStyle/>
           <a:p>
             <a:r>
-              <a:rPr lang="en-US" dirty="0"/>
-              <a:t>Hardware Software </a:t>
-            </a:r>
-            <a:r>
               <a:rPr lang="en-US" dirty="0" smtClean="0"/>
-              <a:t>Interface contd.</a:t>
+              <a:t>Projector and Resin</a:t>
             </a:r>
             <a:endParaRPr lang="en-US" dirty="0"/>
           </a:p>
@@ -7431,12 +8708,12 @@
       </p:sp>
       <p:sp>
         <p:nvSpPr>
-          <p:cNvPr id="3" name="Content Placeholder 2"/>
-          <p:cNvSpPr>
-            <a:spLocks noGrp="1"/>
-          </p:cNvSpPr>
-          <p:nvPr>
-            <p:ph idx="1"/>
+          <p:cNvPr id="4" name="Slide Number Placeholder 3"/>
+          <p:cNvSpPr>
+            <a:spLocks noGrp="1"/>
+          </p:cNvSpPr>
+          <p:nvPr>
+            <p:ph type="sldNum" sz="quarter" idx="12"/>
           </p:nvPr>
         </p:nvSpPr>
         <p:spPr/>
@@ -7444,37 +8721,106 @@
           <a:bodyPr/>
           <a:lstStyle/>
           <a:p>
-            <a:endParaRPr lang="en-US"/>
-          </a:p>
-        </p:txBody>
-      </p:sp>
-      <p:sp>
-        <p:nvSpPr>
-          <p:cNvPr id="4" name="Slide Number Placeholder 3"/>
-          <p:cNvSpPr>
-            <a:spLocks noGrp="1"/>
-          </p:cNvSpPr>
-          <p:nvPr>
-            <p:ph type="sldNum" sz="quarter" idx="12"/>
-          </p:nvPr>
-        </p:nvSpPr>
-        <p:spPr/>
-        <p:txBody>
-          <a:bodyPr/>
-          <a:lstStyle/>
-          <a:p>
             <a:fld id="{5C6BB475-B640-4DD3-A1AA-1CF10A44AA06}" type="slidenum">
               <a:rPr lang="en-US" smtClean="0"/>
+              <a:pPr/>
               <a:t>15</a:t>
             </a:fld>
-            <a:endParaRPr lang="en-US"/>
+            <a:endParaRPr lang="en-US" dirty="0"/>
+          </a:p>
+        </p:txBody>
+      </p:sp>
+      <p:sp>
+        <p:nvSpPr>
+          <p:cNvPr id="6" name="Content Placeholder 5"/>
+          <p:cNvSpPr>
+            <a:spLocks noGrp="1"/>
+          </p:cNvSpPr>
+          <p:nvPr>
+            <p:ph idx="1"/>
+          </p:nvPr>
+        </p:nvSpPr>
+        <p:spPr>
+          <a:xfrm>
+            <a:off x="1541989" y="1538196"/>
+            <a:ext cx="10018713" cy="4180024"/>
+          </a:xfrm>
+        </p:spPr>
+        <p:txBody>
+          <a:bodyPr anchor="t">
+            <a:normAutofit/>
+          </a:bodyPr>
+          <a:lstStyle/>
+          <a:p>
+            <a:r>
+              <a:rPr lang="en-US" dirty="0" smtClean="0"/>
+              <a:t>Projector Qualities</a:t>
+            </a:r>
+          </a:p>
+          <a:p>
+            <a:pPr lvl="1"/>
+            <a:r>
+              <a:rPr lang="en-US" dirty="0" smtClean="0"/>
+              <a:t>High Resolution DLP</a:t>
+            </a:r>
+            <a:endParaRPr lang="en-US" dirty="0"/>
+          </a:p>
+          <a:p>
+            <a:pPr lvl="1"/>
+            <a:r>
+              <a:rPr lang="en-US" dirty="0"/>
+              <a:t>UV </a:t>
+            </a:r>
+            <a:r>
+              <a:rPr lang="en-US" dirty="0" smtClean="0"/>
+              <a:t>Filter Removal </a:t>
+            </a:r>
+            <a:endParaRPr lang="en-US" dirty="0"/>
+          </a:p>
+          <a:p>
+            <a:pPr lvl="1"/>
+            <a:r>
+              <a:rPr lang="en-US" dirty="0"/>
+              <a:t>Throw </a:t>
+            </a:r>
+            <a:r>
+              <a:rPr lang="en-US" dirty="0" smtClean="0"/>
+              <a:t>Distance</a:t>
+            </a:r>
+          </a:p>
+          <a:p>
+            <a:r>
+              <a:rPr lang="en-US" dirty="0" smtClean="0"/>
+              <a:t>Resin</a:t>
+            </a:r>
+            <a:endParaRPr lang="en-US" dirty="0"/>
+          </a:p>
+          <a:p>
+            <a:pPr lvl="1"/>
+            <a:r>
+              <a:rPr lang="en-US" dirty="0"/>
+              <a:t>Test for Layer Thickness</a:t>
+            </a:r>
+          </a:p>
+          <a:p>
+            <a:pPr lvl="1"/>
+            <a:r>
+              <a:rPr lang="en-US" dirty="0"/>
+              <a:t>Test for Exposure Time</a:t>
+            </a:r>
+          </a:p>
+          <a:p>
+            <a:pPr marL="0" indent="0">
+              <a:buNone/>
+            </a:pPr>
+            <a:endParaRPr lang="en-US" dirty="0" smtClean="0"/>
           </a:p>
         </p:txBody>
       </p:sp>
     </p:spTree>
     <p:extLst>
       <p:ext uri="{BB962C8B-B14F-4D97-AF65-F5344CB8AC3E}">
-        <p14:creationId xmlns:p14="http://schemas.microsoft.com/office/powerpoint/2010/main" val="1320030583"/>
+        <p14:creationId xmlns:p14="http://schemas.microsoft.com/office/powerpoint/2010/main" val="1888003692"/>
       </p:ext>
     </p:extLst>
   </p:cSld>
@@ -7518,7 +8864,7 @@
           <a:p>
             <a:r>
               <a:rPr lang="en-US" dirty="0" smtClean="0"/>
-              <a:t>Resin/Optics</a:t>
+              <a:t>Software Problems</a:t>
             </a:r>
             <a:endParaRPr lang="en-US" dirty="0"/>
           </a:p>
@@ -7569,7 +8915,7 @@
     </p:spTree>
     <p:extLst>
       <p:ext uri="{BB962C8B-B14F-4D97-AF65-F5344CB8AC3E}">
-        <p14:creationId xmlns:p14="http://schemas.microsoft.com/office/powerpoint/2010/main" val="3284958645"/>
+        <p14:creationId xmlns:p14="http://schemas.microsoft.com/office/powerpoint/2010/main" val="4088312060"/>
       </p:ext>
     </p:extLst>
   </p:cSld>
@@ -7613,7 +8959,7 @@
           <a:p>
             <a:r>
               <a:rPr lang="en-US" dirty="0" smtClean="0"/>
-              <a:t>Software Problems</a:t>
+              <a:t>New Design</a:t>
             </a:r>
             <a:endParaRPr lang="en-US" dirty="0"/>
           </a:p>
@@ -7664,7 +9010,7 @@
     </p:spTree>
     <p:extLst>
       <p:ext uri="{BB962C8B-B14F-4D97-AF65-F5344CB8AC3E}">
-        <p14:creationId xmlns:p14="http://schemas.microsoft.com/office/powerpoint/2010/main" val="4088312060"/>
+        <p14:creationId xmlns:p14="http://schemas.microsoft.com/office/powerpoint/2010/main" val="4014598853"/>
       </p:ext>
     </p:extLst>
   </p:cSld>
@@ -7703,33 +9049,16 @@
         </p:nvSpPr>
         <p:spPr/>
         <p:txBody>
-          <a:bodyPr/>
+          <a:bodyPr>
+            <a:normAutofit/>
+          </a:bodyPr>
           <a:lstStyle/>
           <a:p>
             <a:r>
               <a:rPr lang="en-US" dirty="0" smtClean="0"/>
-              <a:t>New Design</a:t>
+              <a:t>Timeline</a:t>
             </a:r>
             <a:endParaRPr lang="en-US" dirty="0"/>
-          </a:p>
-        </p:txBody>
-      </p:sp>
-      <p:sp>
-        <p:nvSpPr>
-          <p:cNvPr id="3" name="Content Placeholder 2"/>
-          <p:cNvSpPr>
-            <a:spLocks noGrp="1"/>
-          </p:cNvSpPr>
-          <p:nvPr>
-            <p:ph idx="1"/>
-          </p:nvPr>
-        </p:nvSpPr>
-        <p:spPr/>
-        <p:txBody>
-          <a:bodyPr/>
-          <a:lstStyle/>
-          <a:p>
-            <a:endParaRPr lang="en-US"/>
           </a:p>
         </p:txBody>
       </p:sp>
@@ -7759,13 +9088,20 @@
     </p:spTree>
     <p:extLst>
       <p:ext uri="{BB962C8B-B14F-4D97-AF65-F5344CB8AC3E}">
-        <p14:creationId xmlns:p14="http://schemas.microsoft.com/office/powerpoint/2010/main" val="4014598853"/>
+        <p14:creationId xmlns:p14="http://schemas.microsoft.com/office/powerpoint/2010/main" val="278994164"/>
       </p:ext>
     </p:extLst>
   </p:cSld>
   <p:clrMapOvr>
     <a:masterClrMapping/>
   </p:clrMapOvr>
+  <p:timing>
+    <p:tnLst>
+      <p:par>
+        <p:cTn id="1" dur="indefinite" restart="never" nodeType="tmRoot"/>
+      </p:par>
+    </p:tnLst>
+  </p:timing>
 </p:sld>
 </file>
 
@@ -7798,14 +9134,12 @@
         </p:nvSpPr>
         <p:spPr/>
         <p:txBody>
-          <a:bodyPr>
-            <a:normAutofit/>
-          </a:bodyPr>
+          <a:bodyPr/>
           <a:lstStyle/>
           <a:p>
             <a:r>
               <a:rPr lang="en-US" dirty="0" smtClean="0"/>
-              <a:t>Timeline</a:t>
+              <a:t>Timeline &amp; Budget</a:t>
             </a:r>
             <a:endParaRPr lang="en-US" dirty="0"/>
           </a:p>
@@ -7829,234 +9163,6 @@
             <a:fld id="{5C6BB475-B640-4DD3-A1AA-1CF10A44AA06}" type="slidenum">
               <a:rPr lang="en-US" smtClean="0"/>
               <a:t>19</a:t>
-            </a:fld>
-            <a:endParaRPr lang="en-US"/>
-          </a:p>
-        </p:txBody>
-      </p:sp>
-    </p:spTree>
-    <p:extLst>
-      <p:ext uri="{BB962C8B-B14F-4D97-AF65-F5344CB8AC3E}">
-        <p14:creationId xmlns:p14="http://schemas.microsoft.com/office/powerpoint/2010/main" val="278994164"/>
-      </p:ext>
-    </p:extLst>
-  </p:cSld>
-  <p:clrMapOvr>
-    <a:masterClrMapping/>
-  </p:clrMapOvr>
-  <p:timing>
-    <p:tnLst>
-      <p:par>
-        <p:cTn id="1" dur="indefinite" restart="never" nodeType="tmRoot"/>
-      </p:par>
-    </p:tnLst>
-  </p:timing>
-</p:sld>
-</file>
-
-<file path=ppt/slides/slide2.xml><?xml version="1.0" encoding="utf-8"?>
-<p:sld xmlns:a="http://schemas.openxmlformats.org/drawingml/2006/main" xmlns:r="http://schemas.openxmlformats.org/officeDocument/2006/relationships" xmlns:p="http://schemas.openxmlformats.org/presentationml/2006/main">
-  <p:cSld>
-    <p:spTree>
-      <p:nvGrpSpPr>
-        <p:cNvPr id="1" name=""/>
-        <p:cNvGrpSpPr/>
-        <p:nvPr/>
-      </p:nvGrpSpPr>
-      <p:grpSpPr>
-        <a:xfrm>
-          <a:off x="0" y="0"/>
-          <a:ext cx="0" cy="0"/>
-          <a:chOff x="0" y="0"/>
-          <a:chExt cx="0" cy="0"/>
-        </a:xfrm>
-      </p:grpSpPr>
-      <p:sp>
-        <p:nvSpPr>
-          <p:cNvPr id="2" name="Title 1"/>
-          <p:cNvSpPr>
-            <a:spLocks noGrp="1"/>
-          </p:cNvSpPr>
-          <p:nvPr>
-            <p:ph type="title"/>
-          </p:nvPr>
-        </p:nvSpPr>
-        <p:spPr/>
-        <p:txBody>
-          <a:bodyPr>
-            <a:normAutofit/>
-          </a:bodyPr>
-          <a:lstStyle/>
-          <a:p>
-            <a:r>
-              <a:rPr lang="en-US" dirty="0" smtClean="0"/>
-              <a:t>Team 75 </a:t>
-            </a:r>
-            <a:r>
-              <a:rPr lang="en-US" dirty="0" smtClean="0"/>
-              <a:t>Organization</a:t>
-            </a:r>
-            <a:endParaRPr lang="en-US" dirty="0"/>
-          </a:p>
-        </p:txBody>
-      </p:sp>
-      <p:pic>
-        <p:nvPicPr>
-          <p:cNvPr id="6" name="Content Placeholder 5"/>
-          <p:cNvPicPr>
-            <a:picLocks noGrp="1" noChangeAspect="1"/>
-          </p:cNvPicPr>
-          <p:nvPr>
-            <p:ph idx="1"/>
-          </p:nvPr>
-        </p:nvPicPr>
-        <p:blipFill>
-          <a:blip r:embed="rId2"/>
-          <a:stretch>
-            <a:fillRect/>
-          </a:stretch>
-        </p:blipFill>
-        <p:spPr>
-          <a:xfrm>
-            <a:off x="2588467" y="1630363"/>
-            <a:ext cx="7924704" cy="4102100"/>
-          </a:xfrm>
-          <a:prstGeom prst="rect">
-            <a:avLst/>
-          </a:prstGeom>
-        </p:spPr>
-      </p:pic>
-      <p:sp>
-        <p:nvSpPr>
-          <p:cNvPr id="4" name="Slide Number Placeholder 3"/>
-          <p:cNvSpPr>
-            <a:spLocks noGrp="1"/>
-          </p:cNvSpPr>
-          <p:nvPr>
-            <p:ph type="sldNum" sz="quarter" idx="12"/>
-          </p:nvPr>
-        </p:nvSpPr>
-        <p:spPr/>
-        <p:txBody>
-          <a:bodyPr/>
-          <a:lstStyle/>
-          <a:p>
-            <a:fld id="{5C6BB475-B640-4DD3-A1AA-1CF10A44AA06}" type="slidenum">
-              <a:rPr lang="en-US" smtClean="0"/>
-              <a:t>2</a:t>
-            </a:fld>
-            <a:endParaRPr lang="en-US"/>
-          </a:p>
-        </p:txBody>
-      </p:sp>
-      <p:sp>
-        <p:nvSpPr>
-          <p:cNvPr id="7" name="TextBox 6"/>
-          <p:cNvSpPr txBox="1"/>
-          <p:nvPr/>
-        </p:nvSpPr>
-        <p:spPr>
-          <a:xfrm>
-            <a:off x="5046208" y="5884727"/>
-            <a:ext cx="3009222" cy="369332"/>
-          </a:xfrm>
-          <a:prstGeom prst="rect">
-            <a:avLst/>
-          </a:prstGeom>
-          <a:noFill/>
-        </p:spPr>
-        <p:txBody>
-          <a:bodyPr wrap="none" rtlCol="0">
-            <a:spAutoFit/>
-          </a:bodyPr>
-          <a:lstStyle/>
-          <a:p>
-            <a:r>
-              <a:rPr lang="en-US" dirty="0" smtClean="0"/>
-              <a:t>Figure 1. Project Organization</a:t>
-            </a:r>
-            <a:endParaRPr lang="en-US" dirty="0"/>
-          </a:p>
-        </p:txBody>
-      </p:sp>
-    </p:spTree>
-    <p:extLst>
-      <p:ext uri="{BB962C8B-B14F-4D97-AF65-F5344CB8AC3E}">
-        <p14:creationId xmlns:p14="http://schemas.microsoft.com/office/powerpoint/2010/main" val="1628288518"/>
-      </p:ext>
-    </p:extLst>
-  </p:cSld>
-  <p:clrMapOvr>
-    <a:masterClrMapping/>
-  </p:clrMapOvr>
-  <p:timing>
-    <p:tnLst>
-      <p:par>
-        <p:cTn id="1" dur="indefinite" restart="never" nodeType="tmRoot"/>
-      </p:par>
-    </p:tnLst>
-  </p:timing>
-</p:sld>
-</file>
-
-<file path=ppt/slides/slide20.xml><?xml version="1.0" encoding="utf-8"?>
-<p:sld xmlns:a="http://schemas.openxmlformats.org/drawingml/2006/main" xmlns:r="http://schemas.openxmlformats.org/officeDocument/2006/relationships" xmlns:p="http://schemas.openxmlformats.org/presentationml/2006/main">
-  <p:cSld>
-    <p:spTree>
-      <p:nvGrpSpPr>
-        <p:cNvPr id="1" name=""/>
-        <p:cNvGrpSpPr/>
-        <p:nvPr/>
-      </p:nvGrpSpPr>
-      <p:grpSpPr>
-        <a:xfrm>
-          <a:off x="0" y="0"/>
-          <a:ext cx="0" cy="0"/>
-          <a:chOff x="0" y="0"/>
-          <a:chExt cx="0" cy="0"/>
-        </a:xfrm>
-      </p:grpSpPr>
-      <p:sp>
-        <p:nvSpPr>
-          <p:cNvPr id="2" name="Title 1"/>
-          <p:cNvSpPr>
-            <a:spLocks noGrp="1"/>
-          </p:cNvSpPr>
-          <p:nvPr>
-            <p:ph type="title"/>
-          </p:nvPr>
-        </p:nvSpPr>
-        <p:spPr/>
-        <p:txBody>
-          <a:bodyPr/>
-          <a:lstStyle/>
-          <a:p>
-            <a:r>
-              <a:rPr lang="en-US" dirty="0" smtClean="0"/>
-              <a:t>Timeline &amp; Budget</a:t>
-            </a:r>
-            <a:endParaRPr lang="en-US" dirty="0"/>
-          </a:p>
-        </p:txBody>
-      </p:sp>
-      <p:sp>
-        <p:nvSpPr>
-          <p:cNvPr id="4" name="Slide Number Placeholder 3"/>
-          <p:cNvSpPr>
-            <a:spLocks noGrp="1"/>
-          </p:cNvSpPr>
-          <p:nvPr>
-            <p:ph type="sldNum" sz="quarter" idx="12"/>
-          </p:nvPr>
-        </p:nvSpPr>
-        <p:spPr/>
-        <p:txBody>
-          <a:bodyPr/>
-          <a:lstStyle/>
-          <a:p>
-            <a:fld id="{5C6BB475-B640-4DD3-A1AA-1CF10A44AA06}" type="slidenum">
-              <a:rPr lang="en-US" smtClean="0"/>
-              <a:t>20</a:t>
             </a:fld>
             <a:endParaRPr lang="en-US"/>
           </a:p>
@@ -8502,6 +9608,313 @@
 </p:sld>
 </file>
 
+<file path=ppt/slides/slide2.xml><?xml version="1.0" encoding="utf-8"?>
+<p:sld xmlns:a="http://schemas.openxmlformats.org/drawingml/2006/main" xmlns:r="http://schemas.openxmlformats.org/officeDocument/2006/relationships" xmlns:p="http://schemas.openxmlformats.org/presentationml/2006/main">
+  <p:cSld>
+    <p:spTree>
+      <p:nvGrpSpPr>
+        <p:cNvPr id="1" name=""/>
+        <p:cNvGrpSpPr/>
+        <p:nvPr/>
+      </p:nvGrpSpPr>
+      <p:grpSpPr>
+        <a:xfrm>
+          <a:off x="0" y="0"/>
+          <a:ext cx="0" cy="0"/>
+          <a:chOff x="0" y="0"/>
+          <a:chExt cx="0" cy="0"/>
+        </a:xfrm>
+      </p:grpSpPr>
+      <p:sp>
+        <p:nvSpPr>
+          <p:cNvPr id="2" name="Title 1"/>
+          <p:cNvSpPr>
+            <a:spLocks noGrp="1"/>
+          </p:cNvSpPr>
+          <p:nvPr>
+            <p:ph type="title"/>
+          </p:nvPr>
+        </p:nvSpPr>
+        <p:spPr/>
+        <p:txBody>
+          <a:bodyPr>
+            <a:normAutofit/>
+          </a:bodyPr>
+          <a:lstStyle/>
+          <a:p>
+            <a:r>
+              <a:rPr lang="en-US" dirty="0" smtClean="0"/>
+              <a:t>Team 75 Organization</a:t>
+            </a:r>
+            <a:endParaRPr lang="en-US" dirty="0"/>
+          </a:p>
+        </p:txBody>
+      </p:sp>
+      <p:pic>
+        <p:nvPicPr>
+          <p:cNvPr id="6" name="Content Placeholder 5"/>
+          <p:cNvPicPr>
+            <a:picLocks noGrp="1" noChangeAspect="1"/>
+          </p:cNvPicPr>
+          <p:nvPr>
+            <p:ph idx="1"/>
+          </p:nvPr>
+        </p:nvPicPr>
+        <p:blipFill>
+          <a:blip r:embed="rId2"/>
+          <a:stretch>
+            <a:fillRect/>
+          </a:stretch>
+        </p:blipFill>
+        <p:spPr>
+          <a:xfrm>
+            <a:off x="2588467" y="1630363"/>
+            <a:ext cx="7924704" cy="4102100"/>
+          </a:xfrm>
+          <a:prstGeom prst="rect">
+            <a:avLst/>
+          </a:prstGeom>
+        </p:spPr>
+      </p:pic>
+      <p:sp>
+        <p:nvSpPr>
+          <p:cNvPr id="4" name="Slide Number Placeholder 3"/>
+          <p:cNvSpPr>
+            <a:spLocks noGrp="1"/>
+          </p:cNvSpPr>
+          <p:nvPr>
+            <p:ph type="sldNum" sz="quarter" idx="12"/>
+          </p:nvPr>
+        </p:nvSpPr>
+        <p:spPr/>
+        <p:txBody>
+          <a:bodyPr/>
+          <a:lstStyle/>
+          <a:p>
+            <a:fld id="{5C6BB475-B640-4DD3-A1AA-1CF10A44AA06}" type="slidenum">
+              <a:rPr lang="en-US" smtClean="0"/>
+              <a:t>2</a:t>
+            </a:fld>
+            <a:endParaRPr lang="en-US"/>
+          </a:p>
+        </p:txBody>
+      </p:sp>
+      <p:sp>
+        <p:nvSpPr>
+          <p:cNvPr id="7" name="TextBox 6"/>
+          <p:cNvSpPr txBox="1"/>
+          <p:nvPr/>
+        </p:nvSpPr>
+        <p:spPr>
+          <a:xfrm>
+            <a:off x="5046208" y="5884727"/>
+            <a:ext cx="3009222" cy="369332"/>
+          </a:xfrm>
+          <a:prstGeom prst="rect">
+            <a:avLst/>
+          </a:prstGeom>
+          <a:noFill/>
+        </p:spPr>
+        <p:txBody>
+          <a:bodyPr wrap="none" rtlCol="0">
+            <a:spAutoFit/>
+          </a:bodyPr>
+          <a:lstStyle/>
+          <a:p>
+            <a:r>
+              <a:rPr lang="en-US" dirty="0" smtClean="0"/>
+              <a:t>Figure 1. Project Organization</a:t>
+            </a:r>
+            <a:endParaRPr lang="en-US" dirty="0"/>
+          </a:p>
+        </p:txBody>
+      </p:sp>
+    </p:spTree>
+    <p:extLst>
+      <p:ext uri="{BB962C8B-B14F-4D97-AF65-F5344CB8AC3E}">
+        <p14:creationId xmlns:p14="http://schemas.microsoft.com/office/powerpoint/2010/main" val="1628288518"/>
+      </p:ext>
+    </p:extLst>
+  </p:cSld>
+  <p:clrMapOvr>
+    <a:masterClrMapping/>
+  </p:clrMapOvr>
+  <p:timing>
+    <p:tnLst>
+      <p:par>
+        <p:cTn id="1" dur="indefinite" restart="never" nodeType="tmRoot"/>
+      </p:par>
+    </p:tnLst>
+  </p:timing>
+</p:sld>
+</file>
+
+<file path=ppt/slides/slide20.xml><?xml version="1.0" encoding="utf-8"?>
+<p:sld xmlns:a="http://schemas.openxmlformats.org/drawingml/2006/main" xmlns:r="http://schemas.openxmlformats.org/officeDocument/2006/relationships" xmlns:p="http://schemas.openxmlformats.org/presentationml/2006/main">
+  <p:cSld>
+    <p:spTree>
+      <p:nvGrpSpPr>
+        <p:cNvPr id="1" name=""/>
+        <p:cNvGrpSpPr/>
+        <p:nvPr/>
+      </p:nvGrpSpPr>
+      <p:grpSpPr>
+        <a:xfrm>
+          <a:off x="0" y="0"/>
+          <a:ext cx="0" cy="0"/>
+          <a:chOff x="0" y="0"/>
+          <a:chExt cx="0" cy="0"/>
+        </a:xfrm>
+      </p:grpSpPr>
+      <p:sp>
+        <p:nvSpPr>
+          <p:cNvPr id="2" name="Title 1"/>
+          <p:cNvSpPr>
+            <a:spLocks noGrp="1"/>
+          </p:cNvSpPr>
+          <p:nvPr>
+            <p:ph type="title"/>
+          </p:nvPr>
+        </p:nvSpPr>
+        <p:spPr/>
+        <p:txBody>
+          <a:bodyPr/>
+          <a:lstStyle/>
+          <a:p>
+            <a:r>
+              <a:rPr lang="en-US" dirty="0" smtClean="0"/>
+              <a:t>Summary</a:t>
+            </a:r>
+            <a:endParaRPr lang="en-US" dirty="0"/>
+          </a:p>
+        </p:txBody>
+      </p:sp>
+      <p:sp>
+        <p:nvSpPr>
+          <p:cNvPr id="3" name="Content Placeholder 2"/>
+          <p:cNvSpPr>
+            <a:spLocks noGrp="1"/>
+          </p:cNvSpPr>
+          <p:nvPr>
+            <p:ph idx="1"/>
+          </p:nvPr>
+        </p:nvSpPr>
+        <p:spPr/>
+        <p:txBody>
+          <a:bodyPr>
+            <a:normAutofit fontScale="92500" lnSpcReduction="20000"/>
+          </a:bodyPr>
+          <a:lstStyle/>
+          <a:p>
+            <a:pPr marL="0" indent="0" fontAlgn="base">
+              <a:buNone/>
+            </a:pPr>
+            <a:r>
+              <a:rPr lang="en-US" dirty="0"/>
+              <a:t>Problem Statement</a:t>
+            </a:r>
+          </a:p>
+          <a:p>
+            <a:pPr lvl="1" fontAlgn="base"/>
+            <a:r>
+              <a:rPr lang="en-US" dirty="0"/>
+              <a:t>Current hobbyist 3D printers are imprecise and fault-prone</a:t>
+            </a:r>
+          </a:p>
+          <a:p>
+            <a:pPr lvl="1" fontAlgn="base"/>
+            <a:r>
+              <a:rPr lang="en-US" dirty="0"/>
+              <a:t>High resolution additive manufacturing is currently not accessible for hobbyists (under $1,000)</a:t>
+            </a:r>
+          </a:p>
+          <a:p>
+            <a:pPr lvl="1" fontAlgn="base"/>
+            <a:r>
+              <a:rPr lang="en-US" dirty="0"/>
+              <a:t>Available PAM systems use proprietary hardware and software</a:t>
+            </a:r>
+          </a:p>
+          <a:p>
+            <a:pPr marL="0" indent="0" fontAlgn="base">
+              <a:buNone/>
+            </a:pPr>
+            <a:r>
+              <a:rPr lang="en-US" dirty="0"/>
+              <a:t>Our Solution</a:t>
+            </a:r>
+          </a:p>
+          <a:p>
+            <a:pPr lvl="1"/>
+            <a:r>
+              <a:rPr lang="en-US" dirty="0"/>
+              <a:t>A DLP PAM system can produce high quality and fast prints</a:t>
+            </a:r>
+          </a:p>
+          <a:p>
+            <a:pPr lvl="1"/>
+            <a:r>
+              <a:rPr lang="en-US" dirty="0"/>
+              <a:t>Use off-the-shelf open-source hardware</a:t>
+            </a:r>
+          </a:p>
+          <a:p>
+            <a:pPr lvl="1"/>
+            <a:r>
+              <a:rPr lang="en-US" dirty="0"/>
+              <a:t>Create a thoroughly documented reference </a:t>
+            </a:r>
+            <a:r>
+              <a:rPr lang="en-US" dirty="0" smtClean="0"/>
+              <a:t>design</a:t>
+            </a:r>
+            <a:endParaRPr lang="en-US" dirty="0"/>
+          </a:p>
+        </p:txBody>
+      </p:sp>
+      <p:sp>
+        <p:nvSpPr>
+          <p:cNvPr id="4" name="Slide Number Placeholder 3"/>
+          <p:cNvSpPr>
+            <a:spLocks noGrp="1"/>
+          </p:cNvSpPr>
+          <p:nvPr>
+            <p:ph type="sldNum" sz="quarter" idx="12"/>
+          </p:nvPr>
+        </p:nvSpPr>
+        <p:spPr/>
+        <p:txBody>
+          <a:bodyPr/>
+          <a:lstStyle/>
+          <a:p>
+            <a:fld id="{5C6BB475-B640-4DD3-A1AA-1CF10A44AA06}" type="slidenum">
+              <a:rPr lang="en-US" smtClean="0"/>
+              <a:t>20</a:t>
+            </a:fld>
+            <a:endParaRPr lang="en-US"/>
+          </a:p>
+        </p:txBody>
+      </p:sp>
+    </p:spTree>
+    <p:extLst>
+      <p:ext uri="{BB962C8B-B14F-4D97-AF65-F5344CB8AC3E}">
+        <p14:creationId xmlns:p14="http://schemas.microsoft.com/office/powerpoint/2010/main" val="2150469081"/>
+      </p:ext>
+    </p:extLst>
+  </p:cSld>
+  <p:clrMapOvr>
+    <a:masterClrMapping/>
+  </p:clrMapOvr>
+  <p:timing>
+    <p:tnLst>
+      <p:par>
+        <p:cTn id="1" dur="indefinite" restart="never" nodeType="tmRoot"/>
+      </p:par>
+    </p:tnLst>
+  </p:timing>
+</p:sld>
+</file>
+
 <file path=ppt/slides/slide21.xml><?xml version="1.0" encoding="utf-8"?>
 <p:sld xmlns:a="http://schemas.openxmlformats.org/drawingml/2006/main" xmlns:r="http://schemas.openxmlformats.org/officeDocument/2006/relationships" xmlns:p="http://schemas.openxmlformats.org/presentationml/2006/main">
   <p:cSld>
@@ -8536,95 +9949,1117 @@
           <a:p>
             <a:r>
               <a:rPr lang="en-US" dirty="0" smtClean="0"/>
-              <a:t>Summary</a:t>
+              <a:t>Acknowledgements	</a:t>
             </a:r>
             <a:endParaRPr lang="en-US" dirty="0"/>
           </a:p>
         </p:txBody>
       </p:sp>
-      <p:sp>
-        <p:nvSpPr>
-          <p:cNvPr id="3" name="Content Placeholder 2"/>
-          <p:cNvSpPr>
-            <a:spLocks noGrp="1"/>
-          </p:cNvSpPr>
+      <p:graphicFrame>
+        <p:nvGraphicFramePr>
+          <p:cNvPr id="5" name="Content Placeholder 4"/>
+          <p:cNvGraphicFramePr>
+            <a:graphicFrameLocks noGrp="1"/>
+          </p:cNvGraphicFramePr>
           <p:nvPr>
             <p:ph idx="1"/>
-          </p:nvPr>
-        </p:nvSpPr>
-        <p:spPr/>
-        <p:txBody>
-          <a:bodyPr>
-            <a:normAutofit fontScale="92500" lnSpcReduction="20000"/>
-          </a:bodyPr>
-          <a:lstStyle/>
-          <a:p>
-            <a:pPr marL="0" indent="0" fontAlgn="base">
-              <a:buNone/>
-            </a:pPr>
-            <a:r>
-              <a:rPr lang="en-US" dirty="0"/>
-              <a:t>Problem Statement</a:t>
-            </a:r>
-          </a:p>
-          <a:p>
-            <a:pPr lvl="1" fontAlgn="base"/>
-            <a:r>
-              <a:rPr lang="en-US" dirty="0"/>
-              <a:t>Current hobbyist 3D printers are imprecise and fault-prone</a:t>
-            </a:r>
-          </a:p>
-          <a:p>
-            <a:pPr lvl="1" fontAlgn="base"/>
-            <a:r>
-              <a:rPr lang="en-US" dirty="0"/>
-              <a:t>High resolution additive manufacturing is currently not accessible for hobbyists (under $1,000)</a:t>
-            </a:r>
-          </a:p>
-          <a:p>
-            <a:pPr lvl="1" fontAlgn="base"/>
-            <a:r>
-              <a:rPr lang="en-US" dirty="0"/>
-              <a:t>Available PAM systems use proprietary hardware and software</a:t>
-            </a:r>
-          </a:p>
-          <a:p>
-            <a:pPr marL="0" indent="0" fontAlgn="base">
-              <a:buNone/>
-            </a:pPr>
-            <a:r>
-              <a:rPr lang="en-US" dirty="0"/>
-              <a:t>Our Solution</a:t>
-            </a:r>
-          </a:p>
-          <a:p>
-            <a:pPr lvl="1"/>
-            <a:r>
-              <a:rPr lang="en-US" dirty="0"/>
-              <a:t>A DLP PAM system can produce high quality and fast prints</a:t>
-            </a:r>
-          </a:p>
-          <a:p>
-            <a:pPr lvl="1"/>
-            <a:r>
-              <a:rPr lang="en-US" dirty="0"/>
-              <a:t>Use off-the-shelf open-source hardware</a:t>
-            </a:r>
-          </a:p>
-          <a:p>
-            <a:pPr lvl="1"/>
-            <a:r>
-              <a:rPr lang="en-US" dirty="0"/>
-              <a:t>Create a thoroughly documented reference </a:t>
-            </a:r>
-            <a:r>
-              <a:rPr lang="en-US" dirty="0" smtClean="0"/>
-              <a:t>design</a:t>
-            </a:r>
-            <a:endParaRPr lang="en-US" dirty="0"/>
-          </a:p>
-        </p:txBody>
-      </p:sp>
+            <p:extLst/>
+          </p:nvPr>
+        </p:nvGraphicFramePr>
+        <p:xfrm>
+          <a:off x="2808407" y="2366742"/>
+          <a:ext cx="7513068" cy="2359804"/>
+        </p:xfrm>
+        <a:graphic>
+          <a:graphicData uri="http://schemas.openxmlformats.org/drawingml/2006/table">
+            <a:tbl>
+              <a:tblPr>
+                <a:effectLst/>
+                <a:tableStyleId>{5C22544A-7EE6-4342-B048-85BDC9FD1C3A}</a:tableStyleId>
+              </a:tblPr>
+              <a:tblGrid>
+                <a:gridCol w="2240111"/>
+                <a:gridCol w="2640169"/>
+                <a:gridCol w="2632788"/>
+              </a:tblGrid>
+              <a:tr h="300860">
+                <a:tc>
+                  <a:txBody>
+                    <a:bodyPr/>
+                    <a:lstStyle/>
+                    <a:p>
+                      <a:r>
+                        <a:rPr lang="en-US" sz="1800" b="0" kern="1200" dirty="0" smtClean="0">
+                          <a:solidFill>
+                            <a:schemeClr val="tx1"/>
+                          </a:solidFill>
+                          <a:effectLst/>
+                          <a:latin typeface="+mn-lt"/>
+                          <a:ea typeface="+mn-ea"/>
+                          <a:cs typeface="+mn-cs"/>
+                        </a:rPr>
+                        <a:t>Dr. Spyros </a:t>
+                      </a:r>
+                      <a:r>
+                        <a:rPr lang="en-US" sz="1800" b="0" kern="1200" dirty="0" err="1" smtClean="0">
+                          <a:solidFill>
+                            <a:schemeClr val="tx1"/>
+                          </a:solidFill>
+                          <a:effectLst/>
+                          <a:latin typeface="+mn-lt"/>
+                          <a:ea typeface="+mn-ea"/>
+                          <a:cs typeface="+mn-cs"/>
+                        </a:rPr>
+                        <a:t>Tragoudas</a:t>
+                      </a:r>
+                      <a:r>
+                        <a:rPr lang="en-US" sz="1800" b="0" kern="1200" dirty="0" smtClean="0">
+                          <a:solidFill>
+                            <a:schemeClr val="tx1"/>
+                          </a:solidFill>
+                          <a:effectLst/>
+                          <a:latin typeface="+mn-lt"/>
+                          <a:ea typeface="+mn-ea"/>
+                          <a:cs typeface="+mn-cs"/>
+                        </a:rPr>
+                        <a:t> </a:t>
+                      </a:r>
+                      <a:endParaRPr lang="en-US" b="0" dirty="0">
+                        <a:solidFill>
+                          <a:schemeClr val="tx1"/>
+                        </a:solidFill>
+                      </a:endParaRPr>
+                    </a:p>
+                  </a:txBody>
+                  <a:tcPr>
+                    <a:lnL w="12700" cmpd="sng">
+                      <a:noFill/>
+                    </a:lnL>
+                    <a:lnR w="12700" cmpd="sng">
+                      <a:noFill/>
+                    </a:lnR>
+                    <a:lnT w="12700" cmpd="sng">
+                      <a:noFill/>
+                    </a:lnT>
+                    <a:lnB w="12700" cmpd="sng">
+                      <a:noFill/>
+                    </a:lnB>
+                    <a:lnTlToBr w="12700" cmpd="sng">
+                      <a:noFill/>
+                      <a:prstDash val="solid"/>
+                    </a:lnTlToBr>
+                    <a:lnBlToTr w="12700" cmpd="sng">
+                      <a:noFill/>
+                      <a:prstDash val="solid"/>
+                    </a:lnBlToTr>
+                    <a:noFill/>
+                  </a:tcPr>
+                </a:tc>
+                <a:tc>
+                  <a:txBody>
+                    <a:bodyPr/>
+                    <a:lstStyle/>
+                    <a:p>
+                      <a:r>
+                        <a:rPr lang="en-US" sz="1800" b="0" kern="1200" dirty="0" smtClean="0">
+                          <a:solidFill>
+                            <a:schemeClr val="tx1"/>
+                          </a:solidFill>
+                          <a:effectLst/>
+                          <a:latin typeface="+mn-lt"/>
+                          <a:ea typeface="+mn-ea"/>
+                          <a:cs typeface="+mn-cs"/>
+                        </a:rPr>
+                        <a:t>Dr. </a:t>
+                      </a:r>
+                      <a:r>
+                        <a:rPr lang="en-US" sz="1800" b="0" kern="1200" dirty="0" err="1" smtClean="0">
+                          <a:solidFill>
+                            <a:schemeClr val="tx1"/>
+                          </a:solidFill>
+                          <a:effectLst/>
+                          <a:latin typeface="+mn-lt"/>
+                          <a:ea typeface="+mn-ea"/>
+                          <a:cs typeface="+mn-cs"/>
+                        </a:rPr>
+                        <a:t>Tod</a:t>
+                      </a:r>
+                      <a:r>
+                        <a:rPr lang="en-US" sz="1800" b="0" kern="1200" dirty="0" smtClean="0">
+                          <a:solidFill>
+                            <a:schemeClr val="tx1"/>
+                          </a:solidFill>
+                          <a:effectLst/>
+                          <a:latin typeface="+mn-lt"/>
+                          <a:ea typeface="+mn-ea"/>
+                          <a:cs typeface="+mn-cs"/>
+                        </a:rPr>
+                        <a:t> </a:t>
+                      </a:r>
+                      <a:r>
+                        <a:rPr lang="en-US" sz="1800" b="0" kern="1200" dirty="0" err="1" smtClean="0">
+                          <a:solidFill>
+                            <a:schemeClr val="tx1"/>
+                          </a:solidFill>
+                          <a:effectLst/>
+                          <a:latin typeface="+mn-lt"/>
+                          <a:ea typeface="+mn-ea"/>
+                          <a:cs typeface="+mn-cs"/>
+                        </a:rPr>
+                        <a:t>Policandriotes</a:t>
+                      </a:r>
+                      <a:endParaRPr lang="en-US" b="0" dirty="0">
+                        <a:solidFill>
+                          <a:schemeClr val="tx1"/>
+                        </a:solidFill>
+                      </a:endParaRPr>
+                    </a:p>
+                  </a:txBody>
+                  <a:tcPr>
+                    <a:lnL w="12700" cmpd="sng">
+                      <a:noFill/>
+                    </a:lnL>
+                    <a:lnR w="12700" cmpd="sng">
+                      <a:noFill/>
+                    </a:lnR>
+                    <a:lnT w="12700" cmpd="sng">
+                      <a:noFill/>
+                    </a:lnT>
+                    <a:lnB w="12700" cmpd="sng">
+                      <a:noFill/>
+                    </a:lnB>
+                    <a:lnTlToBr w="12700" cmpd="sng">
+                      <a:noFill/>
+                      <a:prstDash val="solid"/>
+                    </a:lnTlToBr>
+                    <a:lnBlToTr w="12700" cmpd="sng">
+                      <a:noFill/>
+                      <a:prstDash val="solid"/>
+                    </a:lnBlToTr>
+                    <a:noFill/>
+                  </a:tcPr>
+                </a:tc>
+                <a:tc>
+                  <a:txBody>
+                    <a:bodyPr/>
+                    <a:lstStyle/>
+                    <a:p>
+                      <a:r>
+                        <a:rPr lang="en-US" sz="1800" b="0" kern="1200" dirty="0" err="1" smtClean="0">
+                          <a:solidFill>
+                            <a:schemeClr val="tx1"/>
+                          </a:solidFill>
+                          <a:effectLst/>
+                          <a:latin typeface="+mn-lt"/>
+                          <a:ea typeface="+mn-ea"/>
+                          <a:cs typeface="+mn-cs"/>
+                        </a:rPr>
+                        <a:t>Lakendria</a:t>
+                      </a:r>
+                      <a:r>
+                        <a:rPr lang="en-US" sz="1800" b="0" kern="1200" dirty="0" smtClean="0">
+                          <a:solidFill>
+                            <a:schemeClr val="tx1"/>
+                          </a:solidFill>
+                          <a:effectLst/>
+                          <a:latin typeface="+mn-lt"/>
+                          <a:ea typeface="+mn-ea"/>
+                          <a:cs typeface="+mn-cs"/>
+                        </a:rPr>
+                        <a:t> Kenner </a:t>
+                      </a:r>
+                      <a:endParaRPr lang="en-US" b="0" dirty="0">
+                        <a:solidFill>
+                          <a:schemeClr val="tx1"/>
+                        </a:solidFill>
+                      </a:endParaRPr>
+                    </a:p>
+                  </a:txBody>
+                  <a:tcPr>
+                    <a:lnL w="12700" cmpd="sng">
+                      <a:noFill/>
+                    </a:lnL>
+                    <a:lnR w="12700" cmpd="sng">
+                      <a:noFill/>
+                    </a:lnR>
+                    <a:lnT w="12700" cmpd="sng">
+                      <a:noFill/>
+                    </a:lnT>
+                    <a:lnB w="12700" cmpd="sng">
+                      <a:noFill/>
+                    </a:lnB>
+                    <a:lnTlToBr w="12700" cmpd="sng">
+                      <a:noFill/>
+                      <a:prstDash val="solid"/>
+                    </a:lnTlToBr>
+                    <a:lnBlToTr w="12700" cmpd="sng">
+                      <a:noFill/>
+                      <a:prstDash val="solid"/>
+                    </a:lnBlToTr>
+                    <a:noFill/>
+                  </a:tcPr>
+                </a:tc>
+              </a:tr>
+              <a:tr h="448580">
+                <a:tc>
+                  <a:txBody>
+                    <a:bodyPr/>
+                    <a:lstStyle/>
+                    <a:p>
+                      <a:r>
+                        <a:rPr lang="en-US" b="0" dirty="0" smtClean="0">
+                          <a:solidFill>
+                            <a:schemeClr val="tx1"/>
+                          </a:solidFill>
+                        </a:rPr>
+                        <a:t>Dr. </a:t>
+                      </a:r>
+                      <a:r>
+                        <a:rPr lang="en-US" b="0" dirty="0" err="1" smtClean="0">
+                          <a:solidFill>
+                            <a:schemeClr val="tx1"/>
+                          </a:solidFill>
+                        </a:rPr>
+                        <a:t>Rasit</a:t>
+                      </a:r>
+                      <a:r>
+                        <a:rPr lang="en-US" b="0" dirty="0" smtClean="0">
+                          <a:solidFill>
+                            <a:schemeClr val="tx1"/>
+                          </a:solidFill>
+                        </a:rPr>
+                        <a:t> </a:t>
+                      </a:r>
+                      <a:r>
+                        <a:rPr lang="en-US" b="0" dirty="0" err="1" smtClean="0">
+                          <a:solidFill>
+                            <a:schemeClr val="tx1"/>
+                          </a:solidFill>
+                        </a:rPr>
+                        <a:t>Koc</a:t>
+                      </a:r>
+                      <a:r>
+                        <a:rPr lang="en-US" b="0" dirty="0" smtClean="0">
+                          <a:solidFill>
+                            <a:schemeClr val="tx1"/>
+                          </a:solidFill>
+                        </a:rPr>
+                        <a:t> </a:t>
+                      </a:r>
+                      <a:endParaRPr lang="en-US" b="0" dirty="0">
+                        <a:solidFill>
+                          <a:schemeClr val="tx1"/>
+                        </a:solidFill>
+                      </a:endParaRPr>
+                    </a:p>
+                  </a:txBody>
+                  <a:tcPr>
+                    <a:lnL w="12700" cmpd="sng">
+                      <a:noFill/>
+                    </a:lnL>
+                    <a:lnR w="12700" cmpd="sng">
+                      <a:noFill/>
+                    </a:lnR>
+                    <a:lnT w="12700" cmpd="sng">
+                      <a:noFill/>
+                    </a:lnT>
+                    <a:lnB w="12700" cmpd="sng">
+                      <a:noFill/>
+                    </a:lnB>
+                    <a:lnTlToBr w="12700" cmpd="sng">
+                      <a:noFill/>
+                      <a:prstDash val="solid"/>
+                    </a:lnTlToBr>
+                    <a:lnBlToTr w="12700" cmpd="sng">
+                      <a:noFill/>
+                      <a:prstDash val="solid"/>
+                    </a:lnBlToTr>
+                    <a:noFill/>
+                  </a:tcPr>
+                </a:tc>
+                <a:tc>
+                  <a:txBody>
+                    <a:bodyPr/>
+                    <a:lstStyle/>
+                    <a:p>
+                      <a:r>
+                        <a:rPr lang="en-US" sz="1800" b="0" kern="1200" dirty="0" smtClean="0">
+                          <a:solidFill>
+                            <a:schemeClr val="tx1"/>
+                          </a:solidFill>
+                          <a:effectLst/>
+                          <a:latin typeface="+mn-lt"/>
+                          <a:ea typeface="+mn-ea"/>
+                          <a:cs typeface="+mn-cs"/>
+                        </a:rPr>
+                        <a:t>Dr. </a:t>
+                      </a:r>
+                      <a:r>
+                        <a:rPr lang="en-US" sz="1800" b="0" kern="1200" dirty="0" err="1" smtClean="0">
+                          <a:solidFill>
+                            <a:schemeClr val="tx1"/>
+                          </a:solidFill>
+                          <a:effectLst/>
+                          <a:latin typeface="+mn-lt"/>
+                          <a:ea typeface="+mn-ea"/>
+                          <a:cs typeface="+mn-cs"/>
+                        </a:rPr>
+                        <a:t>Vidya</a:t>
+                      </a:r>
+                      <a:r>
+                        <a:rPr lang="en-US" sz="1800" b="0" kern="1200" dirty="0" smtClean="0">
+                          <a:solidFill>
+                            <a:schemeClr val="tx1"/>
+                          </a:solidFill>
+                          <a:effectLst/>
+                          <a:latin typeface="+mn-lt"/>
+                          <a:ea typeface="+mn-ea"/>
+                          <a:cs typeface="+mn-cs"/>
+                        </a:rPr>
+                        <a:t> Singh-Gupta</a:t>
+                      </a:r>
+                      <a:endParaRPr lang="en-US" b="0" dirty="0">
+                        <a:solidFill>
+                          <a:schemeClr val="tx1"/>
+                        </a:solidFill>
+                      </a:endParaRPr>
+                    </a:p>
+                  </a:txBody>
+                  <a:tcPr>
+                    <a:lnL w="12700" cmpd="sng">
+                      <a:noFill/>
+                    </a:lnL>
+                    <a:lnR w="12700" cmpd="sng">
+                      <a:noFill/>
+                    </a:lnR>
+                    <a:lnT w="12700" cmpd="sng">
+                      <a:noFill/>
+                    </a:lnT>
+                    <a:lnB w="12700" cmpd="sng">
+                      <a:noFill/>
+                    </a:lnB>
+                    <a:lnTlToBr w="12700" cmpd="sng">
+                      <a:noFill/>
+                      <a:prstDash val="solid"/>
+                    </a:lnTlToBr>
+                    <a:lnBlToTr w="12700" cmpd="sng">
+                      <a:noFill/>
+                      <a:prstDash val="solid"/>
+                    </a:lnBlToTr>
+                    <a:noFill/>
+                  </a:tcPr>
+                </a:tc>
+                <a:tc>
+                  <a:txBody>
+                    <a:bodyPr/>
+                    <a:lstStyle/>
+                    <a:p>
+                      <a:r>
+                        <a:rPr lang="en-US" sz="1800" b="0" kern="1200" dirty="0" smtClean="0">
+                          <a:solidFill>
+                            <a:schemeClr val="tx1"/>
+                          </a:solidFill>
+                          <a:effectLst/>
+                          <a:latin typeface="+mn-lt"/>
+                          <a:ea typeface="+mn-ea"/>
+                          <a:cs typeface="+mn-cs"/>
+                        </a:rPr>
+                        <a:t>Scott J. Grunewald </a:t>
+                      </a:r>
+                      <a:endParaRPr lang="en-US" b="0" dirty="0">
+                        <a:solidFill>
+                          <a:schemeClr val="tx1"/>
+                        </a:solidFill>
+                      </a:endParaRPr>
+                    </a:p>
+                  </a:txBody>
+                  <a:tcPr>
+                    <a:lnL w="12700" cmpd="sng">
+                      <a:noFill/>
+                    </a:lnL>
+                    <a:lnR w="12700" cmpd="sng">
+                      <a:noFill/>
+                    </a:lnR>
+                    <a:lnT w="12700" cmpd="sng">
+                      <a:noFill/>
+                    </a:lnT>
+                    <a:lnB w="12700" cmpd="sng">
+                      <a:noFill/>
+                    </a:lnB>
+                    <a:lnTlToBr w="12700" cmpd="sng">
+                      <a:noFill/>
+                      <a:prstDash val="solid"/>
+                    </a:lnTlToBr>
+                    <a:lnBlToTr w="12700" cmpd="sng">
+                      <a:noFill/>
+                      <a:prstDash val="solid"/>
+                    </a:lnBlToTr>
+                    <a:noFill/>
+                  </a:tcPr>
+                </a:tc>
+              </a:tr>
+              <a:tr h="386366">
+                <a:tc>
+                  <a:txBody>
+                    <a:bodyPr/>
+                    <a:lstStyle/>
+                    <a:p>
+                      <a:r>
+                        <a:rPr lang="en-US" b="0" dirty="0" smtClean="0">
+                          <a:solidFill>
+                            <a:schemeClr val="tx1"/>
+                          </a:solidFill>
+                        </a:rPr>
+                        <a:t>Dr. Lizette Chevalier </a:t>
+                      </a:r>
+                      <a:endParaRPr lang="en-US" b="0" dirty="0">
+                        <a:solidFill>
+                          <a:schemeClr val="tx1"/>
+                        </a:solidFill>
+                      </a:endParaRPr>
+                    </a:p>
+                  </a:txBody>
+                  <a:tcPr>
+                    <a:lnL w="12700" cmpd="sng">
+                      <a:noFill/>
+                    </a:lnL>
+                    <a:lnR w="12700" cmpd="sng">
+                      <a:noFill/>
+                    </a:lnR>
+                    <a:lnT w="12700" cmpd="sng">
+                      <a:noFill/>
+                    </a:lnT>
+                    <a:lnB w="12700" cmpd="sng">
+                      <a:noFill/>
+                    </a:lnB>
+                    <a:lnTlToBr w="12700" cmpd="sng">
+                      <a:noFill/>
+                      <a:prstDash val="solid"/>
+                    </a:lnTlToBr>
+                    <a:lnBlToTr w="12700" cmpd="sng">
+                      <a:noFill/>
+                      <a:prstDash val="solid"/>
+                    </a:lnBlToTr>
+                    <a:noFill/>
+                  </a:tcPr>
+                </a:tc>
+                <a:tc>
+                  <a:txBody>
+                    <a:bodyPr/>
+                    <a:lstStyle/>
+                    <a:p>
+                      <a:r>
+                        <a:rPr lang="en-US" sz="1800" b="0" kern="1200" dirty="0" smtClean="0">
+                          <a:solidFill>
+                            <a:schemeClr val="tx1"/>
+                          </a:solidFill>
+                          <a:effectLst/>
+                          <a:latin typeface="+mn-lt"/>
+                          <a:ea typeface="+mn-ea"/>
+                          <a:cs typeface="+mn-cs"/>
+                        </a:rPr>
+                        <a:t>Dr. Frances </a:t>
+                      </a:r>
+                      <a:r>
+                        <a:rPr lang="en-US" sz="1800" b="0" kern="1200" dirty="0" err="1" smtClean="0">
+                          <a:solidFill>
+                            <a:schemeClr val="tx1"/>
+                          </a:solidFill>
+                          <a:effectLst/>
+                          <a:latin typeface="+mn-lt"/>
+                          <a:ea typeface="+mn-ea"/>
+                          <a:cs typeface="+mn-cs"/>
+                        </a:rPr>
+                        <a:t>Harackiewicz</a:t>
+                      </a:r>
+                      <a:endParaRPr lang="en-US" b="0" dirty="0">
+                        <a:solidFill>
+                          <a:schemeClr val="tx1"/>
+                        </a:solidFill>
+                      </a:endParaRPr>
+                    </a:p>
+                  </a:txBody>
+                  <a:tcPr>
+                    <a:lnL w="12700" cmpd="sng">
+                      <a:noFill/>
+                    </a:lnL>
+                    <a:lnR w="12700" cmpd="sng">
+                      <a:noFill/>
+                    </a:lnR>
+                    <a:lnT w="12700" cmpd="sng">
+                      <a:noFill/>
+                    </a:lnT>
+                    <a:lnB w="12700" cmpd="sng">
+                      <a:noFill/>
+                    </a:lnB>
+                    <a:lnTlToBr w="12700" cmpd="sng">
+                      <a:noFill/>
+                      <a:prstDash val="solid"/>
+                    </a:lnTlToBr>
+                    <a:lnBlToTr w="12700" cmpd="sng">
+                      <a:noFill/>
+                      <a:prstDash val="solid"/>
+                    </a:lnBlToTr>
+                    <a:noFill/>
+                  </a:tcPr>
+                </a:tc>
+                <a:tc>
+                  <a:txBody>
+                    <a:bodyPr/>
+                    <a:lstStyle/>
+                    <a:p>
+                      <a:r>
+                        <a:rPr lang="en-US" sz="1800" b="0" kern="1200" dirty="0" smtClean="0">
+                          <a:solidFill>
+                            <a:schemeClr val="tx1"/>
+                          </a:solidFill>
+                          <a:effectLst/>
+                          <a:latin typeface="+mn-lt"/>
+                          <a:ea typeface="+mn-ea"/>
+                          <a:cs typeface="+mn-cs"/>
+                        </a:rPr>
+                        <a:t>Eddie </a:t>
+                      </a:r>
+                      <a:r>
+                        <a:rPr lang="en-US" sz="1800" b="0" kern="1200" dirty="0" err="1" smtClean="0">
+                          <a:solidFill>
+                            <a:schemeClr val="tx1"/>
+                          </a:solidFill>
+                          <a:effectLst/>
+                          <a:latin typeface="+mn-lt"/>
+                          <a:ea typeface="+mn-ea"/>
+                          <a:cs typeface="+mn-cs"/>
+                        </a:rPr>
+                        <a:t>Krassenstein</a:t>
+                      </a:r>
+                      <a:r>
+                        <a:rPr lang="en-US" sz="1800" b="0" kern="1200" dirty="0" smtClean="0">
+                          <a:solidFill>
+                            <a:schemeClr val="tx1"/>
+                          </a:solidFill>
+                          <a:effectLst/>
+                          <a:latin typeface="+mn-lt"/>
+                          <a:ea typeface="+mn-ea"/>
+                          <a:cs typeface="+mn-cs"/>
+                        </a:rPr>
+                        <a:t> </a:t>
+                      </a:r>
+                      <a:endParaRPr lang="en-US" b="0" dirty="0">
+                        <a:solidFill>
+                          <a:schemeClr val="tx1"/>
+                        </a:solidFill>
+                      </a:endParaRPr>
+                    </a:p>
+                  </a:txBody>
+                  <a:tcPr>
+                    <a:lnL w="12700" cmpd="sng">
+                      <a:noFill/>
+                    </a:lnL>
+                    <a:lnR w="12700" cmpd="sng">
+                      <a:noFill/>
+                    </a:lnR>
+                    <a:lnT w="12700" cmpd="sng">
+                      <a:noFill/>
+                    </a:lnT>
+                    <a:lnB w="12700" cmpd="sng">
+                      <a:noFill/>
+                    </a:lnB>
+                    <a:lnTlToBr w="12700" cmpd="sng">
+                      <a:noFill/>
+                      <a:prstDash val="solid"/>
+                    </a:lnTlToBr>
+                    <a:lnBlToTr w="12700" cmpd="sng">
+                      <a:noFill/>
+                      <a:prstDash val="solid"/>
+                    </a:lnBlToTr>
+                    <a:noFill/>
+                  </a:tcPr>
+                </a:tc>
+              </a:tr>
+              <a:tr h="399245">
+                <a:tc>
+                  <a:txBody>
+                    <a:bodyPr/>
+                    <a:lstStyle/>
+                    <a:p>
+                      <a:r>
+                        <a:rPr lang="en-US" sz="1800" b="0" kern="1200" dirty="0" smtClean="0">
+                          <a:solidFill>
+                            <a:schemeClr val="tx1"/>
+                          </a:solidFill>
+                          <a:effectLst/>
+                          <a:latin typeface="+mn-lt"/>
+                          <a:ea typeface="+mn-ea"/>
+                          <a:cs typeface="+mn-cs"/>
+                        </a:rPr>
+                        <a:t>Dr. James Mathias </a:t>
+                      </a:r>
+                      <a:endParaRPr lang="en-US" b="0" dirty="0">
+                        <a:solidFill>
+                          <a:schemeClr val="tx1"/>
+                        </a:solidFill>
+                      </a:endParaRPr>
+                    </a:p>
+                  </a:txBody>
+                  <a:tcPr>
+                    <a:lnL w="12700" cmpd="sng">
+                      <a:noFill/>
+                    </a:lnL>
+                    <a:lnR w="12700" cmpd="sng">
+                      <a:noFill/>
+                    </a:lnR>
+                    <a:lnT w="12700" cmpd="sng">
+                      <a:noFill/>
+                    </a:lnT>
+                    <a:lnB w="12700" cmpd="sng">
+                      <a:noFill/>
+                    </a:lnB>
+                    <a:lnTlToBr w="12700" cmpd="sng">
+                      <a:noFill/>
+                      <a:prstDash val="solid"/>
+                    </a:lnTlToBr>
+                    <a:lnBlToTr w="12700" cmpd="sng">
+                      <a:noFill/>
+                      <a:prstDash val="solid"/>
+                    </a:lnBlToTr>
+                    <a:noFill/>
+                  </a:tcPr>
+                </a:tc>
+                <a:tc>
+                  <a:txBody>
+                    <a:bodyPr/>
+                    <a:lstStyle/>
+                    <a:p>
+                      <a:r>
+                        <a:rPr lang="en-US" sz="1800" b="0" kern="1200" dirty="0" smtClean="0">
+                          <a:solidFill>
+                            <a:schemeClr val="tx1"/>
+                          </a:solidFill>
+                          <a:effectLst/>
+                          <a:latin typeface="+mn-lt"/>
+                          <a:ea typeface="+mn-ea"/>
+                          <a:cs typeface="+mn-cs"/>
+                        </a:rPr>
+                        <a:t>Dr. Alan J. Weston </a:t>
+                      </a:r>
+                      <a:endParaRPr lang="en-US" b="0" dirty="0">
+                        <a:solidFill>
+                          <a:schemeClr val="tx1"/>
+                        </a:solidFill>
+                      </a:endParaRPr>
+                    </a:p>
+                  </a:txBody>
+                  <a:tcPr>
+                    <a:lnL w="12700" cmpd="sng">
+                      <a:noFill/>
+                    </a:lnL>
+                    <a:lnR w="12700" cmpd="sng">
+                      <a:noFill/>
+                    </a:lnR>
+                    <a:lnT w="12700" cmpd="sng">
+                      <a:noFill/>
+                    </a:lnT>
+                    <a:lnB w="12700" cmpd="sng">
+                      <a:noFill/>
+                    </a:lnB>
+                    <a:lnTlToBr w="12700" cmpd="sng">
+                      <a:noFill/>
+                      <a:prstDash val="solid"/>
+                    </a:lnTlToBr>
+                    <a:lnBlToTr w="12700" cmpd="sng">
+                      <a:noFill/>
+                      <a:prstDash val="solid"/>
+                    </a:lnBlToTr>
+                    <a:noFill/>
+                  </a:tcPr>
+                </a:tc>
+                <a:tc>
+                  <a:txBody>
+                    <a:bodyPr/>
+                    <a:lstStyle/>
+                    <a:p>
+                      <a:r>
+                        <a:rPr lang="en-US" sz="1800" b="0" kern="1200" dirty="0" smtClean="0">
+                          <a:solidFill>
+                            <a:schemeClr val="tx1"/>
+                          </a:solidFill>
+                          <a:effectLst/>
+                          <a:latin typeface="+mn-lt"/>
+                          <a:ea typeface="+mn-ea"/>
+                          <a:cs typeface="+mn-cs"/>
+                        </a:rPr>
+                        <a:t>Austin Miller </a:t>
+                      </a:r>
+                      <a:endParaRPr lang="en-US" b="0" dirty="0">
+                        <a:solidFill>
+                          <a:schemeClr val="tx1"/>
+                        </a:solidFill>
+                      </a:endParaRPr>
+                    </a:p>
+                  </a:txBody>
+                  <a:tcPr>
+                    <a:lnL w="12700" cmpd="sng">
+                      <a:noFill/>
+                    </a:lnL>
+                    <a:lnR w="12700" cmpd="sng">
+                      <a:noFill/>
+                    </a:lnR>
+                    <a:lnT w="12700" cmpd="sng">
+                      <a:noFill/>
+                    </a:lnT>
+                    <a:lnB w="12700" cmpd="sng">
+                      <a:noFill/>
+                    </a:lnB>
+                    <a:lnTlToBr w="12700" cmpd="sng">
+                      <a:noFill/>
+                      <a:prstDash val="solid"/>
+                    </a:lnTlToBr>
+                    <a:lnBlToTr w="12700" cmpd="sng">
+                      <a:noFill/>
+                      <a:prstDash val="solid"/>
+                    </a:lnBlToTr>
+                    <a:noFill/>
+                  </a:tcPr>
+                </a:tc>
+              </a:tr>
+              <a:tr h="347729">
+                <a:tc>
+                  <a:txBody>
+                    <a:bodyPr/>
+                    <a:lstStyle/>
+                    <a:p>
+                      <a:r>
+                        <a:rPr lang="en-US" sz="1800" b="0" kern="1200" dirty="0" smtClean="0">
+                          <a:solidFill>
+                            <a:schemeClr val="tx1"/>
+                          </a:solidFill>
+                          <a:effectLst/>
+                          <a:latin typeface="+mn-lt"/>
+                          <a:ea typeface="+mn-ea"/>
+                          <a:cs typeface="+mn-cs"/>
+                        </a:rPr>
+                        <a:t>Dr. James Mabry </a:t>
+                      </a:r>
+                      <a:endParaRPr lang="en-US" b="0" dirty="0">
+                        <a:solidFill>
+                          <a:schemeClr val="tx1"/>
+                        </a:solidFill>
+                      </a:endParaRPr>
+                    </a:p>
+                  </a:txBody>
+                  <a:tcPr>
+                    <a:lnL w="12700" cmpd="sng">
+                      <a:noFill/>
+                    </a:lnL>
+                    <a:lnR w="12700" cmpd="sng">
+                      <a:noFill/>
+                    </a:lnR>
+                    <a:lnT w="12700" cmpd="sng">
+                      <a:noFill/>
+                    </a:lnT>
+                    <a:lnB w="12700" cmpd="sng">
+                      <a:noFill/>
+                    </a:lnB>
+                    <a:lnTlToBr w="12700" cmpd="sng">
+                      <a:noFill/>
+                      <a:prstDash val="solid"/>
+                    </a:lnTlToBr>
+                    <a:lnBlToTr w="12700" cmpd="sng">
+                      <a:noFill/>
+                      <a:prstDash val="solid"/>
+                    </a:lnBlToTr>
+                    <a:noFill/>
+                  </a:tcPr>
+                </a:tc>
+                <a:tc>
+                  <a:txBody>
+                    <a:bodyPr/>
+                    <a:lstStyle/>
+                    <a:p>
+                      <a:r>
+                        <a:rPr lang="en-US" sz="1800" b="0" i="0" kern="1200" dirty="0" smtClean="0">
+                          <a:solidFill>
+                            <a:schemeClr val="dk1"/>
+                          </a:solidFill>
+                          <a:effectLst/>
+                          <a:latin typeface="+mn-lt"/>
+                          <a:ea typeface="+mn-ea"/>
+                          <a:cs typeface="+mn-cs"/>
+                        </a:rPr>
+                        <a:t>Kay Purcell</a:t>
+                      </a:r>
+                      <a:endParaRPr lang="en-US" dirty="0"/>
+                    </a:p>
+                  </a:txBody>
+                  <a:tcPr>
+                    <a:lnL w="12700" cmpd="sng">
+                      <a:noFill/>
+                    </a:lnL>
+                    <a:lnR w="12700" cmpd="sng">
+                      <a:noFill/>
+                    </a:lnR>
+                    <a:lnT w="12700" cmpd="sng">
+                      <a:noFill/>
+                    </a:lnT>
+                    <a:lnB w="12700" cmpd="sng">
+                      <a:noFill/>
+                    </a:lnB>
+                    <a:lnTlToBr w="12700" cmpd="sng">
+                      <a:noFill/>
+                      <a:prstDash val="solid"/>
+                    </a:lnTlToBr>
+                    <a:lnBlToTr w="12700" cmpd="sng">
+                      <a:noFill/>
+                      <a:prstDash val="solid"/>
+                    </a:lnBlToTr>
+                    <a:noFill/>
+                  </a:tcPr>
+                </a:tc>
+                <a:tc>
+                  <a:txBody>
+                    <a:bodyPr/>
+                    <a:lstStyle/>
+                    <a:p>
+                      <a:r>
+                        <a:rPr lang="en-US" b="0" dirty="0" err="1" smtClean="0">
+                          <a:solidFill>
+                            <a:schemeClr val="tx1"/>
+                          </a:solidFill>
+                        </a:rPr>
+                        <a:t>Indiegogo</a:t>
+                      </a:r>
+                      <a:r>
+                        <a:rPr lang="en-US" b="0" dirty="0" smtClean="0">
+                          <a:solidFill>
+                            <a:schemeClr val="tx1"/>
+                          </a:solidFill>
+                        </a:rPr>
+                        <a:t> Funders</a:t>
+                      </a:r>
+                      <a:endParaRPr lang="en-US" b="0" dirty="0">
+                        <a:solidFill>
+                          <a:schemeClr val="tx1"/>
+                        </a:solidFill>
+                      </a:endParaRPr>
+                    </a:p>
+                  </a:txBody>
+                  <a:tcPr>
+                    <a:lnL w="12700" cmpd="sng">
+                      <a:noFill/>
+                    </a:lnL>
+                    <a:lnR w="12700" cmpd="sng">
+                      <a:noFill/>
+                    </a:lnR>
+                    <a:lnT w="12700" cmpd="sng">
+                      <a:noFill/>
+                    </a:lnT>
+                    <a:lnB w="12700" cmpd="sng">
+                      <a:noFill/>
+                    </a:lnB>
+                    <a:lnTlToBr w="12700" cmpd="sng">
+                      <a:noFill/>
+                      <a:prstDash val="solid"/>
+                    </a:lnTlToBr>
+                    <a:lnBlToTr w="12700" cmpd="sng">
+                      <a:noFill/>
+                      <a:prstDash val="solid"/>
+                    </a:lnBlToTr>
+                    <a:noFill/>
+                  </a:tcPr>
+                </a:tc>
+              </a:tr>
+              <a:tr h="394093">
+                <a:tc>
+                  <a:txBody>
+                    <a:bodyPr/>
+                    <a:lstStyle/>
+                    <a:p>
+                      <a:pPr marL="0" marR="0" indent="0" algn="l" defTabSz="457200" rtl="0" eaLnBrk="1" fontAlgn="auto" latinLnBrk="0" hangingPunct="1">
+                        <a:lnSpc>
+                          <a:spcPct val="100000"/>
+                        </a:lnSpc>
+                        <a:spcBef>
+                          <a:spcPts val="0"/>
+                        </a:spcBef>
+                        <a:spcAft>
+                          <a:spcPts val="0"/>
+                        </a:spcAft>
+                        <a:buClrTx/>
+                        <a:buSzTx/>
+                        <a:buFontTx/>
+                        <a:buNone/>
+                        <a:tabLst/>
+                        <a:defRPr/>
+                      </a:pPr>
+                      <a:r>
+                        <a:rPr lang="en-US" sz="1800" b="0" kern="1200" dirty="0" smtClean="0">
+                          <a:solidFill>
+                            <a:schemeClr val="tx1"/>
+                          </a:solidFill>
+                          <a:effectLst/>
+                          <a:latin typeface="+mn-lt"/>
+                          <a:ea typeface="+mn-ea"/>
+                          <a:cs typeface="+mn-cs"/>
+                        </a:rPr>
+                        <a:t>Tim </a:t>
+                      </a:r>
+                      <a:r>
+                        <a:rPr lang="en-US" sz="1800" b="0" kern="1200" dirty="0" err="1" smtClean="0">
+                          <a:solidFill>
+                            <a:schemeClr val="tx1"/>
+                          </a:solidFill>
+                          <a:effectLst/>
+                          <a:latin typeface="+mn-lt"/>
+                          <a:ea typeface="+mn-ea"/>
+                          <a:cs typeface="+mn-cs"/>
+                        </a:rPr>
+                        <a:t>Attig</a:t>
+                      </a:r>
+                      <a:r>
+                        <a:rPr lang="en-US" sz="1800" b="0" kern="1200" dirty="0" smtClean="0">
+                          <a:solidFill>
+                            <a:schemeClr val="tx1"/>
+                          </a:solidFill>
+                          <a:effectLst/>
+                          <a:latin typeface="+mn-lt"/>
+                          <a:ea typeface="+mn-ea"/>
+                          <a:cs typeface="+mn-cs"/>
+                        </a:rPr>
+                        <a:t> </a:t>
+                      </a:r>
+                      <a:endParaRPr lang="en-US" b="0" dirty="0" smtClean="0">
+                        <a:solidFill>
+                          <a:schemeClr val="tx1"/>
+                        </a:solidFill>
+                      </a:endParaRPr>
+                    </a:p>
+                  </a:txBody>
+                  <a:tcPr>
+                    <a:lnL w="12700" cmpd="sng">
+                      <a:noFill/>
+                    </a:lnL>
+                    <a:lnR w="12700" cmpd="sng">
+                      <a:noFill/>
+                    </a:lnR>
+                    <a:lnT w="12700" cmpd="sng">
+                      <a:noFill/>
+                    </a:lnT>
+                    <a:lnB w="12700" cmpd="sng">
+                      <a:noFill/>
+                    </a:lnB>
+                    <a:lnTlToBr w="12700" cmpd="sng">
+                      <a:noFill/>
+                      <a:prstDash val="solid"/>
+                    </a:lnTlToBr>
+                    <a:lnBlToTr w="12700" cmpd="sng">
+                      <a:noFill/>
+                      <a:prstDash val="solid"/>
+                    </a:lnBlToTr>
+                    <a:noFill/>
+                  </a:tcPr>
+                </a:tc>
+                <a:tc>
+                  <a:txBody>
+                    <a:bodyPr/>
+                    <a:lstStyle/>
+                    <a:p>
+                      <a:pPr marL="0" marR="0" indent="0" algn="l" defTabSz="457200" rtl="0" eaLnBrk="1" fontAlgn="auto" latinLnBrk="0" hangingPunct="1">
+                        <a:lnSpc>
+                          <a:spcPct val="100000"/>
+                        </a:lnSpc>
+                        <a:spcBef>
+                          <a:spcPts val="0"/>
+                        </a:spcBef>
+                        <a:spcAft>
+                          <a:spcPts val="0"/>
+                        </a:spcAft>
+                        <a:buClrTx/>
+                        <a:buSzTx/>
+                        <a:buFontTx/>
+                        <a:buNone/>
+                        <a:tabLst/>
+                        <a:defRPr/>
+                      </a:pPr>
+                      <a:r>
+                        <a:rPr lang="en-US" sz="1800" b="0" kern="1200" dirty="0" smtClean="0">
+                          <a:solidFill>
+                            <a:schemeClr val="tx1"/>
+                          </a:solidFill>
+                          <a:effectLst/>
+                          <a:latin typeface="+mn-lt"/>
+                          <a:ea typeface="+mn-ea"/>
+                          <a:cs typeface="+mn-cs"/>
+                        </a:rPr>
+                        <a:t>Joe Lennox</a:t>
+                      </a:r>
+                      <a:endParaRPr lang="en-US" b="0" dirty="0" smtClean="0">
+                        <a:solidFill>
+                          <a:schemeClr val="tx1"/>
+                        </a:solidFill>
+                      </a:endParaRPr>
+                    </a:p>
+                  </a:txBody>
+                  <a:tcPr>
+                    <a:lnL w="12700" cmpd="sng">
+                      <a:noFill/>
+                    </a:lnL>
+                    <a:lnR w="12700" cmpd="sng">
+                      <a:noFill/>
+                    </a:lnR>
+                    <a:lnT w="12700" cmpd="sng">
+                      <a:noFill/>
+                    </a:lnT>
+                    <a:lnB w="12700" cmpd="sng">
+                      <a:noFill/>
+                    </a:lnB>
+                    <a:lnTlToBr w="12700" cmpd="sng">
+                      <a:noFill/>
+                      <a:prstDash val="solid"/>
+                    </a:lnTlToBr>
+                    <a:lnBlToTr w="12700" cmpd="sng">
+                      <a:noFill/>
+                      <a:prstDash val="solid"/>
+                    </a:lnBlToTr>
+                    <a:noFill/>
+                  </a:tcPr>
+                </a:tc>
+                <a:tc>
+                  <a:txBody>
+                    <a:bodyPr/>
+                    <a:lstStyle/>
+                    <a:p>
+                      <a:endParaRPr lang="en-US" dirty="0"/>
+                    </a:p>
+                  </a:txBody>
+                  <a:tcPr>
+                    <a:lnL w="12700" cmpd="sng">
+                      <a:noFill/>
+                    </a:lnL>
+                    <a:lnR w="12700" cmpd="sng">
+                      <a:noFill/>
+                    </a:lnR>
+                    <a:lnT w="12700" cmpd="sng">
+                      <a:noFill/>
+                    </a:lnT>
+                    <a:lnB w="12700" cmpd="sng">
+                      <a:noFill/>
+                    </a:lnB>
+                    <a:lnTlToBr w="12700" cmpd="sng">
+                      <a:noFill/>
+                      <a:prstDash val="solid"/>
+                    </a:lnTlToBr>
+                    <a:lnBlToTr w="12700" cmpd="sng">
+                      <a:noFill/>
+                      <a:prstDash val="solid"/>
+                    </a:lnBlToTr>
+                    <a:noFill/>
+                  </a:tcPr>
+                </a:tc>
+              </a:tr>
+            </a:tbl>
+          </a:graphicData>
+        </a:graphic>
+      </p:graphicFrame>
       <p:sp>
         <p:nvSpPr>
           <p:cNvPr id="4" name="Slide Number Placeholder 3"/>
@@ -8642,16 +11077,17 @@
           <a:p>
             <a:fld id="{5C6BB475-B640-4DD3-A1AA-1CF10A44AA06}" type="slidenum">
               <a:rPr lang="en-US" smtClean="0"/>
+              <a:pPr/>
               <a:t>21</a:t>
             </a:fld>
-            <a:endParaRPr lang="en-US"/>
+            <a:endParaRPr lang="en-US" dirty="0"/>
           </a:p>
         </p:txBody>
       </p:sp>
     </p:spTree>
     <p:extLst>
       <p:ext uri="{BB962C8B-B14F-4D97-AF65-F5344CB8AC3E}">
-        <p14:creationId xmlns:p14="http://schemas.microsoft.com/office/powerpoint/2010/main" val="2150469081"/>
+        <p14:creationId xmlns:p14="http://schemas.microsoft.com/office/powerpoint/2010/main" val="767577116"/>
       </p:ext>
     </p:extLst>
   </p:cSld>
@@ -8697,101 +11133,6 @@
         </p:nvSpPr>
         <p:spPr/>
         <p:txBody>
-          <a:bodyPr/>
-          <a:lstStyle/>
-          <a:p>
-            <a:r>
-              <a:rPr lang="en-US" dirty="0" smtClean="0"/>
-              <a:t>Acknowledgments</a:t>
-            </a:r>
-            <a:endParaRPr lang="en-US" dirty="0"/>
-          </a:p>
-        </p:txBody>
-      </p:sp>
-      <p:sp>
-        <p:nvSpPr>
-          <p:cNvPr id="3" name="Content Placeholder 2"/>
-          <p:cNvSpPr>
-            <a:spLocks noGrp="1"/>
-          </p:cNvSpPr>
-          <p:nvPr>
-            <p:ph idx="1"/>
-          </p:nvPr>
-        </p:nvSpPr>
-        <p:spPr/>
-        <p:txBody>
-          <a:bodyPr/>
-          <a:lstStyle/>
-          <a:p>
-            <a:endParaRPr lang="en-US" dirty="0"/>
-          </a:p>
-        </p:txBody>
-      </p:sp>
-      <p:sp>
-        <p:nvSpPr>
-          <p:cNvPr id="4" name="Slide Number Placeholder 3"/>
-          <p:cNvSpPr>
-            <a:spLocks noGrp="1"/>
-          </p:cNvSpPr>
-          <p:nvPr>
-            <p:ph type="sldNum" sz="quarter" idx="12"/>
-          </p:nvPr>
-        </p:nvSpPr>
-        <p:spPr/>
-        <p:txBody>
-          <a:bodyPr/>
-          <a:lstStyle/>
-          <a:p>
-            <a:fld id="{5C6BB475-B640-4DD3-A1AA-1CF10A44AA06}" type="slidenum">
-              <a:rPr lang="en-US" smtClean="0"/>
-              <a:t>22</a:t>
-            </a:fld>
-            <a:endParaRPr lang="en-US"/>
-          </a:p>
-        </p:txBody>
-      </p:sp>
-    </p:spTree>
-    <p:extLst>
-      <p:ext uri="{BB962C8B-B14F-4D97-AF65-F5344CB8AC3E}">
-        <p14:creationId xmlns:p14="http://schemas.microsoft.com/office/powerpoint/2010/main" val="4148977491"/>
-      </p:ext>
-    </p:extLst>
-  </p:cSld>
-  <p:clrMapOvr>
-    <a:masterClrMapping/>
-  </p:clrMapOvr>
-</p:sld>
-</file>
-
-<file path=ppt/slides/slide23.xml><?xml version="1.0" encoding="utf-8"?>
-<p:sld xmlns:a="http://schemas.openxmlformats.org/drawingml/2006/main" xmlns:r="http://schemas.openxmlformats.org/officeDocument/2006/relationships" xmlns:p="http://schemas.openxmlformats.org/presentationml/2006/main">
-  <p:cSld>
-    <p:spTree>
-      <p:nvGrpSpPr>
-        <p:cNvPr id="1" name=""/>
-        <p:cNvGrpSpPr/>
-        <p:nvPr/>
-      </p:nvGrpSpPr>
-      <p:grpSpPr>
-        <a:xfrm>
-          <a:off x="0" y="0"/>
-          <a:ext cx="0" cy="0"/>
-          <a:chOff x="0" y="0"/>
-          <a:chExt cx="0" cy="0"/>
-        </a:xfrm>
-      </p:grpSpPr>
-      <p:sp>
-        <p:nvSpPr>
-          <p:cNvPr id="2" name="Title 1"/>
-          <p:cNvSpPr>
-            <a:spLocks noGrp="1"/>
-          </p:cNvSpPr>
-          <p:nvPr>
-            <p:ph type="title"/>
-          </p:nvPr>
-        </p:nvSpPr>
-        <p:spPr/>
-        <p:txBody>
           <a:bodyPr>
             <a:normAutofit/>
           </a:bodyPr>
@@ -9075,7 +11416,7 @@
           <a:p>
             <a:fld id="{5C6BB475-B640-4DD3-A1AA-1CF10A44AA06}" type="slidenum">
               <a:rPr lang="en-US" smtClean="0"/>
-              <a:t>23</a:t>
+              <a:t>22</a:t>
             </a:fld>
             <a:endParaRPr lang="en-US"/>
           </a:p>
@@ -9305,7 +11646,7 @@
         <p:spPr/>
         <p:txBody>
           <a:bodyPr>
-            <a:normAutofit fontScale="92500" lnSpcReduction="20000"/>
+            <a:normAutofit fontScale="70000" lnSpcReduction="20000"/>
           </a:bodyPr>
           <a:lstStyle/>
           <a:p>
@@ -9314,7 +11655,26 @@
             </a:pPr>
             <a:r>
               <a:rPr lang="en-US" dirty="0" smtClean="0"/>
-              <a:t>Problem Statement</a:t>
+              <a:t>Problem</a:t>
+            </a:r>
+          </a:p>
+          <a:p>
+            <a:pPr lvl="1" fontAlgn="base"/>
+            <a:r>
+              <a:rPr lang="en-US" dirty="0"/>
+              <a:t>High resolution additive manufacturing </a:t>
+            </a:r>
+            <a:r>
+              <a:rPr lang="en-US" dirty="0" smtClean="0"/>
+              <a:t>is </a:t>
+            </a:r>
+            <a:r>
+              <a:rPr lang="en-US" dirty="0"/>
+              <a:t>not accessible for hobbyists (under $1,000</a:t>
+            </a:r>
+            <a:r>
+              <a:rPr lang="en-US" dirty="0" smtClean="0"/>
+              <a:t>)</a:t>
             </a:r>
           </a:p>
           <a:p>
@@ -9325,25 +11685,31 @@
             </a:r>
             <a:r>
               <a:rPr lang="en-US" dirty="0"/>
-              <a:t>hobbyist 3D printers are imprecise and fault-prone</a:t>
-            </a:r>
+              <a:t>hobbyist 3D printers are </a:t>
+            </a:r>
+            <a:r>
+              <a:rPr lang="en-US" dirty="0" smtClean="0"/>
+              <a:t>imprecise, fault-prone, and poorly documented</a:t>
+            </a:r>
+            <a:endParaRPr lang="en-US" dirty="0"/>
           </a:p>
           <a:p>
             <a:pPr lvl="1" fontAlgn="base"/>
             <a:r>
+              <a:rPr lang="en-US" dirty="0" smtClean="0"/>
+              <a:t>Available </a:t>
+            </a:r>
+            <a:r>
               <a:rPr lang="en-US" dirty="0"/>
-              <a:t>High resolution additive manufacturing is currently not accessible for hobbyists (under $1,000</a:t>
+              <a:t>PAM </a:t>
             </a:r>
             <a:r>
               <a:rPr lang="en-US" dirty="0" smtClean="0"/>
-              <a:t>)</a:t>
-            </a:r>
-          </a:p>
-          <a:p>
-            <a:pPr lvl="1" fontAlgn="base"/>
+              <a:t>systems are inflexible, </a:t>
+            </a:r>
             <a:r>
               <a:rPr lang="en-US" dirty="0"/>
-              <a:t>Available PAM systems use proprietary hardware and </a:t>
+              <a:t>use proprietary hardware and </a:t>
             </a:r>
             <a:r>
               <a:rPr lang="en-US" dirty="0" smtClean="0"/>
@@ -9356,7 +11722,67 @@
             </a:pPr>
             <a:r>
               <a:rPr lang="en-US" dirty="0" smtClean="0"/>
-              <a:t>Our Solution</a:t>
+              <a:t>Solution</a:t>
+            </a:r>
+          </a:p>
+          <a:p>
+            <a:pPr lvl="1"/>
+            <a:r>
+              <a:rPr lang="en-US" dirty="0" err="1" smtClean="0"/>
+              <a:t>Libre</a:t>
+            </a:r>
+            <a:endParaRPr lang="en-US" dirty="0" smtClean="0"/>
+          </a:p>
+          <a:p>
+            <a:pPr lvl="1"/>
+            <a:r>
+              <a:rPr lang="en-US" dirty="0" smtClean="0"/>
+              <a:t>Accessible </a:t>
+            </a:r>
+            <a:r>
+              <a:rPr lang="en-US" dirty="0"/>
+              <a:t>to the hobbyist</a:t>
+            </a:r>
+          </a:p>
+          <a:p>
+            <a:pPr lvl="1"/>
+            <a:r>
+              <a:rPr lang="en-US" dirty="0" smtClean="0"/>
+              <a:t>Precise </a:t>
+            </a:r>
+            <a:r>
+              <a:rPr lang="en-US" dirty="0"/>
+              <a:t>and repeatable</a:t>
+            </a:r>
+          </a:p>
+          <a:p>
+            <a:pPr lvl="1"/>
+            <a:r>
+              <a:rPr lang="en-US" dirty="0"/>
+              <a:t>Flexible for the end </a:t>
+            </a:r>
+            <a:r>
+              <a:rPr lang="en-US" dirty="0" smtClean="0"/>
+              <a:t>user</a:t>
+            </a:r>
+          </a:p>
+          <a:p>
+            <a:pPr lvl="1"/>
+            <a:r>
+              <a:rPr lang="en-US" dirty="0"/>
+              <a:t>O</a:t>
+            </a:r>
+            <a:r>
+              <a:rPr lang="en-US" dirty="0" smtClean="0"/>
+              <a:t>ff-the-shelf </a:t>
+            </a:r>
+            <a:r>
+              <a:rPr lang="en-US" dirty="0"/>
+              <a:t>open-source </a:t>
+            </a:r>
+            <a:r>
+              <a:rPr lang="en-US" dirty="0" smtClean="0"/>
+              <a:t>hardware</a:t>
             </a:r>
           </a:p>
           <a:p>
@@ -9367,37 +11793,7 @@
             </a:r>
             <a:r>
               <a:rPr lang="en-US" dirty="0"/>
-              <a:t>DLP PAM system can produce high quality and fast </a:t>
-            </a:r>
-            <a:r>
-              <a:rPr lang="en-US" dirty="0" smtClean="0"/>
-              <a:t>prints</a:t>
-            </a:r>
-          </a:p>
-          <a:p>
-            <a:pPr lvl="1"/>
-            <a:r>
-              <a:rPr lang="en-US" dirty="0" smtClean="0"/>
-              <a:t>Use </a:t>
-            </a:r>
-            <a:r>
-              <a:rPr lang="en-US" dirty="0"/>
-              <a:t>off-the-shelf open-source </a:t>
-            </a:r>
-            <a:r>
-              <a:rPr lang="en-US" dirty="0" smtClean="0"/>
-              <a:t>hardware</a:t>
-            </a:r>
-          </a:p>
-          <a:p>
-            <a:pPr lvl="1"/>
-            <a:r>
-              <a:rPr lang="en-US" dirty="0" smtClean="0"/>
-              <a:t>Create </a:t>
-            </a:r>
-            <a:r>
-              <a:rPr lang="en-US" dirty="0"/>
-              <a:t>a thoroughly documented reference </a:t>
+              <a:t>thoroughly documented reference </a:t>
             </a:r>
             <a:r>
               <a:rPr lang="en-US" dirty="0" smtClean="0"/>
@@ -9433,7 +11829,7 @@
     </p:spTree>
     <p:extLst>
       <p:ext uri="{BB962C8B-B14F-4D97-AF65-F5344CB8AC3E}">
-        <p14:creationId xmlns:p14="http://schemas.microsoft.com/office/powerpoint/2010/main" val="4029967778"/>
+        <p14:creationId xmlns:p14="http://schemas.microsoft.com/office/powerpoint/2010/main" val="4273748684"/>
       </p:ext>
     </p:extLst>
   </p:cSld>
@@ -9477,7 +11873,12 @@
             <p:ph type="title"/>
           </p:nvPr>
         </p:nvSpPr>
-        <p:spPr/>
+        <p:spPr>
+          <a:xfrm>
+            <a:off x="1541985" y="372698"/>
+            <a:ext cx="10018713" cy="1057275"/>
+          </a:xfrm>
+        </p:spPr>
         <p:txBody>
           <a:bodyPr/>
           <a:lstStyle/>
@@ -9543,34 +11944,30 @@
           </a:p>
         </p:txBody>
       </p:sp>
-      <p:pic>
-        <p:nvPicPr>
-          <p:cNvPr id="2" name="Picture 1"/>
-          <p:cNvPicPr>
-            <a:picLocks noChangeAspect="1"/>
-          </p:cNvPicPr>
-          <p:nvPr/>
-        </p:nvPicPr>
-        <p:blipFill>
-          <a:blip r:embed="rId2"/>
-          <a:stretch>
-            <a:fillRect/>
-          </a:stretch>
-        </p:blipFill>
-        <p:spPr>
-          <a:xfrm>
-            <a:off x="3189963" y="1478099"/>
-            <a:ext cx="6722761" cy="4887131"/>
-          </a:xfrm>
-          <a:prstGeom prst="rect">
-            <a:avLst/>
-          </a:prstGeom>
-        </p:spPr>
-      </p:pic>
+      <p:graphicFrame>
+        <p:nvGraphicFramePr>
+          <p:cNvPr id="9" name="Chart 8"/>
+          <p:cNvGraphicFramePr>
+            <a:graphicFrameLocks noGrp="1"/>
+          </p:cNvGraphicFramePr>
+          <p:nvPr>
+            <p:extLst/>
+          </p:nvPr>
+        </p:nvGraphicFramePr>
+        <p:xfrm>
+          <a:off x="2711903" y="1295400"/>
+          <a:ext cx="7937047" cy="5203371"/>
+        </p:xfrm>
+        <a:graphic>
+          <a:graphicData uri="http://schemas.openxmlformats.org/drawingml/2006/chart">
+            <c:chart xmlns:c="http://schemas.openxmlformats.org/drawingml/2006/chart" xmlns:r="http://schemas.openxmlformats.org/officeDocument/2006/relationships" r:id="rId2"/>
+          </a:graphicData>
+        </a:graphic>
+      </p:graphicFrame>
     </p:spTree>
     <p:extLst>
       <p:ext uri="{BB962C8B-B14F-4D97-AF65-F5344CB8AC3E}">
-        <p14:creationId xmlns:p14="http://schemas.microsoft.com/office/powerpoint/2010/main" val="147561124"/>
+        <p14:creationId xmlns:p14="http://schemas.microsoft.com/office/powerpoint/2010/main" val="3408471816"/>
       </p:ext>
     </p:extLst>
   </p:cSld>
@@ -9620,9 +12017,10 @@
           <a:lstStyle/>
           <a:p>
             <a:r>
-              <a:rPr lang="en-US" dirty="0"/>
-              <a:t>Criteria</a:t>
-            </a:r>
+              <a:rPr lang="en-US" dirty="0" smtClean="0"/>
+              <a:t>Top Down vs. Bottom Up</a:t>
+            </a:r>
+            <a:endParaRPr lang="en-US" dirty="0"/>
           </a:p>
         </p:txBody>
       </p:sp>
@@ -9641,46 +12039,7 @@
           <a:bodyPr/>
           <a:lstStyle/>
           <a:p>
-            <a:r>
-              <a:rPr lang="en-US" dirty="0"/>
-              <a:t>Accessible to the hobbyist</a:t>
-            </a:r>
-          </a:p>
-          <a:p>
-            <a:r>
-              <a:rPr lang="en-US" dirty="0"/>
-              <a:t>Open Source and Free </a:t>
-            </a:r>
-            <a:r>
-              <a:rPr lang="en-US" dirty="0" smtClean="0"/>
-              <a:t>(as </a:t>
-            </a:r>
-            <a:r>
-              <a:rPr lang="en-US" dirty="0"/>
-              <a:t>in </a:t>
-            </a:r>
-            <a:r>
-              <a:rPr lang="en-US" dirty="0" smtClean="0"/>
-              <a:t>speech)</a:t>
-            </a:r>
-            <a:endParaRPr lang="en-US" dirty="0"/>
-          </a:p>
-          <a:p>
-            <a:r>
-              <a:rPr lang="en-US" dirty="0"/>
-              <a:t>Precise and </a:t>
-            </a:r>
-            <a:r>
-              <a:rPr lang="en-US" dirty="0" smtClean="0"/>
-              <a:t>repeatable</a:t>
-            </a:r>
-          </a:p>
-          <a:p>
-            <a:r>
-              <a:rPr lang="en-US" dirty="0" smtClean="0"/>
-              <a:t>Flexible for the end user</a:t>
-            </a:r>
-            <a:endParaRPr lang="en-US" dirty="0"/>
+            <a:endParaRPr lang="en-US"/>
           </a:p>
         </p:txBody>
       </p:sp>
@@ -9710,20 +12069,13 @@
     </p:spTree>
     <p:extLst>
       <p:ext uri="{BB962C8B-B14F-4D97-AF65-F5344CB8AC3E}">
-        <p14:creationId xmlns:p14="http://schemas.microsoft.com/office/powerpoint/2010/main" val="539541693"/>
+        <p14:creationId xmlns:p14="http://schemas.microsoft.com/office/powerpoint/2010/main" val="3047169888"/>
       </p:ext>
     </p:extLst>
   </p:cSld>
   <p:clrMapOvr>
     <a:masterClrMapping/>
   </p:clrMapOvr>
-  <p:timing>
-    <p:tnLst>
-      <p:par>
-        <p:cTn id="1" dur="indefinite" restart="never" nodeType="tmRoot"/>
-      </p:par>
-    </p:tnLst>
-  </p:timing>
 </p:sld>
 </file>
 
@@ -9761,28 +12113,12 @@
           <a:p>
             <a:r>
               <a:rPr lang="en-US" dirty="0" smtClean="0"/>
-              <a:t>Top Down vs. Bottom Up</a:t>
-            </a:r>
-            <a:endParaRPr lang="en-US" dirty="0"/>
-          </a:p>
-        </p:txBody>
-      </p:sp>
-      <p:sp>
-        <p:nvSpPr>
-          <p:cNvPr id="3" name="Content Placeholder 2"/>
-          <p:cNvSpPr>
-            <a:spLocks noGrp="1"/>
-          </p:cNvSpPr>
-          <p:nvPr>
-            <p:ph idx="1"/>
-          </p:nvPr>
-        </p:nvSpPr>
-        <p:spPr/>
-        <p:txBody>
-          <a:bodyPr/>
-          <a:lstStyle/>
-          <a:p>
-            <a:endParaRPr lang="en-US"/>
+              <a:t>System Block </a:t>
+            </a:r>
+            <a:r>
+              <a:rPr lang="en-US" dirty="0"/>
+              <a:t>Diagram</a:t>
+            </a:r>
           </a:p>
         </p:txBody>
       </p:sp>
@@ -9804,85 +12140,6 @@
             <a:fld id="{5C6BB475-B640-4DD3-A1AA-1CF10A44AA06}" type="slidenum">
               <a:rPr lang="en-US" smtClean="0"/>
               <a:t>7</a:t>
-            </a:fld>
-            <a:endParaRPr lang="en-US"/>
-          </a:p>
-        </p:txBody>
-      </p:sp>
-    </p:spTree>
-    <p:extLst>
-      <p:ext uri="{BB962C8B-B14F-4D97-AF65-F5344CB8AC3E}">
-        <p14:creationId xmlns:p14="http://schemas.microsoft.com/office/powerpoint/2010/main" val="3047169888"/>
-      </p:ext>
-    </p:extLst>
-  </p:cSld>
-  <p:clrMapOvr>
-    <a:masterClrMapping/>
-  </p:clrMapOvr>
-</p:sld>
-</file>
-
-<file path=ppt/slides/slide8.xml><?xml version="1.0" encoding="utf-8"?>
-<p:sld xmlns:a="http://schemas.openxmlformats.org/drawingml/2006/main" xmlns:r="http://schemas.openxmlformats.org/officeDocument/2006/relationships" xmlns:p="http://schemas.openxmlformats.org/presentationml/2006/main">
-  <p:cSld>
-    <p:spTree>
-      <p:nvGrpSpPr>
-        <p:cNvPr id="1" name=""/>
-        <p:cNvGrpSpPr/>
-        <p:nvPr/>
-      </p:nvGrpSpPr>
-      <p:grpSpPr>
-        <a:xfrm>
-          <a:off x="0" y="0"/>
-          <a:ext cx="0" cy="0"/>
-          <a:chOff x="0" y="0"/>
-          <a:chExt cx="0" cy="0"/>
-        </a:xfrm>
-      </p:grpSpPr>
-      <p:sp>
-        <p:nvSpPr>
-          <p:cNvPr id="2" name="Title 1"/>
-          <p:cNvSpPr>
-            <a:spLocks noGrp="1"/>
-          </p:cNvSpPr>
-          <p:nvPr>
-            <p:ph type="title"/>
-          </p:nvPr>
-        </p:nvSpPr>
-        <p:spPr/>
-        <p:txBody>
-          <a:bodyPr/>
-          <a:lstStyle/>
-          <a:p>
-            <a:r>
-              <a:rPr lang="en-US" dirty="0" smtClean="0"/>
-              <a:t>System Block </a:t>
-            </a:r>
-            <a:r>
-              <a:rPr lang="en-US" dirty="0"/>
-              <a:t>Diagram</a:t>
-            </a:r>
-          </a:p>
-        </p:txBody>
-      </p:sp>
-      <p:sp>
-        <p:nvSpPr>
-          <p:cNvPr id="4" name="Slide Number Placeholder 3"/>
-          <p:cNvSpPr>
-            <a:spLocks noGrp="1"/>
-          </p:cNvSpPr>
-          <p:nvPr>
-            <p:ph type="sldNum" sz="quarter" idx="12"/>
-          </p:nvPr>
-        </p:nvSpPr>
-        <p:spPr/>
-        <p:txBody>
-          <a:bodyPr/>
-          <a:lstStyle/>
-          <a:p>
-            <a:fld id="{5C6BB475-B640-4DD3-A1AA-1CF10A44AA06}" type="slidenum">
-              <a:rPr lang="en-US" smtClean="0"/>
-              <a:t>8</a:t>
             </a:fld>
             <a:endParaRPr lang="en-US"/>
           </a:p>
@@ -9946,6 +12203,223 @@
     <p:extLst>
       <p:ext uri="{BB962C8B-B14F-4D97-AF65-F5344CB8AC3E}">
         <p14:creationId xmlns:p14="http://schemas.microsoft.com/office/powerpoint/2010/main" val="3997829335"/>
+      </p:ext>
+    </p:extLst>
+  </p:cSld>
+  <p:clrMapOvr>
+    <a:masterClrMapping/>
+  </p:clrMapOvr>
+  <p:timing>
+    <p:tnLst>
+      <p:par>
+        <p:cTn id="1" dur="indefinite" restart="never" nodeType="tmRoot"/>
+      </p:par>
+    </p:tnLst>
+  </p:timing>
+</p:sld>
+</file>
+
+<file path=ppt/slides/slide8.xml><?xml version="1.0" encoding="utf-8"?>
+<p:sld xmlns:a="http://schemas.openxmlformats.org/drawingml/2006/main" xmlns:r="http://schemas.openxmlformats.org/officeDocument/2006/relationships" xmlns:p="http://schemas.openxmlformats.org/presentationml/2006/main">
+  <p:cSld>
+    <p:spTree>
+      <p:nvGrpSpPr>
+        <p:cNvPr id="1" name=""/>
+        <p:cNvGrpSpPr/>
+        <p:nvPr/>
+      </p:nvGrpSpPr>
+      <p:grpSpPr>
+        <a:xfrm>
+          <a:off x="0" y="0"/>
+          <a:ext cx="0" cy="0"/>
+          <a:chOff x="0" y="0"/>
+          <a:chExt cx="0" cy="0"/>
+        </a:xfrm>
+      </p:grpSpPr>
+      <p:sp>
+        <p:nvSpPr>
+          <p:cNvPr id="5" name="Title 4"/>
+          <p:cNvSpPr>
+            <a:spLocks noGrp="1"/>
+          </p:cNvSpPr>
+          <p:nvPr>
+            <p:ph type="title"/>
+          </p:nvPr>
+        </p:nvSpPr>
+        <p:spPr/>
+        <p:txBody>
+          <a:bodyPr>
+            <a:normAutofit fontScale="90000"/>
+          </a:bodyPr>
+          <a:lstStyle/>
+          <a:p>
+            <a:r>
+              <a:rPr lang="en-US" dirty="0"/>
+              <a:t>Chassis Design</a:t>
+            </a:r>
+          </a:p>
+        </p:txBody>
+      </p:sp>
+      <p:pic>
+        <p:nvPicPr>
+          <p:cNvPr id="10" name="Content Placeholder 9"/>
+          <p:cNvPicPr>
+            <a:picLocks noGrp="1" noChangeAspect="1"/>
+          </p:cNvPicPr>
+          <p:nvPr>
+            <p:ph sz="half" idx="1"/>
+          </p:nvPr>
+        </p:nvPicPr>
+        <p:blipFill rotWithShape="1">
+          <a:blip r:embed="rId2" cstate="print">
+            <a:extLst>
+              <a:ext uri="{28A0092B-C50C-407E-A947-70E740481C1C}">
+                <a14:useLocalDpi xmlns:a14="http://schemas.microsoft.com/office/drawing/2010/main" val="0"/>
+              </a:ext>
+            </a:extLst>
+          </a:blip>
+          <a:srcRect t="19571"/>
+          <a:stretch/>
+        </p:blipFill>
+        <p:spPr>
+          <a:xfrm>
+            <a:off x="1484311" y="1910075"/>
+            <a:ext cx="6072843" cy="3460124"/>
+          </a:xfrm>
+        </p:spPr>
+      </p:pic>
+      <p:pic>
+        <p:nvPicPr>
+          <p:cNvPr id="9" name="Content Placeholder 8"/>
+          <p:cNvPicPr>
+            <a:picLocks noGrp="1" noChangeAspect="1"/>
+          </p:cNvPicPr>
+          <p:nvPr>
+            <p:ph sz="half" idx="2"/>
+          </p:nvPr>
+        </p:nvPicPr>
+        <p:blipFill rotWithShape="1">
+          <a:blip r:embed="rId3">
+            <a:extLst>
+              <a:ext uri="{28A0092B-C50C-407E-A947-70E740481C1C}">
+                <a14:useLocalDpi xmlns:a14="http://schemas.microsoft.com/office/drawing/2010/main" val="0"/>
+              </a:ext>
+            </a:extLst>
+          </a:blip>
+          <a:srcRect r="12302"/>
+          <a:stretch/>
+        </p:blipFill>
+        <p:spPr>
+          <a:xfrm>
+            <a:off x="8154545" y="1489074"/>
+            <a:ext cx="2843364" cy="4302125"/>
+          </a:xfrm>
+        </p:spPr>
+      </p:pic>
+      <p:sp>
+        <p:nvSpPr>
+          <p:cNvPr id="4" name="Slide Number Placeholder 3"/>
+          <p:cNvSpPr>
+            <a:spLocks noGrp="1"/>
+          </p:cNvSpPr>
+          <p:nvPr>
+            <p:ph type="sldNum" sz="quarter" idx="12"/>
+          </p:nvPr>
+        </p:nvSpPr>
+        <p:spPr/>
+        <p:txBody>
+          <a:bodyPr/>
+          <a:lstStyle/>
+          <a:p>
+            <a:fld id="{5C6BB475-B640-4DD3-A1AA-1CF10A44AA06}" type="slidenum">
+              <a:rPr lang="en-US" smtClean="0"/>
+              <a:t>8</a:t>
+            </a:fld>
+            <a:endParaRPr lang="en-US"/>
+          </a:p>
+        </p:txBody>
+      </p:sp>
+      <p:sp>
+        <p:nvSpPr>
+          <p:cNvPr id="6" name="TextBox 5"/>
+          <p:cNvSpPr txBox="1"/>
+          <p:nvPr/>
+        </p:nvSpPr>
+        <p:spPr>
+          <a:xfrm>
+            <a:off x="2823793" y="5513942"/>
+            <a:ext cx="3393878" cy="369332"/>
+          </a:xfrm>
+          <a:prstGeom prst="rect">
+            <a:avLst/>
+          </a:prstGeom>
+          <a:noFill/>
+        </p:spPr>
+        <p:txBody>
+          <a:bodyPr wrap="none" rtlCol="0">
+            <a:spAutoFit/>
+          </a:bodyPr>
+          <a:lstStyle/>
+          <a:p>
+            <a:r>
+              <a:rPr lang="en-US" dirty="0" smtClean="0"/>
+              <a:t>Figure 4. </a:t>
+            </a:r>
+            <a:r>
+              <a:rPr lang="en-US" dirty="0"/>
+              <a:t>Proposed chassis design </a:t>
+            </a:r>
+          </a:p>
+        </p:txBody>
+      </p:sp>
+      <p:sp>
+        <p:nvSpPr>
+          <p:cNvPr id="7" name="TextBox 6"/>
+          <p:cNvSpPr txBox="1"/>
+          <p:nvPr/>
+        </p:nvSpPr>
+        <p:spPr>
+          <a:xfrm>
+            <a:off x="8337747" y="5883273"/>
+            <a:ext cx="2476960" cy="646331"/>
+          </a:xfrm>
+          <a:prstGeom prst="rect">
+            <a:avLst/>
+          </a:prstGeom>
+          <a:noFill/>
+        </p:spPr>
+        <p:txBody>
+          <a:bodyPr wrap="none" rtlCol="0">
+            <a:spAutoFit/>
+          </a:bodyPr>
+          <a:lstStyle/>
+          <a:p>
+            <a:r>
+              <a:rPr lang="en-US" dirty="0" smtClean="0"/>
+              <a:t>Figure 5. </a:t>
+            </a:r>
+            <a:r>
+              <a:rPr lang="en-US" dirty="0"/>
+              <a:t>Isometric view </a:t>
+            </a:r>
+            <a:endParaRPr lang="en-US" dirty="0" smtClean="0"/>
+          </a:p>
+          <a:p>
+            <a:r>
+              <a:rPr lang="en-US" dirty="0" smtClean="0"/>
+              <a:t>of </a:t>
+            </a:r>
+            <a:r>
+              <a:rPr lang="en-US" dirty="0"/>
+              <a:t>proposed chassis </a:t>
+            </a:r>
+          </a:p>
+        </p:txBody>
+      </p:sp>
+    </p:spTree>
+    <p:extLst>
+      <p:ext uri="{BB962C8B-B14F-4D97-AF65-F5344CB8AC3E}">
+        <p14:creationId xmlns:p14="http://schemas.microsoft.com/office/powerpoint/2010/main" val="341879816"/>
       </p:ext>
     </p:extLst>
   </p:cSld>
@@ -10062,16 +12536,12 @@
             <a:graphicFrameLocks/>
           </p:cNvGraphicFramePr>
           <p:nvPr>
-            <p:extLst>
-              <p:ext uri="{D42A27DB-BD31-4B8C-83A1-F6EECF244321}">
-                <p14:modId xmlns:p14="http://schemas.microsoft.com/office/powerpoint/2010/main" val="2704818691"/>
-              </p:ext>
-            </p:extLst>
+            <p:extLst/>
           </p:nvPr>
         </p:nvGraphicFramePr>
         <p:xfrm>
           <a:off x="1970468" y="2288539"/>
-          <a:ext cx="8991746" cy="3200400"/>
+          <a:ext cx="8991746" cy="3840480"/>
         </p:xfrm>
         <a:graphic>
           <a:graphicData uri="http://schemas.openxmlformats.org/drawingml/2006/table">
@@ -10123,6 +12593,41 @@
                     <a:p>
                       <a:r>
                         <a:rPr lang="en-US" dirty="0" smtClean="0"/>
+                        <a:t>Build Volume Size</a:t>
+                      </a:r>
+                      <a:endParaRPr lang="en-US" dirty="0"/>
+                    </a:p>
+                  </a:txBody>
+                  <a:tcPr anchor="ctr"/>
+                </a:tc>
+                <a:tc>
+                  <a:txBody>
+                    <a:bodyPr/>
+                    <a:lstStyle/>
+                    <a:p>
+                      <a:pPr algn="r"/>
+                      <a:r>
+                        <a:rPr lang="en-US" dirty="0" smtClean="0"/>
+                        <a:t>192</a:t>
+                      </a:r>
+                      <a:r>
+                        <a:rPr lang="en-US" baseline="0" dirty="0" smtClean="0"/>
+                        <a:t> mm x 216 mm x 216 mm</a:t>
+                      </a:r>
+                      <a:endParaRPr lang="en-US" dirty="0"/>
+                    </a:p>
+                  </a:txBody>
+                  <a:tcPr anchor="ctr"/>
+                </a:tc>
+              </a:tr>
+              <a:tr h="640080">
+                <a:tc>
+                  <a:txBody>
+                    <a:bodyPr/>
+                    <a:lstStyle/>
+                    <a:p>
+                      <a:r>
+                        <a:rPr lang="en-US" dirty="0" smtClean="0"/>
                         <a:t>X</a:t>
                       </a:r>
                       <a:r>
@@ -10158,7 +12663,11 @@
                     <a:p>
                       <a:r>
                         <a:rPr lang="en-US" dirty="0" smtClean="0"/>
-                        <a:t>Z Axis Resolution</a:t>
+                        <a:t>Minimum</a:t>
+                      </a:r>
+                      <a:r>
+                        <a:rPr lang="en-US" baseline="0" dirty="0" smtClean="0"/>
+                        <a:t> Layer Height</a:t>
                       </a:r>
                       <a:endParaRPr lang="en-US" dirty="0"/>
                     </a:p>
@@ -10188,8 +12697,12 @@
                         <a:defRPr/>
                       </a:pPr>
                       <a:r>
+                        <a:rPr lang="en-US" smtClean="0"/>
+                        <a:t>0.015 ± 0.002 </a:t>
+                      </a:r>
+                      <a:r>
                         <a:rPr lang="en-US" dirty="0" smtClean="0"/>
-                        <a:t>0.100 ± 0.005 mm</a:t>
+                        <a:t>mm</a:t>
                       </a:r>
                     </a:p>
                   </a:txBody>
@@ -10292,7 +12805,7 @@
     </p:spTree>
     <p:extLst>
       <p:ext uri="{BB962C8B-B14F-4D97-AF65-F5344CB8AC3E}">
-        <p14:creationId xmlns:p14="http://schemas.microsoft.com/office/powerpoint/2010/main" val="245815682"/>
+        <p14:creationId xmlns:p14="http://schemas.microsoft.com/office/powerpoint/2010/main" val="2866729988"/>
       </p:ext>
     </p:extLst>
   </p:cSld>
@@ -10827,12 +13340,6 @@
 </file>
 
 <file path=customXml/item1.xml><?xml version="1.0" encoding="utf-8"?>
-<p:properties xmlns:p="http://schemas.microsoft.com/office/2006/metadata/properties" xmlns:xsi="http://www.w3.org/2001/XMLSchema-instance" xmlns:pc="http://schemas.microsoft.com/office/infopath/2007/PartnerControls">
-  <documentManagement/>
-</p:properties>
-</file>
-
-<file path=customXml/item2.xml><?xml version="1.0" encoding="utf-8"?>
 <ct:contentTypeSchema xmlns:ct="http://schemas.microsoft.com/office/2006/metadata/contentType" xmlns:ma="http://schemas.microsoft.com/office/2006/metadata/properties/metaAttributes" ct:_="" ma:_="" ma:contentTypeName="Document" ma:contentTypeID="0x01010037F85F4321109849828001F89B63E148" ma:contentTypeVersion="1" ma:contentTypeDescription="Create a new document." ma:contentTypeScope="" ma:versionID="095e360c2d3b38e9f1c3d2409eae6492">
   <xsd:schema xmlns:xsd="http://www.w3.org/2001/XMLSchema" xmlns:xs="http://www.w3.org/2001/XMLSchema" xmlns:p="http://schemas.microsoft.com/office/2006/metadata/properties" xmlns:ns3="4c2e6f55-8abc-4b5b-a4f7-930d3885115f" targetNamespace="http://schemas.microsoft.com/office/2006/metadata/properties" ma:root="true" ma:fieldsID="ce6d8a4f71ede4388f67b476f14a0021" ns3:_="">
     <xsd:import namespace="4c2e6f55-8abc-4b5b-a4f7-930d3885115f"/>
@@ -10972,6 +13479,12 @@
 </ct:contentTypeSchema>
 </file>
 
+<file path=customXml/item2.xml><?xml version="1.0" encoding="utf-8"?>
+<p:properties xmlns:p="http://schemas.microsoft.com/office/2006/metadata/properties" xmlns:xsi="http://www.w3.org/2001/XMLSchema-instance" xmlns:pc="http://schemas.microsoft.com/office/infopath/2007/PartnerControls">
+  <documentManagement/>
+</p:properties>
+</file>
+
 <file path=customXml/item3.xml><?xml version="1.0" encoding="utf-8"?>
 <?mso-contentType ?>
 <FormTemplates xmlns="http://schemas.microsoft.com/sharepoint/v3/contenttype/forms">
@@ -10982,15 +13495,6 @@
 </file>
 
 <file path=customXml/itemProps1.xml><?xml version="1.0" encoding="utf-8"?>
-<ds:datastoreItem xmlns:ds="http://schemas.openxmlformats.org/officeDocument/2006/customXml" ds:itemID="{7D5E529B-E2B8-4FF4-96DC-717B6A9731D6}">
-  <ds:schemaRefs>
-    <ds:schemaRef ds:uri="http://schemas.microsoft.com/office/2006/metadata/properties"/>
-    <ds:schemaRef ds:uri="http://schemas.microsoft.com/office/infopath/2007/PartnerControls"/>
-  </ds:schemaRefs>
-</ds:datastoreItem>
-</file>
-
-<file path=customXml/itemProps2.xml><?xml version="1.0" encoding="utf-8"?>
 <ds:datastoreItem xmlns:ds="http://schemas.openxmlformats.org/officeDocument/2006/customXml" ds:itemID="{41A76F2A-8591-44A6-B165-1D0702FBBD53}">
   <ds:schemaRefs>
     <ds:schemaRef ds:uri="http://schemas.microsoft.com/office/2006/metadata/contentType"/>
@@ -11008,6 +13512,15 @@
 </ds:datastoreItem>
 </file>
 
+<file path=customXml/itemProps2.xml><?xml version="1.0" encoding="utf-8"?>
+<ds:datastoreItem xmlns:ds="http://schemas.openxmlformats.org/officeDocument/2006/customXml" ds:itemID="{7D5E529B-E2B8-4FF4-96DC-717B6A9731D6}">
+  <ds:schemaRefs>
+    <ds:schemaRef ds:uri="http://schemas.microsoft.com/office/2006/metadata/properties"/>
+    <ds:schemaRef ds:uri="http://schemas.microsoft.com/office/infopath/2007/PartnerControls"/>
+  </ds:schemaRefs>
+</ds:datastoreItem>
+</file>
+
 <file path=customXml/itemProps3.xml><?xml version="1.0" encoding="utf-8"?>
 <ds:datastoreItem xmlns:ds="http://schemas.openxmlformats.org/officeDocument/2006/customXml" ds:itemID="{A1EF12E8-B070-4F5F-9BD0-CEE0E7C075D0}">
   <ds:schemaRefs>

</xml_diff>

<commit_message>
add updated org chart
</commit_message>
<xml_diff>
--- a/Presentations/DesignPres/DesignPres-75.pptx
+++ b/Presentations/DesignPres/DesignPres-75.pptx
@@ -181,7 +181,6 @@
           </a:p>
         </c:rich>
       </c:tx>
-      <c:layout/>
       <c:overlay val="0"/>
       <c:spPr>
         <a:noFill/>
@@ -621,11 +620,11 @@
         </c:dLbls>
         <c:bubbleScale val="100"/>
         <c:showNegBubbles val="0"/>
-        <c:axId val="296971152"/>
-        <c:axId val="296962992"/>
+        <c:axId val="-233978224"/>
+        <c:axId val="-234118352"/>
       </c:bubbleChart>
       <c:valAx>
-        <c:axId val="296971152"/>
+        <c:axId val="-233978224"/>
         <c:scaling>
           <c:orientation val="minMax"/>
           <c:min val="0"/>
@@ -680,7 +679,6 @@
               </a:p>
             </c:rich>
           </c:tx>
-          <c:layout/>
           <c:overlay val="0"/>
           <c:spPr>
             <a:noFill/>
@@ -745,12 +743,12 @@
             <a:endParaRPr lang="en-US"/>
           </a:p>
         </c:txPr>
-        <c:crossAx val="296962992"/>
+        <c:crossAx val="-234118352"/>
         <c:crosses val="autoZero"/>
         <c:crossBetween val="midCat"/>
       </c:valAx>
       <c:valAx>
-        <c:axId val="296962992"/>
+        <c:axId val="-234118352"/>
         <c:scaling>
           <c:orientation val="minMax"/>
           <c:max val="3500"/>
@@ -803,7 +801,6 @@
               </a:p>
             </c:rich>
           </c:tx>
-          <c:layout/>
           <c:overlay val="0"/>
           <c:spPr>
             <a:noFill/>
@@ -868,7 +865,7 @@
             <a:endParaRPr lang="en-US"/>
           </a:p>
         </c:txPr>
-        <c:crossAx val="296971152"/>
+        <c:crossAx val="-233978224"/>
         <c:crosses val="autoZero"/>
         <c:crossBetween val="midCat"/>
       </c:valAx>
@@ -9650,32 +9647,6 @@
           </a:p>
         </p:txBody>
       </p:sp>
-      <p:pic>
-        <p:nvPicPr>
-          <p:cNvPr id="6" name="Content Placeholder 5"/>
-          <p:cNvPicPr>
-            <a:picLocks noGrp="1" noChangeAspect="1"/>
-          </p:cNvPicPr>
-          <p:nvPr>
-            <p:ph idx="1"/>
-          </p:nvPr>
-        </p:nvPicPr>
-        <p:blipFill>
-          <a:blip r:embed="rId2"/>
-          <a:stretch>
-            <a:fillRect/>
-          </a:stretch>
-        </p:blipFill>
-        <p:spPr>
-          <a:xfrm>
-            <a:off x="2588467" y="1630363"/>
-            <a:ext cx="7924704" cy="4102100"/>
-          </a:xfrm>
-          <a:prstGeom prst="rect">
-            <a:avLst/>
-          </a:prstGeom>
-        </p:spPr>
-      </p:pic>
       <p:sp>
         <p:nvSpPr>
           <p:cNvPr id="4" name="Slide Number Placeholder 3"/>
@@ -9729,6 +9700,30 @@
           </a:p>
         </p:txBody>
       </p:sp>
+      <p:pic>
+        <p:nvPicPr>
+          <p:cNvPr id="8" name="Picture 7"/>
+          <p:cNvPicPr>
+            <a:picLocks noChangeAspect="1"/>
+          </p:cNvPicPr>
+          <p:nvPr/>
+        </p:nvPicPr>
+        <p:blipFill>
+          <a:blip r:embed="rId2"/>
+          <a:stretch>
+            <a:fillRect/>
+          </a:stretch>
+        </p:blipFill>
+        <p:spPr>
+          <a:xfrm>
+            <a:off x="1681325" y="1663240"/>
+            <a:ext cx="9738987" cy="4001154"/>
+          </a:xfrm>
+          <a:prstGeom prst="rect">
+            <a:avLst/>
+          </a:prstGeom>
+        </p:spPr>
+      </p:pic>
     </p:spTree>
     <p:extLst>
       <p:ext uri="{BB962C8B-B14F-4D97-AF65-F5344CB8AC3E}">
@@ -13340,6 +13335,12 @@
 </file>
 
 <file path=customXml/item1.xml><?xml version="1.0" encoding="utf-8"?>
+<p:properties xmlns:p="http://schemas.microsoft.com/office/2006/metadata/properties" xmlns:xsi="http://www.w3.org/2001/XMLSchema-instance" xmlns:pc="http://schemas.microsoft.com/office/infopath/2007/PartnerControls">
+  <documentManagement/>
+</p:properties>
+</file>
+
+<file path=customXml/item2.xml><?xml version="1.0" encoding="utf-8"?>
 <ct:contentTypeSchema xmlns:ct="http://schemas.microsoft.com/office/2006/metadata/contentType" xmlns:ma="http://schemas.microsoft.com/office/2006/metadata/properties/metaAttributes" ct:_="" ma:_="" ma:contentTypeName="Document" ma:contentTypeID="0x01010037F85F4321109849828001F89B63E148" ma:contentTypeVersion="1" ma:contentTypeDescription="Create a new document." ma:contentTypeScope="" ma:versionID="095e360c2d3b38e9f1c3d2409eae6492">
   <xsd:schema xmlns:xsd="http://www.w3.org/2001/XMLSchema" xmlns:xs="http://www.w3.org/2001/XMLSchema" xmlns:p="http://schemas.microsoft.com/office/2006/metadata/properties" xmlns:ns3="4c2e6f55-8abc-4b5b-a4f7-930d3885115f" targetNamespace="http://schemas.microsoft.com/office/2006/metadata/properties" ma:root="true" ma:fieldsID="ce6d8a4f71ede4388f67b476f14a0021" ns3:_="">
     <xsd:import namespace="4c2e6f55-8abc-4b5b-a4f7-930d3885115f"/>
@@ -13479,12 +13480,6 @@
 </ct:contentTypeSchema>
 </file>
 
-<file path=customXml/item2.xml><?xml version="1.0" encoding="utf-8"?>
-<p:properties xmlns:p="http://schemas.microsoft.com/office/2006/metadata/properties" xmlns:xsi="http://www.w3.org/2001/XMLSchema-instance" xmlns:pc="http://schemas.microsoft.com/office/infopath/2007/PartnerControls">
-  <documentManagement/>
-</p:properties>
-</file>
-
 <file path=customXml/item3.xml><?xml version="1.0" encoding="utf-8"?>
 <?mso-contentType ?>
 <FormTemplates xmlns="http://schemas.microsoft.com/sharepoint/v3/contenttype/forms">
@@ -13495,6 +13490,15 @@
 </file>
 
 <file path=customXml/itemProps1.xml><?xml version="1.0" encoding="utf-8"?>
+<ds:datastoreItem xmlns:ds="http://schemas.openxmlformats.org/officeDocument/2006/customXml" ds:itemID="{7D5E529B-E2B8-4FF4-96DC-717B6A9731D6}">
+  <ds:schemaRefs>
+    <ds:schemaRef ds:uri="http://schemas.microsoft.com/office/2006/metadata/properties"/>
+    <ds:schemaRef ds:uri="http://schemas.microsoft.com/office/infopath/2007/PartnerControls"/>
+  </ds:schemaRefs>
+</ds:datastoreItem>
+</file>
+
+<file path=customXml/itemProps2.xml><?xml version="1.0" encoding="utf-8"?>
 <ds:datastoreItem xmlns:ds="http://schemas.openxmlformats.org/officeDocument/2006/customXml" ds:itemID="{41A76F2A-8591-44A6-B165-1D0702FBBD53}">
   <ds:schemaRefs>
     <ds:schemaRef ds:uri="http://schemas.microsoft.com/office/2006/metadata/contentType"/>
@@ -13512,15 +13516,6 @@
 </ds:datastoreItem>
 </file>
 
-<file path=customXml/itemProps2.xml><?xml version="1.0" encoding="utf-8"?>
-<ds:datastoreItem xmlns:ds="http://schemas.openxmlformats.org/officeDocument/2006/customXml" ds:itemID="{7D5E529B-E2B8-4FF4-96DC-717B6A9731D6}">
-  <ds:schemaRefs>
-    <ds:schemaRef ds:uri="http://schemas.microsoft.com/office/2006/metadata/properties"/>
-    <ds:schemaRef ds:uri="http://schemas.microsoft.com/office/infopath/2007/PartnerControls"/>
-  </ds:schemaRefs>
-</ds:datastoreItem>
-</file>
-
 <file path=customXml/itemProps3.xml><?xml version="1.0" encoding="utf-8"?>
 <ds:datastoreItem xmlns:ds="http://schemas.openxmlformats.org/officeDocument/2006/customXml" ds:itemID="{A1EF12E8-B070-4F5F-9BD0-CEE0E7C075D0}">
   <ds:schemaRefs>

</xml_diff>

<commit_message>
Revert "Merge branch 'master' of https://github.com/dan-olsen/SeniorDesign"
This reverts commit fb62be529bc8ff07d7665f930bda945e031aa1d6, reversing
changes made to fabb99fbfd6ec2f85607f70d6f388d09bb89b8fd.
</commit_message>
<xml_diff>
--- a/Presentations/DesignPres/DesignPres-75.pptx
+++ b/Presentations/DesignPres/DesignPres-75.pptx
@@ -5,31 +5,32 @@
     <p:sldMasterId id="2147483678" r:id="rId4"/>
   </p:sldMasterIdLst>
   <p:notesMasterIdLst>
-    <p:notesMasterId r:id="rId27"/>
+    <p:notesMasterId r:id="rId28"/>
   </p:notesMasterIdLst>
   <p:sldIdLst>
     <p:sldId id="256" r:id="rId5"/>
     <p:sldId id="261" r:id="rId6"/>
     <p:sldId id="272" r:id="rId7"/>
-    <p:sldId id="294" r:id="rId8"/>
-    <p:sldId id="292" r:id="rId9"/>
-    <p:sldId id="279" r:id="rId10"/>
-    <p:sldId id="265" r:id="rId11"/>
-    <p:sldId id="263" r:id="rId12"/>
-    <p:sldId id="293" r:id="rId13"/>
-    <p:sldId id="281" r:id="rId14"/>
-    <p:sldId id="282" r:id="rId15"/>
-    <p:sldId id="283" r:id="rId16"/>
-    <p:sldId id="284" r:id="rId17"/>
-    <p:sldId id="285" r:id="rId18"/>
-    <p:sldId id="296" r:id="rId19"/>
-    <p:sldId id="287" r:id="rId20"/>
-    <p:sldId id="288" r:id="rId21"/>
-    <p:sldId id="276" r:id="rId22"/>
-    <p:sldId id="289" r:id="rId23"/>
-    <p:sldId id="278" r:id="rId24"/>
-    <p:sldId id="295" r:id="rId25"/>
-    <p:sldId id="270" r:id="rId26"/>
+    <p:sldId id="273" r:id="rId8"/>
+    <p:sldId id="269" r:id="rId9"/>
+    <p:sldId id="260" r:id="rId10"/>
+    <p:sldId id="279" r:id="rId11"/>
+    <p:sldId id="265" r:id="rId12"/>
+    <p:sldId id="274" r:id="rId13"/>
+    <p:sldId id="263" r:id="rId14"/>
+    <p:sldId id="281" r:id="rId15"/>
+    <p:sldId id="282" r:id="rId16"/>
+    <p:sldId id="283" r:id="rId17"/>
+    <p:sldId id="284" r:id="rId18"/>
+    <p:sldId id="285" r:id="rId19"/>
+    <p:sldId id="286" r:id="rId20"/>
+    <p:sldId id="287" r:id="rId21"/>
+    <p:sldId id="288" r:id="rId22"/>
+    <p:sldId id="276" r:id="rId23"/>
+    <p:sldId id="289" r:id="rId24"/>
+    <p:sldId id="278" r:id="rId25"/>
+    <p:sldId id="291" r:id="rId26"/>
+    <p:sldId id="270" r:id="rId27"/>
   </p:sldIdLst>
   <p:sldSz cx="12192000" cy="6858000"/>
   <p:notesSz cx="6858000" cy="9144000"/>
@@ -134,1403 +135,6 @@
     </p:ext>
   </p:extLst>
 </p:presentation>
-</file>
-
-<file path=ppt/charts/chart1.xml><?xml version="1.0" encoding="utf-8"?>
-<c:chartSpace xmlns:c="http://schemas.openxmlformats.org/drawingml/2006/chart" xmlns:a="http://schemas.openxmlformats.org/drawingml/2006/main" xmlns:r="http://schemas.openxmlformats.org/officeDocument/2006/relationships">
-  <c:date1904 val="0"/>
-  <c:lang val="en-US"/>
-  <c:roundedCorners val="0"/>
-  <mc:AlternateContent xmlns:mc="http://schemas.openxmlformats.org/markup-compatibility/2006">
-    <mc:Choice xmlns:c14="http://schemas.microsoft.com/office/drawing/2007/8/2/chart" Requires="c14">
-      <c14:style val="102"/>
-    </mc:Choice>
-    <mc:Fallback>
-      <c:style val="2"/>
-    </mc:Fallback>
-  </mc:AlternateContent>
-  <c:chart>
-    <c:title>
-      <c:tx>
-        <c:rich>
-          <a:bodyPr rot="0" spcFirstLastPara="1" vertOverflow="ellipsis" vert="horz" wrap="square" anchor="ctr" anchorCtr="1"/>
-          <a:lstStyle/>
-          <a:p>
-            <a:pPr>
-              <a:defRPr sz="1600" b="0" i="0" u="none" strike="noStrike" kern="1200" spc="0" baseline="0">
-                <a:solidFill>
-                  <a:schemeClr val="tx1">
-                    <a:lumMod val="65000"/>
-                    <a:lumOff val="35000"/>
-                  </a:schemeClr>
-                </a:solidFill>
-                <a:latin typeface="+mn-lt"/>
-                <a:ea typeface="+mn-ea"/>
-                <a:cs typeface="+mn-cs"/>
-              </a:defRPr>
-            </a:pPr>
-            <a:r>
-              <a:rPr lang="en-US" sz="1600"/>
-              <a:t>System</a:t>
-            </a:r>
-            <a:r>
-              <a:rPr lang="en-US" sz="1600" baseline="0"/>
-              <a:t> Cost with Respect to Area and Volume</a:t>
-            </a:r>
-            <a:endParaRPr lang="en-US" sz="1600"/>
-          </a:p>
-        </c:rich>
-      </c:tx>
-      <c:overlay val="0"/>
-      <c:spPr>
-        <a:noFill/>
-        <a:ln>
-          <a:noFill/>
-        </a:ln>
-        <a:effectLst/>
-      </c:spPr>
-      <c:txPr>
-        <a:bodyPr rot="0" spcFirstLastPara="1" vertOverflow="ellipsis" vert="horz" wrap="square" anchor="ctr" anchorCtr="1"/>
-        <a:lstStyle/>
-        <a:p>
-          <a:pPr>
-            <a:defRPr sz="1600" b="0" i="0" u="none" strike="noStrike" kern="1200" spc="0" baseline="0">
-              <a:solidFill>
-                <a:schemeClr val="tx1">
-                  <a:lumMod val="65000"/>
-                  <a:lumOff val="35000"/>
-                </a:schemeClr>
-              </a:solidFill>
-              <a:latin typeface="+mn-lt"/>
-              <a:ea typeface="+mn-ea"/>
-              <a:cs typeface="+mn-cs"/>
-            </a:defRPr>
-          </a:pPr>
-          <a:endParaRPr lang="en-US"/>
-        </a:p>
-      </c:txPr>
-    </c:title>
-    <c:autoTitleDeleted val="0"/>
-    <c:plotArea>
-      <c:layout/>
-      <c:bubbleChart>
-        <c:varyColors val="0"/>
-        <c:ser>
-          <c:idx val="0"/>
-          <c:order val="0"/>
-          <c:tx>
-            <c:strRef>
-              <c:f>Sheet1!$B$2</c:f>
-              <c:strCache>
-                <c:ptCount val="1"/>
-                <c:pt idx="0">
-                  <c:v>FDM</c:v>
-                </c:pt>
-              </c:strCache>
-            </c:strRef>
-          </c:tx>
-          <c:spPr>
-            <a:noFill/>
-            <a:ln w="38100">
-              <a:solidFill>
-                <a:srgbClr val="00B0F0"/>
-              </a:solidFill>
-            </a:ln>
-            <a:effectLst/>
-          </c:spPr>
-          <c:invertIfNegative val="0"/>
-          <c:xVal>
-            <c:numRef>
-              <c:f>Sheet1!$G$2:$G$21</c:f>
-              <c:numCache>
-                <c:formatCode>#,##0</c:formatCode>
-                <c:ptCount val="20"/>
-                <c:pt idx="0">
-                  <c:v>10411.967999999997</c:v>
-                </c:pt>
-                <c:pt idx="1">
-                  <c:v>9812.8835999999974</c:v>
-                </c:pt>
-                <c:pt idx="2">
-                  <c:v>70553.949389535599</c:v>
-                </c:pt>
-                <c:pt idx="3">
-                  <c:v>19354.799999999996</c:v>
-                </c:pt>
-                <c:pt idx="4">
-                  <c:v>51103.123599999999</c:v>
-                </c:pt>
-                <c:pt idx="5">
-                  <c:v>19516.089999999997</c:v>
-                </c:pt>
-                <c:pt idx="6">
-                  <c:v>19516.089999999997</c:v>
-                </c:pt>
-                <c:pt idx="7">
-                  <c:v>14251.5844</c:v>
-                </c:pt>
-                <c:pt idx="8">
-                  <c:v>51612.799999999996</c:v>
-                </c:pt>
-                <c:pt idx="9">
-                  <c:v>38588.632499999992</c:v>
-                </c:pt>
-                <c:pt idx="10">
-                  <c:v>92903.039999999979</c:v>
-                </c:pt>
-                <c:pt idx="11">
-                  <c:v>81522.417599999986</c:v>
-                </c:pt>
-                <c:pt idx="12">
-                  <c:v>41290.239999999998</c:v>
-                </c:pt>
-                <c:pt idx="13">
-                  <c:v>41290.239999999998</c:v>
-                </c:pt>
-                <c:pt idx="14">
-                  <c:v>45774.101999999992</c:v>
-                </c:pt>
-                <c:pt idx="15">
-                  <c:v>41290.239999999998</c:v>
-                </c:pt>
-                <c:pt idx="16">
-                  <c:v>61249.877499999995</c:v>
-                </c:pt>
-                <c:pt idx="17">
-                  <c:v>61161.167999999991</c:v>
-                </c:pt>
-                <c:pt idx="18">
-                  <c:v>60967.619999999995</c:v>
-                </c:pt>
-                <c:pt idx="19">
-                  <c:v>59516.009999999987</c:v>
-                </c:pt>
-              </c:numCache>
-            </c:numRef>
-          </c:xVal>
-          <c:yVal>
-            <c:numRef>
-              <c:f>Sheet1!$C$2:$C$21</c:f>
-              <c:numCache>
-                <c:formatCode>_("$"* #,##0.00_);_("$"* \(#,##0.00\);_("$"* "-"??_);_(@_)</c:formatCode>
-                <c:ptCount val="20"/>
-                <c:pt idx="0">
-                  <c:v>2199</c:v>
-                </c:pt>
-                <c:pt idx="1">
-                  <c:v>399</c:v>
-                </c:pt>
-                <c:pt idx="2">
-                  <c:v>900</c:v>
-                </c:pt>
-                <c:pt idx="3">
-                  <c:v>799</c:v>
-                </c:pt>
-                <c:pt idx="4">
-                  <c:v>2565</c:v>
-                </c:pt>
-                <c:pt idx="5">
-                  <c:v>1649</c:v>
-                </c:pt>
-                <c:pt idx="6">
-                  <c:v>1299</c:v>
-                </c:pt>
-                <c:pt idx="7">
-                  <c:v>899</c:v>
-                </c:pt>
-                <c:pt idx="8">
-                  <c:v>1949</c:v>
-                </c:pt>
-                <c:pt idx="9">
-                  <c:v>1549</c:v>
-                </c:pt>
-                <c:pt idx="10">
-                  <c:v>2295</c:v>
-                </c:pt>
-                <c:pt idx="11">
-                  <c:v>2195</c:v>
-                </c:pt>
-                <c:pt idx="12">
-                  <c:v>1299</c:v>
-                </c:pt>
-                <c:pt idx="13">
-                  <c:v>999</c:v>
-                </c:pt>
-                <c:pt idx="14">
-                  <c:v>1688</c:v>
-                </c:pt>
-                <c:pt idx="15">
-                  <c:v>799</c:v>
-                </c:pt>
-                <c:pt idx="16">
-                  <c:v>2195</c:v>
-                </c:pt>
-                <c:pt idx="17">
-                  <c:v>2399</c:v>
-                </c:pt>
-                <c:pt idx="18">
-                  <c:v>2500</c:v>
-                </c:pt>
-                <c:pt idx="19">
-                  <c:v>1399</c:v>
-                </c:pt>
-              </c:numCache>
-            </c:numRef>
-          </c:yVal>
-          <c:bubbleSize>
-            <c:numRef>
-              <c:f>Sheet1!$H$2:$H$21</c:f>
-              <c:numCache>
-                <c:formatCode>#,##0</c:formatCode>
-                <c:ptCount val="20"/>
-                <c:pt idx="0">
-                  <c:v>1613230.3219199993</c:v>
-                </c:pt>
-                <c:pt idx="1">
-                  <c:v>972064.24941599963</c:v>
-                </c:pt>
-                <c:pt idx="2">
-                  <c:v>12544492.201459428</c:v>
-                </c:pt>
-                <c:pt idx="3">
-                  <c:v>2458059.5999999996</c:v>
-                </c:pt>
-                <c:pt idx="4">
-                  <c:v>10513956.649463998</c:v>
-                </c:pt>
-                <c:pt idx="5">
-                  <c:v>2602470.6014999994</c:v>
-                </c:pt>
-                <c:pt idx="6">
-                  <c:v>2726397.7729999991</c:v>
-                </c:pt>
-                <c:pt idx="7">
-                  <c:v>1701354.145672</c:v>
-                </c:pt>
-                <c:pt idx="8">
-                  <c:v>12126427.359999998</c:v>
-                </c:pt>
-                <c:pt idx="9">
-                  <c:v>8821361.3894999977</c:v>
-                </c:pt>
-                <c:pt idx="10">
-                  <c:v>28316846.591999989</c:v>
-                </c:pt>
-                <c:pt idx="11">
-                  <c:v>20292560.188991997</c:v>
-                </c:pt>
-                <c:pt idx="12">
-                  <c:v>8390176.7679999992</c:v>
-                </c:pt>
-                <c:pt idx="13">
-                  <c:v>8390176.7679999992</c:v>
-                </c:pt>
-                <c:pt idx="14">
-                  <c:v>8022369.1165199978</c:v>
-                </c:pt>
-                <c:pt idx="15">
-                  <c:v>8390176.7679999992</c:v>
-                </c:pt>
-                <c:pt idx="16">
-                  <c:v>13612785.274374999</c:v>
-                </c:pt>
-                <c:pt idx="17">
-                  <c:v>10874455.670399997</c:v>
-                </c:pt>
-                <c:pt idx="18">
-                  <c:v>12078904.874399997</c:v>
-                </c:pt>
-                <c:pt idx="19">
-                  <c:v>11715726.568499997</c:v>
-                </c:pt>
-              </c:numCache>
-            </c:numRef>
-          </c:bubbleSize>
-          <c:bubble3D val="0"/>
-        </c:ser>
-        <c:ser>
-          <c:idx val="1"/>
-          <c:order val="1"/>
-          <c:tx>
-            <c:strRef>
-              <c:f>Sheet1!$B$22</c:f>
-              <c:strCache>
-                <c:ptCount val="1"/>
-                <c:pt idx="0">
-                  <c:v>PAM</c:v>
-                </c:pt>
-              </c:strCache>
-            </c:strRef>
-          </c:tx>
-          <c:spPr>
-            <a:noFill/>
-            <a:ln w="38100">
-              <a:solidFill>
-                <a:srgbClr val="00B050"/>
-              </a:solidFill>
-            </a:ln>
-            <a:effectLst/>
-          </c:spPr>
-          <c:invertIfNegative val="0"/>
-          <c:xVal>
-            <c:numRef>
-              <c:f>(Sheet1!$G$22,Sheet1!$G$24,Sheet1!$G$25,Sheet1!$G$26,Sheet1!$G$27)</c:f>
-              <c:numCache>
-                <c:formatCode>#,##0</c:formatCode>
-                <c:ptCount val="5"/>
-                <c:pt idx="0">
-                  <c:v>7741.9199999999983</c:v>
-                </c:pt>
-                <c:pt idx="1">
-                  <c:v>15490.291600000002</c:v>
-                </c:pt>
-                <c:pt idx="2">
-                  <c:v>1161</c:v>
-                </c:pt>
-                <c:pt idx="3">
-                  <c:v>2880</c:v>
-                </c:pt>
-                <c:pt idx="4">
-                  <c:v>4554</c:v>
-                </c:pt>
-              </c:numCache>
-            </c:numRef>
-          </c:xVal>
-          <c:yVal>
-            <c:numRef>
-              <c:f>(Sheet1!$C$22,Sheet1!$C$24,Sheet1!$C$25,Sheet1!$C$26,Sheet1!$C$27)</c:f>
-              <c:numCache>
-                <c:formatCode>_("$"* #,##0.00_);_("$"* \(#,##0.00\);_("$"* "-"??_);_(@_)</c:formatCode>
-                <c:ptCount val="5"/>
-                <c:pt idx="0">
-                  <c:v>3375</c:v>
-                </c:pt>
-                <c:pt idx="1">
-                  <c:v>3299</c:v>
-                </c:pt>
-                <c:pt idx="2">
-                  <c:v>1999</c:v>
-                </c:pt>
-                <c:pt idx="3">
-                  <c:v>499</c:v>
-                </c:pt>
-                <c:pt idx="4">
-                  <c:v>399</c:v>
-                </c:pt>
-              </c:numCache>
-            </c:numRef>
-          </c:yVal>
-          <c:bubbleSize>
-            <c:numRef>
-              <c:f>(Sheet1!$H$22,Sheet1!$H$24,Sheet1!$H$25,Sheet1!$H$26,Sheet1!$H$27)</c:f>
-              <c:numCache>
-                <c:formatCode>#,##0</c:formatCode>
-                <c:ptCount val="5"/>
-                <c:pt idx="0">
-                  <c:v>1597738.7399999995</c:v>
-                </c:pt>
-                <c:pt idx="1">
-                  <c:v>2557447.1431600004</c:v>
-                </c:pt>
-                <c:pt idx="2">
-                  <c:v>208980</c:v>
-                </c:pt>
-                <c:pt idx="3">
-                  <c:v>288000</c:v>
-                </c:pt>
-                <c:pt idx="4">
-                  <c:v>694160</c:v>
-                </c:pt>
-              </c:numCache>
-            </c:numRef>
-          </c:bubbleSize>
-          <c:bubble3D val="0"/>
-        </c:ser>
-        <c:ser>
-          <c:idx val="2"/>
-          <c:order val="2"/>
-          <c:tx>
-            <c:strRef>
-              <c:f>Sheet1!$A$23</c:f>
-              <c:strCache>
-                <c:ptCount val="1"/>
-                <c:pt idx="0">
-                  <c:v>Project PAM</c:v>
-                </c:pt>
-              </c:strCache>
-            </c:strRef>
-          </c:tx>
-          <c:spPr>
-            <a:solidFill>
-              <a:schemeClr val="accent4"/>
-            </a:solidFill>
-            <a:ln w="25400">
-              <a:solidFill>
-                <a:schemeClr val="accent4"/>
-              </a:solidFill>
-            </a:ln>
-            <a:effectLst/>
-          </c:spPr>
-          <c:invertIfNegative val="0"/>
-          <c:xVal>
-            <c:numRef>
-              <c:f>Sheet1!$G$23</c:f>
-              <c:numCache>
-                <c:formatCode>#,##0</c:formatCode>
-                <c:ptCount val="1"/>
-                <c:pt idx="0">
-                  <c:v>41472</c:v>
-                </c:pt>
-              </c:numCache>
-            </c:numRef>
-          </c:xVal>
-          <c:yVal>
-            <c:numRef>
-              <c:f>Sheet1!$C$23</c:f>
-              <c:numCache>
-                <c:formatCode>_("$"* #,##0.00_);_("$"* \(#,##0.00\);_("$"* "-"??_);_(@_)</c:formatCode>
-                <c:ptCount val="1"/>
-                <c:pt idx="0">
-                  <c:v>1000</c:v>
-                </c:pt>
-              </c:numCache>
-            </c:numRef>
-          </c:yVal>
-          <c:bubbleSize>
-            <c:numRef>
-              <c:f>Sheet1!$H$23</c:f>
-              <c:numCache>
-                <c:formatCode>#,##0</c:formatCode>
-                <c:ptCount val="1"/>
-                <c:pt idx="0">
-                  <c:v>8957952</c:v>
-                </c:pt>
-              </c:numCache>
-            </c:numRef>
-          </c:bubbleSize>
-          <c:bubble3D val="0"/>
-        </c:ser>
-        <c:dLbls>
-          <c:showLegendKey val="0"/>
-          <c:showVal val="0"/>
-          <c:showCatName val="0"/>
-          <c:showSerName val="0"/>
-          <c:showPercent val="0"/>
-          <c:showBubbleSize val="0"/>
-        </c:dLbls>
-        <c:bubbleScale val="100"/>
-        <c:showNegBubbles val="0"/>
-        <c:axId val="-233978224"/>
-        <c:axId val="-234118352"/>
-      </c:bubbleChart>
-      <c:valAx>
-        <c:axId val="-233978224"/>
-        <c:scaling>
-          <c:orientation val="minMax"/>
-          <c:min val="0"/>
-        </c:scaling>
-        <c:delete val="0"/>
-        <c:axPos val="b"/>
-        <c:majorGridlines>
-          <c:spPr>
-            <a:ln w="9525" cap="flat" cmpd="sng" algn="ctr">
-              <a:solidFill>
-                <a:schemeClr val="tx1">
-                  <a:lumMod val="15000"/>
-                  <a:lumOff val="85000"/>
-                </a:schemeClr>
-              </a:solidFill>
-              <a:round/>
-            </a:ln>
-            <a:effectLst/>
-          </c:spPr>
-        </c:majorGridlines>
-        <c:title>
-          <c:tx>
-            <c:rich>
-              <a:bodyPr rot="0" spcFirstLastPara="1" vertOverflow="ellipsis" vert="horz" wrap="square" anchor="ctr" anchorCtr="1"/>
-              <a:lstStyle/>
-              <a:p>
-                <a:pPr>
-                  <a:defRPr sz="1600" b="0" i="0" u="none" strike="noStrike" kern="1200" baseline="0">
-                    <a:solidFill>
-                      <a:schemeClr val="tx1">
-                        <a:lumMod val="65000"/>
-                        <a:lumOff val="35000"/>
-                      </a:schemeClr>
-                    </a:solidFill>
-                    <a:latin typeface="+mn-lt"/>
-                    <a:ea typeface="+mn-ea"/>
-                    <a:cs typeface="+mn-cs"/>
-                  </a:defRPr>
-                </a:pPr>
-                <a:r>
-                  <a:rPr lang="en-US" sz="1600"/>
-                  <a:t>Build Area (mm</a:t>
-                </a:r>
-                <a:r>
-                  <a:rPr lang="en-US" sz="1600" baseline="30000"/>
-                  <a:t>2</a:t>
-                </a:r>
-                <a:r>
-                  <a:rPr lang="en-US" sz="1600"/>
-                  <a:t>)</a:t>
-                </a:r>
-              </a:p>
-            </c:rich>
-          </c:tx>
-          <c:overlay val="0"/>
-          <c:spPr>
-            <a:noFill/>
-            <a:ln>
-              <a:noFill/>
-            </a:ln>
-            <a:effectLst/>
-          </c:spPr>
-          <c:txPr>
-            <a:bodyPr rot="0" spcFirstLastPara="1" vertOverflow="ellipsis" vert="horz" wrap="square" anchor="ctr" anchorCtr="1"/>
-            <a:lstStyle/>
-            <a:p>
-              <a:pPr>
-                <a:defRPr sz="1600" b="0" i="0" u="none" strike="noStrike" kern="1200" baseline="0">
-                  <a:solidFill>
-                    <a:schemeClr val="tx1">
-                      <a:lumMod val="65000"/>
-                      <a:lumOff val="35000"/>
-                    </a:schemeClr>
-                  </a:solidFill>
-                  <a:latin typeface="+mn-lt"/>
-                  <a:ea typeface="+mn-ea"/>
-                  <a:cs typeface="+mn-cs"/>
-                </a:defRPr>
-              </a:pPr>
-              <a:endParaRPr lang="en-US"/>
-            </a:p>
-          </c:txPr>
-        </c:title>
-        <c:numFmt formatCode="#,##0" sourceLinked="1"/>
-        <c:majorTickMark val="none"/>
-        <c:minorTickMark val="none"/>
-        <c:tickLblPos val="nextTo"/>
-        <c:spPr>
-          <a:noFill/>
-          <a:ln>
-            <a:solidFill>
-              <a:schemeClr val="bg1">
-                <a:lumMod val="65000"/>
-              </a:schemeClr>
-            </a:solidFill>
-          </a:ln>
-          <a:effectLst/>
-        </c:spPr>
-        <c:txPr>
-          <a:bodyPr rot="-60000000" spcFirstLastPara="1" vertOverflow="ellipsis" vert="horz" wrap="square" anchor="ctr" anchorCtr="1"/>
-          <a:lstStyle/>
-          <a:p>
-            <a:pPr>
-              <a:defRPr sz="1600" b="0" i="0" u="none" strike="noStrike" kern="1200" baseline="0">
-                <a:solidFill>
-                  <a:schemeClr val="tx1">
-                    <a:lumMod val="65000"/>
-                    <a:lumOff val="35000"/>
-                  </a:schemeClr>
-                </a:solidFill>
-                <a:latin typeface="+mn-lt"/>
-                <a:ea typeface="+mn-ea"/>
-                <a:cs typeface="+mn-cs"/>
-              </a:defRPr>
-            </a:pPr>
-            <a:endParaRPr lang="en-US"/>
-          </a:p>
-        </c:txPr>
-        <c:crossAx val="-234118352"/>
-        <c:crosses val="autoZero"/>
-        <c:crossBetween val="midCat"/>
-      </c:valAx>
-      <c:valAx>
-        <c:axId val="-234118352"/>
-        <c:scaling>
-          <c:orientation val="minMax"/>
-          <c:max val="3500"/>
-          <c:min val="0"/>
-        </c:scaling>
-        <c:delete val="0"/>
-        <c:axPos val="l"/>
-        <c:majorGridlines>
-          <c:spPr>
-            <a:ln w="9525" cap="flat" cmpd="sng" algn="ctr">
-              <a:solidFill>
-                <a:schemeClr val="tx1">
-                  <a:lumMod val="15000"/>
-                  <a:lumOff val="85000"/>
-                </a:schemeClr>
-              </a:solidFill>
-              <a:round/>
-            </a:ln>
-            <a:effectLst/>
-          </c:spPr>
-        </c:majorGridlines>
-        <c:title>
-          <c:tx>
-            <c:rich>
-              <a:bodyPr rot="-5400000" spcFirstLastPara="1" vertOverflow="ellipsis" vert="horz" wrap="square" anchor="ctr" anchorCtr="1"/>
-              <a:lstStyle/>
-              <a:p>
-                <a:pPr>
-                  <a:defRPr sz="1600" b="0" i="0" u="none" strike="noStrike" kern="1200" baseline="0">
-                    <a:solidFill>
-                      <a:schemeClr val="tx1">
-                        <a:lumMod val="65000"/>
-                        <a:lumOff val="35000"/>
-                      </a:schemeClr>
-                    </a:solidFill>
-                    <a:latin typeface="+mn-lt"/>
-                    <a:ea typeface="+mn-ea"/>
-                    <a:cs typeface="+mn-cs"/>
-                  </a:defRPr>
-                </a:pPr>
-                <a:r>
-                  <a:rPr lang="en-US" sz="1600"/>
-                  <a:t>Cost</a:t>
-                </a:r>
-                <a:r>
-                  <a:rPr lang="en-US" sz="1600" baseline="0"/>
-                  <a:t> ($)</a:t>
-                </a:r>
-                <a:endParaRPr lang="en-US" sz="1600"/>
-              </a:p>
-            </c:rich>
-          </c:tx>
-          <c:overlay val="0"/>
-          <c:spPr>
-            <a:noFill/>
-            <a:ln>
-              <a:noFill/>
-            </a:ln>
-            <a:effectLst/>
-          </c:spPr>
-          <c:txPr>
-            <a:bodyPr rot="-5400000" spcFirstLastPara="1" vertOverflow="ellipsis" vert="horz" wrap="square" anchor="ctr" anchorCtr="1"/>
-            <a:lstStyle/>
-            <a:p>
-              <a:pPr>
-                <a:defRPr sz="1600" b="0" i="0" u="none" strike="noStrike" kern="1200" baseline="0">
-                  <a:solidFill>
-                    <a:schemeClr val="tx1">
-                      <a:lumMod val="65000"/>
-                      <a:lumOff val="35000"/>
-                    </a:schemeClr>
-                  </a:solidFill>
-                  <a:latin typeface="+mn-lt"/>
-                  <a:ea typeface="+mn-ea"/>
-                  <a:cs typeface="+mn-cs"/>
-                </a:defRPr>
-              </a:pPr>
-              <a:endParaRPr lang="en-US"/>
-            </a:p>
-          </c:txPr>
-        </c:title>
-        <c:numFmt formatCode="_(&quot;$&quot;* #,##0_);_(&quot;$&quot;* \(#,##0\);_(&quot;$&quot;* &quot;-&quot;_);_(@_)" sourceLinked="0"/>
-        <c:majorTickMark val="none"/>
-        <c:minorTickMark val="none"/>
-        <c:tickLblPos val="nextTo"/>
-        <c:spPr>
-          <a:noFill/>
-          <a:ln>
-            <a:solidFill>
-              <a:schemeClr val="bg1">
-                <a:lumMod val="65000"/>
-              </a:schemeClr>
-            </a:solidFill>
-          </a:ln>
-          <a:effectLst/>
-        </c:spPr>
-        <c:txPr>
-          <a:bodyPr rot="-60000000" spcFirstLastPara="1" vertOverflow="ellipsis" vert="horz" wrap="square" anchor="ctr" anchorCtr="1"/>
-          <a:lstStyle/>
-          <a:p>
-            <a:pPr>
-              <a:defRPr sz="1600" b="0" i="0" u="none" strike="noStrike" kern="1200" baseline="0">
-                <a:solidFill>
-                  <a:schemeClr val="tx1">
-                    <a:lumMod val="65000"/>
-                    <a:lumOff val="35000"/>
-                  </a:schemeClr>
-                </a:solidFill>
-                <a:latin typeface="+mn-lt"/>
-                <a:ea typeface="+mn-ea"/>
-                <a:cs typeface="+mn-cs"/>
-              </a:defRPr>
-            </a:pPr>
-            <a:endParaRPr lang="en-US"/>
-          </a:p>
-        </c:txPr>
-        <c:crossAx val="-233978224"/>
-        <c:crosses val="autoZero"/>
-        <c:crossBetween val="midCat"/>
-      </c:valAx>
-      <c:spPr>
-        <a:noFill/>
-        <a:ln>
-          <a:noFill/>
-        </a:ln>
-        <a:effectLst/>
-      </c:spPr>
-    </c:plotArea>
-    <c:legend>
-      <c:legendPos val="r"/>
-      <c:layout>
-        <c:manualLayout>
-          <c:xMode val="edge"/>
-          <c:yMode val="edge"/>
-          <c:x val="0.80156184031668198"/>
-          <c:y val="0.10487643491113739"/>
-          <c:w val="0.19843815968331802"/>
-          <c:h val="0.15200665107292949"/>
-        </c:manualLayout>
-      </c:layout>
-      <c:overlay val="1"/>
-      <c:spPr>
-        <a:noFill/>
-        <a:ln>
-          <a:noFill/>
-        </a:ln>
-        <a:effectLst/>
-      </c:spPr>
-      <c:txPr>
-        <a:bodyPr rot="0" spcFirstLastPara="1" vertOverflow="ellipsis" vert="horz" wrap="square" anchor="ctr" anchorCtr="1"/>
-        <a:lstStyle/>
-        <a:p>
-          <a:pPr>
-            <a:defRPr sz="1600" b="0" i="0" u="none" strike="noStrike" kern="1200" baseline="0">
-              <a:solidFill>
-                <a:schemeClr val="tx1">
-                  <a:lumMod val="65000"/>
-                  <a:lumOff val="35000"/>
-                </a:schemeClr>
-              </a:solidFill>
-              <a:latin typeface="+mn-lt"/>
-              <a:ea typeface="+mn-ea"/>
-              <a:cs typeface="+mn-cs"/>
-            </a:defRPr>
-          </a:pPr>
-          <a:endParaRPr lang="en-US"/>
-        </a:p>
-      </c:txPr>
-    </c:legend>
-    <c:plotVisOnly val="1"/>
-    <c:dispBlanksAs val="gap"/>
-    <c:showDLblsOverMax val="0"/>
-  </c:chart>
-  <c:spPr>
-    <a:noFill/>
-    <a:ln>
-      <a:noFill/>
-    </a:ln>
-    <a:effectLst/>
-  </c:spPr>
-  <c:txPr>
-    <a:bodyPr/>
-    <a:lstStyle/>
-    <a:p>
-      <a:pPr>
-        <a:defRPr/>
-      </a:pPr>
-      <a:endParaRPr lang="en-US"/>
-    </a:p>
-  </c:txPr>
-  <c:externalData r:id="rId3">
-    <c:autoUpdate val="0"/>
-  </c:externalData>
-  <c:userShapes r:id="rId4"/>
-</c:chartSpace>
-</file>
-
-<file path=ppt/charts/colors1.xml><?xml version="1.0" encoding="utf-8"?>
-<cs:colorStyle xmlns:cs="http://schemas.microsoft.com/office/drawing/2012/chartStyle" xmlns:a="http://schemas.openxmlformats.org/drawingml/2006/main" meth="cycle" id="10">
-  <a:schemeClr val="accent1"/>
-  <a:schemeClr val="accent2"/>
-  <a:schemeClr val="accent3"/>
-  <a:schemeClr val="accent4"/>
-  <a:schemeClr val="accent5"/>
-  <a:schemeClr val="accent6"/>
-  <cs:variation/>
-  <cs:variation>
-    <a:lumMod val="60000"/>
-  </cs:variation>
-  <cs:variation>
-    <a:lumMod val="80000"/>
-    <a:lumOff val="20000"/>
-  </cs:variation>
-  <cs:variation>
-    <a:lumMod val="80000"/>
-  </cs:variation>
-  <cs:variation>
-    <a:lumMod val="60000"/>
-    <a:lumOff val="40000"/>
-  </cs:variation>
-  <cs:variation>
-    <a:lumMod val="50000"/>
-  </cs:variation>
-  <cs:variation>
-    <a:lumMod val="70000"/>
-    <a:lumOff val="30000"/>
-  </cs:variation>
-  <cs:variation>
-    <a:lumMod val="70000"/>
-  </cs:variation>
-  <cs:variation>
-    <a:lumMod val="50000"/>
-    <a:lumOff val="50000"/>
-  </cs:variation>
-</cs:colorStyle>
-</file>
-
-<file path=ppt/charts/style1.xml><?xml version="1.0" encoding="utf-8"?>
-<cs:chartStyle xmlns:cs="http://schemas.microsoft.com/office/drawing/2012/chartStyle" xmlns:a="http://schemas.openxmlformats.org/drawingml/2006/main" id="201">
-  <cs:axisTitle>
-    <cs:lnRef idx="0"/>
-    <cs:fillRef idx="0"/>
-    <cs:effectRef idx="0"/>
-    <cs:fontRef idx="minor">
-      <a:schemeClr val="tx1">
-        <a:lumMod val="65000"/>
-        <a:lumOff val="35000"/>
-      </a:schemeClr>
-    </cs:fontRef>
-    <cs:defRPr sz="1000" kern="1200"/>
-  </cs:axisTitle>
-  <cs:categoryAxis>
-    <cs:lnRef idx="0"/>
-    <cs:fillRef idx="0"/>
-    <cs:effectRef idx="0"/>
-    <cs:fontRef idx="minor">
-      <a:schemeClr val="tx1">
-        <a:lumMod val="65000"/>
-        <a:lumOff val="35000"/>
-      </a:schemeClr>
-    </cs:fontRef>
-    <cs:spPr>
-      <a:ln w="9525" cap="flat" cmpd="sng" algn="ctr">
-        <a:solidFill>
-          <a:schemeClr val="tx1">
-            <a:lumMod val="15000"/>
-            <a:lumOff val="85000"/>
-          </a:schemeClr>
-        </a:solidFill>
-        <a:round/>
-      </a:ln>
-    </cs:spPr>
-    <cs:defRPr sz="900" kern="1200"/>
-  </cs:categoryAxis>
-  <cs:chartArea mods="allowNoFillOverride allowNoLineOverride">
-    <cs:lnRef idx="0"/>
-    <cs:fillRef idx="0"/>
-    <cs:effectRef idx="0"/>
-    <cs:fontRef idx="minor">
-      <a:schemeClr val="tx1"/>
-    </cs:fontRef>
-    <cs:spPr>
-      <a:solidFill>
-        <a:schemeClr val="bg1"/>
-      </a:solidFill>
-      <a:ln w="9525" cap="flat" cmpd="sng" algn="ctr">
-        <a:solidFill>
-          <a:schemeClr val="tx1">
-            <a:lumMod val="15000"/>
-            <a:lumOff val="85000"/>
-          </a:schemeClr>
-        </a:solidFill>
-        <a:round/>
-      </a:ln>
-    </cs:spPr>
-    <cs:defRPr sz="1000" kern="1200"/>
-  </cs:chartArea>
-  <cs:dataLabel>
-    <cs:lnRef idx="0"/>
-    <cs:fillRef idx="0"/>
-    <cs:effectRef idx="0"/>
-    <cs:fontRef idx="minor">
-      <a:schemeClr val="tx1">
-        <a:lumMod val="75000"/>
-        <a:lumOff val="25000"/>
-      </a:schemeClr>
-    </cs:fontRef>
-    <cs:defRPr sz="900" kern="1200"/>
-  </cs:dataLabel>
-  <cs:dataLabelCallout>
-    <cs:lnRef idx="0"/>
-    <cs:fillRef idx="0"/>
-    <cs:effectRef idx="0"/>
-    <cs:fontRef idx="minor">
-      <a:schemeClr val="dk1">
-        <a:lumMod val="65000"/>
-        <a:lumOff val="35000"/>
-      </a:schemeClr>
-    </cs:fontRef>
-    <cs:spPr>
-      <a:solidFill>
-        <a:schemeClr val="lt1"/>
-      </a:solidFill>
-      <a:ln>
-        <a:solidFill>
-          <a:schemeClr val="dk1">
-            <a:lumMod val="25000"/>
-            <a:lumOff val="75000"/>
-          </a:schemeClr>
-        </a:solidFill>
-      </a:ln>
-    </cs:spPr>
-    <cs:defRPr sz="900" kern="1200"/>
-    <cs:bodyPr rot="0" spcFirstLastPara="1" vertOverflow="clip" horzOverflow="clip" vert="horz" wrap="square" lIns="36576" tIns="18288" rIns="36576" bIns="18288" anchor="ctr" anchorCtr="1">
-      <a:spAutoFit/>
-    </cs:bodyPr>
-  </cs:dataLabelCallout>
-  <cs:dataPoint>
-    <cs:lnRef idx="0"/>
-    <cs:fillRef idx="1">
-      <cs:styleClr val="auto"/>
-    </cs:fillRef>
-    <cs:effectRef idx="0"/>
-    <cs:fontRef idx="minor">
-      <a:schemeClr val="tx1"/>
-    </cs:fontRef>
-  </cs:dataPoint>
-  <cs:dataPoint3D>
-    <cs:lnRef idx="0"/>
-    <cs:fillRef idx="1">
-      <cs:styleClr val="auto"/>
-    </cs:fillRef>
-    <cs:effectRef idx="0"/>
-    <cs:fontRef idx="minor">
-      <a:schemeClr val="tx1"/>
-    </cs:fontRef>
-  </cs:dataPoint3D>
-  <cs:dataPointLine>
-    <cs:lnRef idx="0">
-      <cs:styleClr val="auto"/>
-    </cs:lnRef>
-    <cs:fillRef idx="1"/>
-    <cs:effectRef idx="0"/>
-    <cs:fontRef idx="minor">
-      <a:schemeClr val="tx1"/>
-    </cs:fontRef>
-    <cs:spPr>
-      <a:ln w="28575" cap="rnd">
-        <a:solidFill>
-          <a:schemeClr val="phClr"/>
-        </a:solidFill>
-        <a:round/>
-      </a:ln>
-    </cs:spPr>
-  </cs:dataPointLine>
-  <cs:dataPointMarker>
-    <cs:lnRef idx="0">
-      <cs:styleClr val="auto"/>
-    </cs:lnRef>
-    <cs:fillRef idx="1">
-      <cs:styleClr val="auto"/>
-    </cs:fillRef>
-    <cs:effectRef idx="0"/>
-    <cs:fontRef idx="minor">
-      <a:schemeClr val="tx1"/>
-    </cs:fontRef>
-    <cs:spPr>
-      <a:ln w="9525">
-        <a:solidFill>
-          <a:schemeClr val="phClr"/>
-        </a:solidFill>
-      </a:ln>
-    </cs:spPr>
-  </cs:dataPointMarker>
-  <cs:dataPointMarkerLayout symbol="circle" size="5"/>
-  <cs:dataPointWireframe>
-    <cs:lnRef idx="0">
-      <cs:styleClr val="auto"/>
-    </cs:lnRef>
-    <cs:fillRef idx="1"/>
-    <cs:effectRef idx="0"/>
-    <cs:fontRef idx="minor">
-      <a:schemeClr val="tx1"/>
-    </cs:fontRef>
-    <cs:spPr>
-      <a:ln w="9525" cap="rnd">
-        <a:solidFill>
-          <a:schemeClr val="phClr"/>
-        </a:solidFill>
-        <a:round/>
-      </a:ln>
-    </cs:spPr>
-  </cs:dataPointWireframe>
-  <cs:dataTable>
-    <cs:lnRef idx="0"/>
-    <cs:fillRef idx="0"/>
-    <cs:effectRef idx="0"/>
-    <cs:fontRef idx="minor">
-      <a:schemeClr val="tx1">
-        <a:lumMod val="65000"/>
-        <a:lumOff val="35000"/>
-      </a:schemeClr>
-    </cs:fontRef>
-    <cs:spPr>
-      <a:noFill/>
-      <a:ln w="9525" cap="flat" cmpd="sng" algn="ctr">
-        <a:solidFill>
-          <a:schemeClr val="tx1">
-            <a:lumMod val="15000"/>
-            <a:lumOff val="85000"/>
-          </a:schemeClr>
-        </a:solidFill>
-        <a:round/>
-      </a:ln>
-    </cs:spPr>
-    <cs:defRPr sz="900" kern="1200"/>
-  </cs:dataTable>
-  <cs:downBar>
-    <cs:lnRef idx="0"/>
-    <cs:fillRef idx="0"/>
-    <cs:effectRef idx="0"/>
-    <cs:fontRef idx="minor">
-      <a:schemeClr val="dk1"/>
-    </cs:fontRef>
-    <cs:spPr>
-      <a:solidFill>
-        <a:schemeClr val="dk1">
-          <a:lumMod val="65000"/>
-          <a:lumOff val="35000"/>
-        </a:schemeClr>
-      </a:solidFill>
-      <a:ln w="9525">
-        <a:solidFill>
-          <a:schemeClr val="tx1">
-            <a:lumMod val="65000"/>
-            <a:lumOff val="35000"/>
-          </a:schemeClr>
-        </a:solidFill>
-      </a:ln>
-    </cs:spPr>
-  </cs:downBar>
-  <cs:dropLine>
-    <cs:lnRef idx="0"/>
-    <cs:fillRef idx="0"/>
-    <cs:effectRef idx="0"/>
-    <cs:fontRef idx="minor">
-      <a:schemeClr val="tx1"/>
-    </cs:fontRef>
-    <cs:spPr>
-      <a:ln w="9525" cap="flat" cmpd="sng" algn="ctr">
-        <a:solidFill>
-          <a:schemeClr val="tx1">
-            <a:lumMod val="35000"/>
-            <a:lumOff val="65000"/>
-          </a:schemeClr>
-        </a:solidFill>
-        <a:round/>
-      </a:ln>
-    </cs:spPr>
-  </cs:dropLine>
-  <cs:errorBar>
-    <cs:lnRef idx="0"/>
-    <cs:fillRef idx="0"/>
-    <cs:effectRef idx="0"/>
-    <cs:fontRef idx="minor">
-      <a:schemeClr val="tx1"/>
-    </cs:fontRef>
-    <cs:spPr>
-      <a:ln w="9525" cap="flat" cmpd="sng" algn="ctr">
-        <a:solidFill>
-          <a:schemeClr val="tx1">
-            <a:lumMod val="65000"/>
-            <a:lumOff val="35000"/>
-          </a:schemeClr>
-        </a:solidFill>
-        <a:round/>
-      </a:ln>
-    </cs:spPr>
-  </cs:errorBar>
-  <cs:floor>
-    <cs:lnRef idx="0"/>
-    <cs:fillRef idx="0"/>
-    <cs:effectRef idx="0"/>
-    <cs:fontRef idx="minor">
-      <a:schemeClr val="tx1"/>
-    </cs:fontRef>
-    <cs:spPr>
-      <a:noFill/>
-      <a:ln>
-        <a:noFill/>
-      </a:ln>
-    </cs:spPr>
-  </cs:floor>
-  <cs:gridlineMajor>
-    <cs:lnRef idx="0"/>
-    <cs:fillRef idx="0"/>
-    <cs:effectRef idx="0"/>
-    <cs:fontRef idx="minor">
-      <a:schemeClr val="tx1"/>
-    </cs:fontRef>
-    <cs:spPr>
-      <a:ln w="9525" cap="flat" cmpd="sng" algn="ctr">
-        <a:solidFill>
-          <a:schemeClr val="tx1">
-            <a:lumMod val="15000"/>
-            <a:lumOff val="85000"/>
-          </a:schemeClr>
-        </a:solidFill>
-        <a:round/>
-      </a:ln>
-    </cs:spPr>
-  </cs:gridlineMajor>
-  <cs:gridlineMinor>
-    <cs:lnRef idx="0"/>
-    <cs:fillRef idx="0"/>
-    <cs:effectRef idx="0"/>
-    <cs:fontRef idx="minor">
-      <a:schemeClr val="tx1"/>
-    </cs:fontRef>
-    <cs:spPr>
-      <a:ln w="9525" cap="flat" cmpd="sng" algn="ctr">
-        <a:solidFill>
-          <a:schemeClr val="tx1">
-            <a:lumMod val="5000"/>
-            <a:lumOff val="95000"/>
-          </a:schemeClr>
-        </a:solidFill>
-        <a:round/>
-      </a:ln>
-    </cs:spPr>
-  </cs:gridlineMinor>
-  <cs:hiLoLine>
-    <cs:lnRef idx="0"/>
-    <cs:fillRef idx="0"/>
-    <cs:effectRef idx="0"/>
-    <cs:fontRef idx="minor">
-      <a:schemeClr val="tx1"/>
-    </cs:fontRef>
-    <cs:spPr>
-      <a:ln w="9525" cap="flat" cmpd="sng" algn="ctr">
-        <a:solidFill>
-          <a:schemeClr val="tx1">
-            <a:lumMod val="75000"/>
-            <a:lumOff val="25000"/>
-          </a:schemeClr>
-        </a:solidFill>
-        <a:round/>
-      </a:ln>
-    </cs:spPr>
-  </cs:hiLoLine>
-  <cs:leaderLine>
-    <cs:lnRef idx="0"/>
-    <cs:fillRef idx="0"/>
-    <cs:effectRef idx="0"/>
-    <cs:fontRef idx="minor">
-      <a:schemeClr val="tx1"/>
-    </cs:fontRef>
-    <cs:spPr>
-      <a:ln w="9525" cap="flat" cmpd="sng" algn="ctr">
-        <a:solidFill>
-          <a:schemeClr val="tx1">
-            <a:lumMod val="35000"/>
-            <a:lumOff val="65000"/>
-          </a:schemeClr>
-        </a:solidFill>
-        <a:round/>
-      </a:ln>
-    </cs:spPr>
-  </cs:leaderLine>
-  <cs:legend>
-    <cs:lnRef idx="0"/>
-    <cs:fillRef idx="0"/>
-    <cs:effectRef idx="0"/>
-    <cs:fontRef idx="minor">
-      <a:schemeClr val="tx1">
-        <a:lumMod val="65000"/>
-        <a:lumOff val="35000"/>
-      </a:schemeClr>
-    </cs:fontRef>
-    <cs:defRPr sz="900" kern="1200"/>
-  </cs:legend>
-  <cs:plotArea mods="allowNoFillOverride allowNoLineOverride">
-    <cs:lnRef idx="0"/>
-    <cs:fillRef idx="0"/>
-    <cs:effectRef idx="0"/>
-    <cs:fontRef idx="minor">
-      <a:schemeClr val="tx1"/>
-    </cs:fontRef>
-  </cs:plotArea>
-  <cs:plotArea3D mods="allowNoFillOverride allowNoLineOverride">
-    <cs:lnRef idx="0"/>
-    <cs:fillRef idx="0"/>
-    <cs:effectRef idx="0"/>
-    <cs:fontRef idx="minor">
-      <a:schemeClr val="tx1"/>
-    </cs:fontRef>
-  </cs:plotArea3D>
-  <cs:seriesAxis>
-    <cs:lnRef idx="0"/>
-    <cs:fillRef idx="0"/>
-    <cs:effectRef idx="0"/>
-    <cs:fontRef idx="minor">
-      <a:schemeClr val="tx1">
-        <a:lumMod val="65000"/>
-        <a:lumOff val="35000"/>
-      </a:schemeClr>
-    </cs:fontRef>
-    <cs:defRPr sz="900" kern="1200"/>
-  </cs:seriesAxis>
-  <cs:seriesLine>
-    <cs:lnRef idx="0"/>
-    <cs:fillRef idx="0"/>
-    <cs:effectRef idx="0"/>
-    <cs:fontRef idx="minor">
-      <a:schemeClr val="tx1"/>
-    </cs:fontRef>
-    <cs:spPr>
-      <a:ln w="9525" cap="flat" cmpd="sng" algn="ctr">
-        <a:solidFill>
-          <a:schemeClr val="tx1">
-            <a:lumMod val="35000"/>
-            <a:lumOff val="65000"/>
-          </a:schemeClr>
-        </a:solidFill>
-        <a:round/>
-      </a:ln>
-    </cs:spPr>
-  </cs:seriesLine>
-  <cs:title>
-    <cs:lnRef idx="0"/>
-    <cs:fillRef idx="0"/>
-    <cs:effectRef idx="0"/>
-    <cs:fontRef idx="minor">
-      <a:schemeClr val="tx1">
-        <a:lumMod val="65000"/>
-        <a:lumOff val="35000"/>
-      </a:schemeClr>
-    </cs:fontRef>
-    <cs:defRPr sz="1400" b="0" kern="1200" spc="0" baseline="0"/>
-  </cs:title>
-  <cs:trendline>
-    <cs:lnRef idx="0">
-      <cs:styleClr val="auto"/>
-    </cs:lnRef>
-    <cs:fillRef idx="0"/>
-    <cs:effectRef idx="0"/>
-    <cs:fontRef idx="minor">
-      <a:schemeClr val="tx1"/>
-    </cs:fontRef>
-    <cs:spPr>
-      <a:ln w="19050" cap="rnd">
-        <a:solidFill>
-          <a:schemeClr val="phClr"/>
-        </a:solidFill>
-        <a:prstDash val="sysDot"/>
-      </a:ln>
-    </cs:spPr>
-  </cs:trendline>
-  <cs:trendlineLabel>
-    <cs:lnRef idx="0"/>
-    <cs:fillRef idx="0"/>
-    <cs:effectRef idx="0"/>
-    <cs:fontRef idx="minor">
-      <a:schemeClr val="tx1">
-        <a:lumMod val="65000"/>
-        <a:lumOff val="35000"/>
-      </a:schemeClr>
-    </cs:fontRef>
-    <cs:defRPr sz="900" kern="1200"/>
-  </cs:trendlineLabel>
-  <cs:upBar>
-    <cs:lnRef idx="0"/>
-    <cs:fillRef idx="0"/>
-    <cs:effectRef idx="0"/>
-    <cs:fontRef idx="minor">
-      <a:schemeClr val="dk1"/>
-    </cs:fontRef>
-    <cs:spPr>
-      <a:solidFill>
-        <a:schemeClr val="lt1"/>
-      </a:solidFill>
-      <a:ln w="9525">
-        <a:solidFill>
-          <a:schemeClr val="tx1">
-            <a:lumMod val="15000"/>
-            <a:lumOff val="85000"/>
-          </a:schemeClr>
-        </a:solidFill>
-      </a:ln>
-    </cs:spPr>
-  </cs:upBar>
-  <cs:valueAxis>
-    <cs:lnRef idx="0"/>
-    <cs:fillRef idx="0"/>
-    <cs:effectRef idx="0"/>
-    <cs:fontRef idx="minor">
-      <a:schemeClr val="tx1">
-        <a:lumMod val="65000"/>
-        <a:lumOff val="35000"/>
-      </a:schemeClr>
-    </cs:fontRef>
-    <cs:defRPr sz="900" kern="1200"/>
-  </cs:valueAxis>
-  <cs:wall>
-    <cs:lnRef idx="0"/>
-    <cs:fillRef idx="0"/>
-    <cs:effectRef idx="0"/>
-    <cs:fontRef idx="minor">
-      <a:schemeClr val="tx1"/>
-    </cs:fontRef>
-    <cs:spPr>
-      <a:noFill/>
-      <a:ln>
-        <a:noFill/>
-      </a:ln>
-    </cs:spPr>
-  </cs:wall>
-</cs:chartStyle>
-</file>
-
-<file path=ppt/drawings/drawing1.xml><?xml version="1.0" encoding="utf-8"?>
-<c:userShapes xmlns:c="http://schemas.openxmlformats.org/drawingml/2006/chart">
-  <cdr:relSizeAnchor xmlns:cdr="http://schemas.openxmlformats.org/drawingml/2006/chartDrawing">
-    <cdr:from>
-      <cdr:x>0.74789</cdr:x>
-      <cdr:y>0.62498</cdr:y>
-    </cdr:from>
-    <cdr:to>
-      <cdr:x>0.96318</cdr:x>
-      <cdr:y>0.83963</cdr:y>
-    </cdr:to>
-    <cdr:sp macro="" textlink="">
-      <cdr:nvSpPr>
-        <cdr:cNvPr id="2" name="TextBox 1"/>
-        <cdr:cNvSpPr txBox="1"/>
-      </cdr:nvSpPr>
-      <cdr:spPr>
-        <a:xfrm xmlns:a="http://schemas.openxmlformats.org/drawingml/2006/main">
-          <a:off x="5936060" y="3252002"/>
-          <a:ext cx="1708767" cy="1116904"/>
-        </a:xfrm>
-        <a:prstGeom xmlns:a="http://schemas.openxmlformats.org/drawingml/2006/main" prst="rect">
-          <a:avLst/>
-        </a:prstGeom>
-      </cdr:spPr>
-      <cdr:txBody>
-        <a:bodyPr xmlns:a="http://schemas.openxmlformats.org/drawingml/2006/main" vertOverflow="clip" wrap="square" rtlCol="0"/>
-        <a:lstStyle xmlns:a="http://schemas.openxmlformats.org/drawingml/2006/main"/>
-        <a:p xmlns:a="http://schemas.openxmlformats.org/drawingml/2006/main">
-          <a:r>
-            <a:rPr lang="en-US" sz="1600" dirty="0"/>
-            <a:t>Bubble size is build volume in mm</a:t>
-          </a:r>
-          <a:r>
-            <a:rPr lang="en-US" sz="1600" baseline="30000" dirty="0"/>
-            <a:t>3</a:t>
-          </a:r>
-        </a:p>
-      </cdr:txBody>
-    </cdr:sp>
-  </cdr:relSizeAnchor>
-</c:userShapes>
 </file>
 
 <file path=ppt/notesMasters/notesMaster1.xml><?xml version="1.0" encoding="utf-8"?>
@@ -8203,7 +6807,7 @@
       </p:grpSpPr>
       <p:sp>
         <p:nvSpPr>
-          <p:cNvPr id="2" name="Title 1"/>
+          <p:cNvPr id="5" name="Title 4"/>
           <p:cNvSpPr>
             <a:spLocks noGrp="1"/>
           </p:cNvSpPr>
@@ -8213,36 +6817,74 @@
         </p:nvSpPr>
         <p:spPr/>
         <p:txBody>
-          <a:bodyPr/>
-          <a:lstStyle/>
-          <a:p>
-            <a:r>
-              <a:rPr lang="en-US" dirty="0" smtClean="0"/>
-              <a:t>Technical Drawings</a:t>
-            </a:r>
-            <a:endParaRPr lang="en-US" dirty="0"/>
-          </a:p>
-        </p:txBody>
-      </p:sp>
-      <p:sp>
-        <p:nvSpPr>
-          <p:cNvPr id="3" name="Content Placeholder 2"/>
-          <p:cNvSpPr>
-            <a:spLocks noGrp="1"/>
-          </p:cNvSpPr>
-          <p:nvPr>
-            <p:ph idx="1"/>
-          </p:nvPr>
-        </p:nvSpPr>
-        <p:spPr/>
-        <p:txBody>
-          <a:bodyPr/>
-          <a:lstStyle/>
-          <a:p>
-            <a:endParaRPr lang="en-US"/>
-          </a:p>
-        </p:txBody>
-      </p:sp>
+          <a:bodyPr>
+            <a:normAutofit fontScale="90000"/>
+          </a:bodyPr>
+          <a:lstStyle/>
+          <a:p>
+            <a:r>
+              <a:rPr lang="en-US" dirty="0"/>
+              <a:t>Chassis Design</a:t>
+            </a:r>
+          </a:p>
+        </p:txBody>
+      </p:sp>
+      <p:pic>
+        <p:nvPicPr>
+          <p:cNvPr id="10" name="Content Placeholder 9"/>
+          <p:cNvPicPr>
+            <a:picLocks noGrp="1" noChangeAspect="1"/>
+          </p:cNvPicPr>
+          <p:nvPr>
+            <p:ph sz="half" idx="1"/>
+          </p:nvPr>
+        </p:nvPicPr>
+        <p:blipFill rotWithShape="1">
+          <a:blip r:embed="rId2" cstate="print">
+            <a:extLst>
+              <a:ext uri="{28A0092B-C50C-407E-A947-70E740481C1C}">
+                <a14:useLocalDpi xmlns:a14="http://schemas.microsoft.com/office/drawing/2010/main" val="0"/>
+              </a:ext>
+            </a:extLst>
+          </a:blip>
+          <a:srcRect t="19571"/>
+          <a:stretch/>
+        </p:blipFill>
+        <p:spPr>
+          <a:xfrm>
+            <a:off x="1484311" y="1910075"/>
+            <a:ext cx="6072843" cy="3460124"/>
+          </a:xfrm>
+        </p:spPr>
+      </p:pic>
+      <p:pic>
+        <p:nvPicPr>
+          <p:cNvPr id="9" name="Content Placeholder 8"/>
+          <p:cNvPicPr>
+            <a:picLocks noGrp="1" noChangeAspect="1"/>
+          </p:cNvPicPr>
+          <p:nvPr>
+            <p:ph sz="half" idx="2"/>
+          </p:nvPr>
+        </p:nvPicPr>
+        <p:blipFill rotWithShape="1">
+          <a:blip r:embed="rId3">
+            <a:extLst>
+              <a:ext uri="{28A0092B-C50C-407E-A947-70E740481C1C}">
+                <a14:useLocalDpi xmlns:a14="http://schemas.microsoft.com/office/drawing/2010/main" val="0"/>
+              </a:ext>
+            </a:extLst>
+          </a:blip>
+          <a:srcRect r="12302"/>
+          <a:stretch/>
+        </p:blipFill>
+        <p:spPr>
+          <a:xfrm>
+            <a:off x="8154545" y="1489074"/>
+            <a:ext cx="2843364" cy="4302125"/>
+          </a:xfrm>
+        </p:spPr>
+      </p:pic>
       <p:sp>
         <p:nvSpPr>
           <p:cNvPr id="4" name="Slide Number Placeholder 3"/>
@@ -8266,16 +6908,100 @@
           </a:p>
         </p:txBody>
       </p:sp>
+      <p:sp>
+        <p:nvSpPr>
+          <p:cNvPr id="6" name="TextBox 5"/>
+          <p:cNvSpPr txBox="1"/>
+          <p:nvPr/>
+        </p:nvSpPr>
+        <p:spPr>
+          <a:xfrm>
+            <a:off x="2823793" y="5513942"/>
+            <a:ext cx="3393878" cy="369332"/>
+          </a:xfrm>
+          <a:prstGeom prst="rect">
+            <a:avLst/>
+          </a:prstGeom>
+          <a:noFill/>
+        </p:spPr>
+        <p:txBody>
+          <a:bodyPr wrap="none" rtlCol="0">
+            <a:spAutoFit/>
+          </a:bodyPr>
+          <a:lstStyle/>
+          <a:p>
+            <a:r>
+              <a:rPr lang="en-US" dirty="0" smtClean="0"/>
+              <a:t>Figure 4. </a:t>
+            </a:r>
+            <a:r>
+              <a:rPr lang="en-US" dirty="0"/>
+              <a:t>Proposed chassis design </a:t>
+            </a:r>
+          </a:p>
+        </p:txBody>
+      </p:sp>
+      <p:sp>
+        <p:nvSpPr>
+          <p:cNvPr id="7" name="TextBox 6"/>
+          <p:cNvSpPr txBox="1"/>
+          <p:nvPr/>
+        </p:nvSpPr>
+        <p:spPr>
+          <a:xfrm>
+            <a:off x="8337747" y="5883273"/>
+            <a:ext cx="2476960" cy="646331"/>
+          </a:xfrm>
+          <a:prstGeom prst="rect">
+            <a:avLst/>
+          </a:prstGeom>
+          <a:noFill/>
+        </p:spPr>
+        <p:txBody>
+          <a:bodyPr wrap="none" rtlCol="0">
+            <a:spAutoFit/>
+          </a:bodyPr>
+          <a:lstStyle/>
+          <a:p>
+            <a:r>
+              <a:rPr lang="en-US" dirty="0" smtClean="0"/>
+              <a:t>Figure 5. </a:t>
+            </a:r>
+            <a:r>
+              <a:rPr lang="en-US" dirty="0"/>
+              <a:t>Isometric view </a:t>
+            </a:r>
+            <a:endParaRPr lang="en-US" dirty="0" smtClean="0"/>
+          </a:p>
+          <a:p>
+            <a:r>
+              <a:rPr lang="en-US" dirty="0" smtClean="0"/>
+              <a:t>of </a:t>
+            </a:r>
+            <a:r>
+              <a:rPr lang="en-US" dirty="0"/>
+              <a:t>proposed chassis </a:t>
+            </a:r>
+          </a:p>
+        </p:txBody>
+      </p:sp>
     </p:spTree>
     <p:extLst>
       <p:ext uri="{BB962C8B-B14F-4D97-AF65-F5344CB8AC3E}">
-        <p14:creationId xmlns:p14="http://schemas.microsoft.com/office/powerpoint/2010/main" val="2704906384"/>
+        <p14:creationId xmlns:p14="http://schemas.microsoft.com/office/powerpoint/2010/main" val="341879816"/>
       </p:ext>
     </p:extLst>
   </p:cSld>
   <p:clrMapOvr>
     <a:masterClrMapping/>
   </p:clrMapOvr>
+  <p:timing>
+    <p:tnLst>
+      <p:par>
+        <p:cTn id="1" dur="indefinite" restart="never" nodeType="tmRoot"/>
+      </p:par>
+    </p:tnLst>
+  </p:timing>
 </p:sld>
 </file>
 
@@ -8313,7 +7039,7 @@
           <a:p>
             <a:r>
               <a:rPr lang="en-US" dirty="0" smtClean="0"/>
-              <a:t>Vat Design</a:t>
+              <a:t>Technical Drawings</a:t>
             </a:r>
             <a:endParaRPr lang="en-US" dirty="0"/>
           </a:p>
@@ -8364,7 +7090,7 @@
     </p:spTree>
     <p:extLst>
       <p:ext uri="{BB962C8B-B14F-4D97-AF65-F5344CB8AC3E}">
-        <p14:creationId xmlns:p14="http://schemas.microsoft.com/office/powerpoint/2010/main" val="795725223"/>
+        <p14:creationId xmlns:p14="http://schemas.microsoft.com/office/powerpoint/2010/main" val="2704906384"/>
       </p:ext>
     </p:extLst>
   </p:cSld>
@@ -8408,7 +7134,7 @@
           <a:p>
             <a:r>
               <a:rPr lang="en-US" dirty="0" smtClean="0"/>
-              <a:t>Wire Diagram</a:t>
+              <a:t>Vat Design</a:t>
             </a:r>
             <a:endParaRPr lang="en-US" dirty="0"/>
           </a:p>
@@ -8459,7 +7185,7 @@
     </p:spTree>
     <p:extLst>
       <p:ext uri="{BB962C8B-B14F-4D97-AF65-F5344CB8AC3E}">
-        <p14:creationId xmlns:p14="http://schemas.microsoft.com/office/powerpoint/2010/main" val="4240055343"/>
+        <p14:creationId xmlns:p14="http://schemas.microsoft.com/office/powerpoint/2010/main" val="795725223"/>
       </p:ext>
     </p:extLst>
   </p:cSld>
@@ -8503,7 +7229,7 @@
           <a:p>
             <a:r>
               <a:rPr lang="en-US" dirty="0" smtClean="0"/>
-              <a:t>Hardware Software Interface</a:t>
+              <a:t>Wire Diagram</a:t>
             </a:r>
             <a:endParaRPr lang="en-US" dirty="0"/>
           </a:p>
@@ -8554,7 +7280,7 @@
     </p:spTree>
     <p:extLst>
       <p:ext uri="{BB962C8B-B14F-4D97-AF65-F5344CB8AC3E}">
-        <p14:creationId xmlns:p14="http://schemas.microsoft.com/office/powerpoint/2010/main" val="3374279974"/>
+        <p14:creationId xmlns:p14="http://schemas.microsoft.com/office/powerpoint/2010/main" val="4240055343"/>
       </p:ext>
     </p:extLst>
   </p:cSld>
@@ -8597,12 +7323,8 @@
           <a:lstStyle/>
           <a:p>
             <a:r>
-              <a:rPr lang="en-US" dirty="0"/>
-              <a:t>Hardware Software </a:t>
-            </a:r>
-            <a:r>
               <a:rPr lang="en-US" dirty="0" smtClean="0"/>
-              <a:t>Interface contd.</a:t>
+              <a:t>Hardware Software Interface</a:t>
             </a:r>
             <a:endParaRPr lang="en-US" dirty="0"/>
           </a:p>
@@ -8653,7 +7375,7 @@
     </p:spTree>
     <p:extLst>
       <p:ext uri="{BB962C8B-B14F-4D97-AF65-F5344CB8AC3E}">
-        <p14:creationId xmlns:p14="http://schemas.microsoft.com/office/powerpoint/2010/main" val="1320030583"/>
+        <p14:creationId xmlns:p14="http://schemas.microsoft.com/office/powerpoint/2010/main" val="3374279974"/>
       </p:ext>
     </p:extLst>
   </p:cSld>
@@ -8696,8 +7418,12 @@
           <a:lstStyle/>
           <a:p>
             <a:r>
+              <a:rPr lang="en-US" dirty="0"/>
+              <a:t>Hardware Software </a:t>
+            </a:r>
+            <a:r>
               <a:rPr lang="en-US" dirty="0" smtClean="0"/>
-              <a:t>Projector and Resin</a:t>
+              <a:t>Interface contd.</a:t>
             </a:r>
             <a:endParaRPr lang="en-US" dirty="0"/>
           </a:p>
@@ -8705,6 +7431,25 @@
       </p:sp>
       <p:sp>
         <p:nvSpPr>
+          <p:cNvPr id="3" name="Content Placeholder 2"/>
+          <p:cNvSpPr>
+            <a:spLocks noGrp="1"/>
+          </p:cNvSpPr>
+          <p:nvPr>
+            <p:ph idx="1"/>
+          </p:nvPr>
+        </p:nvSpPr>
+        <p:spPr/>
+        <p:txBody>
+          <a:bodyPr/>
+          <a:lstStyle/>
+          <a:p>
+            <a:endParaRPr lang="en-US"/>
+          </a:p>
+        </p:txBody>
+      </p:sp>
+      <p:sp>
+        <p:nvSpPr>
           <p:cNvPr id="4" name="Slide Number Placeholder 3"/>
           <p:cNvSpPr>
             <a:spLocks noGrp="1"/>
@@ -8720,104 +7465,16 @@
           <a:p>
             <a:fld id="{5C6BB475-B640-4DD3-A1AA-1CF10A44AA06}" type="slidenum">
               <a:rPr lang="en-US" smtClean="0"/>
-              <a:pPr/>
               <a:t>15</a:t>
             </a:fld>
-            <a:endParaRPr lang="en-US" dirty="0"/>
-          </a:p>
-        </p:txBody>
-      </p:sp>
-      <p:sp>
-        <p:nvSpPr>
-          <p:cNvPr id="6" name="Content Placeholder 5"/>
-          <p:cNvSpPr>
-            <a:spLocks noGrp="1"/>
-          </p:cNvSpPr>
-          <p:nvPr>
-            <p:ph idx="1"/>
-          </p:nvPr>
-        </p:nvSpPr>
-        <p:spPr>
-          <a:xfrm>
-            <a:off x="1541989" y="1538196"/>
-            <a:ext cx="10018713" cy="4180024"/>
-          </a:xfrm>
-        </p:spPr>
-        <p:txBody>
-          <a:bodyPr anchor="t">
-            <a:normAutofit/>
-          </a:bodyPr>
-          <a:lstStyle/>
-          <a:p>
-            <a:r>
-              <a:rPr lang="en-US" dirty="0" smtClean="0"/>
-              <a:t>Projector Qualities</a:t>
-            </a:r>
-          </a:p>
-          <a:p>
-            <a:pPr lvl="1"/>
-            <a:r>
-              <a:rPr lang="en-US" dirty="0" smtClean="0"/>
-              <a:t>High Resolution DLP</a:t>
-            </a:r>
-            <a:endParaRPr lang="en-US" dirty="0"/>
-          </a:p>
-          <a:p>
-            <a:pPr lvl="1"/>
-            <a:r>
-              <a:rPr lang="en-US" dirty="0"/>
-              <a:t>UV </a:t>
-            </a:r>
-            <a:r>
-              <a:rPr lang="en-US" dirty="0" smtClean="0"/>
-              <a:t>Filter Removal </a:t>
-            </a:r>
-            <a:endParaRPr lang="en-US" dirty="0"/>
-          </a:p>
-          <a:p>
-            <a:pPr lvl="1"/>
-            <a:r>
-              <a:rPr lang="en-US" dirty="0"/>
-              <a:t>Throw </a:t>
-            </a:r>
-            <a:r>
-              <a:rPr lang="en-US" dirty="0" smtClean="0"/>
-              <a:t>Distance</a:t>
-            </a:r>
-          </a:p>
-          <a:p>
-            <a:r>
-              <a:rPr lang="en-US" dirty="0" smtClean="0"/>
-              <a:t>Resin</a:t>
-            </a:r>
-            <a:endParaRPr lang="en-US" dirty="0"/>
-          </a:p>
-          <a:p>
-            <a:pPr lvl="1"/>
-            <a:r>
-              <a:rPr lang="en-US" dirty="0"/>
-              <a:t>Test for Layer Thickness</a:t>
-            </a:r>
-          </a:p>
-          <a:p>
-            <a:pPr lvl="1"/>
-            <a:r>
-              <a:rPr lang="en-US" dirty="0"/>
-              <a:t>Test for Exposure Time</a:t>
-            </a:r>
-          </a:p>
-          <a:p>
-            <a:pPr marL="0" indent="0">
-              <a:buNone/>
-            </a:pPr>
-            <a:endParaRPr lang="en-US" dirty="0" smtClean="0"/>
+            <a:endParaRPr lang="en-US"/>
           </a:p>
         </p:txBody>
       </p:sp>
     </p:spTree>
     <p:extLst>
       <p:ext uri="{BB962C8B-B14F-4D97-AF65-F5344CB8AC3E}">
-        <p14:creationId xmlns:p14="http://schemas.microsoft.com/office/powerpoint/2010/main" val="1888003692"/>
+        <p14:creationId xmlns:p14="http://schemas.microsoft.com/office/powerpoint/2010/main" val="1320030583"/>
       </p:ext>
     </p:extLst>
   </p:cSld>
@@ -8861,7 +7518,7 @@
           <a:p>
             <a:r>
               <a:rPr lang="en-US" dirty="0" smtClean="0"/>
-              <a:t>Software Problems</a:t>
+              <a:t>Resin/Optics</a:t>
             </a:r>
             <a:endParaRPr lang="en-US" dirty="0"/>
           </a:p>
@@ -8912,7 +7569,7 @@
     </p:spTree>
     <p:extLst>
       <p:ext uri="{BB962C8B-B14F-4D97-AF65-F5344CB8AC3E}">
-        <p14:creationId xmlns:p14="http://schemas.microsoft.com/office/powerpoint/2010/main" val="4088312060"/>
+        <p14:creationId xmlns:p14="http://schemas.microsoft.com/office/powerpoint/2010/main" val="3284958645"/>
       </p:ext>
     </p:extLst>
   </p:cSld>
@@ -8956,7 +7613,7 @@
           <a:p>
             <a:r>
               <a:rPr lang="en-US" dirty="0" smtClean="0"/>
-              <a:t>New Design</a:t>
+              <a:t>Software Problems</a:t>
             </a:r>
             <a:endParaRPr lang="en-US" dirty="0"/>
           </a:p>
@@ -9007,7 +7664,7 @@
     </p:spTree>
     <p:extLst>
       <p:ext uri="{BB962C8B-B14F-4D97-AF65-F5344CB8AC3E}">
-        <p14:creationId xmlns:p14="http://schemas.microsoft.com/office/powerpoint/2010/main" val="4014598853"/>
+        <p14:creationId xmlns:p14="http://schemas.microsoft.com/office/powerpoint/2010/main" val="4088312060"/>
       </p:ext>
     </p:extLst>
   </p:cSld>
@@ -9046,6 +7703,101 @@
         </p:nvSpPr>
         <p:spPr/>
         <p:txBody>
+          <a:bodyPr/>
+          <a:lstStyle/>
+          <a:p>
+            <a:r>
+              <a:rPr lang="en-US" dirty="0" smtClean="0"/>
+              <a:t>New Design</a:t>
+            </a:r>
+            <a:endParaRPr lang="en-US" dirty="0"/>
+          </a:p>
+        </p:txBody>
+      </p:sp>
+      <p:sp>
+        <p:nvSpPr>
+          <p:cNvPr id="3" name="Content Placeholder 2"/>
+          <p:cNvSpPr>
+            <a:spLocks noGrp="1"/>
+          </p:cNvSpPr>
+          <p:nvPr>
+            <p:ph idx="1"/>
+          </p:nvPr>
+        </p:nvSpPr>
+        <p:spPr/>
+        <p:txBody>
+          <a:bodyPr/>
+          <a:lstStyle/>
+          <a:p>
+            <a:endParaRPr lang="en-US"/>
+          </a:p>
+        </p:txBody>
+      </p:sp>
+      <p:sp>
+        <p:nvSpPr>
+          <p:cNvPr id="4" name="Slide Number Placeholder 3"/>
+          <p:cNvSpPr>
+            <a:spLocks noGrp="1"/>
+          </p:cNvSpPr>
+          <p:nvPr>
+            <p:ph type="sldNum" sz="quarter" idx="12"/>
+          </p:nvPr>
+        </p:nvSpPr>
+        <p:spPr/>
+        <p:txBody>
+          <a:bodyPr/>
+          <a:lstStyle/>
+          <a:p>
+            <a:fld id="{5C6BB475-B640-4DD3-A1AA-1CF10A44AA06}" type="slidenum">
+              <a:rPr lang="en-US" smtClean="0"/>
+              <a:t>18</a:t>
+            </a:fld>
+            <a:endParaRPr lang="en-US"/>
+          </a:p>
+        </p:txBody>
+      </p:sp>
+    </p:spTree>
+    <p:extLst>
+      <p:ext uri="{BB962C8B-B14F-4D97-AF65-F5344CB8AC3E}">
+        <p14:creationId xmlns:p14="http://schemas.microsoft.com/office/powerpoint/2010/main" val="4014598853"/>
+      </p:ext>
+    </p:extLst>
+  </p:cSld>
+  <p:clrMapOvr>
+    <a:masterClrMapping/>
+  </p:clrMapOvr>
+</p:sld>
+</file>
+
+<file path=ppt/slides/slide19.xml><?xml version="1.0" encoding="utf-8"?>
+<p:sld xmlns:a="http://schemas.openxmlformats.org/drawingml/2006/main" xmlns:r="http://schemas.openxmlformats.org/officeDocument/2006/relationships" xmlns:p="http://schemas.openxmlformats.org/presentationml/2006/main">
+  <p:cSld>
+    <p:spTree>
+      <p:nvGrpSpPr>
+        <p:cNvPr id="1" name=""/>
+        <p:cNvGrpSpPr/>
+        <p:nvPr/>
+      </p:nvGrpSpPr>
+      <p:grpSpPr>
+        <a:xfrm>
+          <a:off x="0" y="0"/>
+          <a:ext cx="0" cy="0"/>
+          <a:chOff x="0" y="0"/>
+          <a:chExt cx="0" cy="0"/>
+        </a:xfrm>
+      </p:grpSpPr>
+      <p:sp>
+        <p:nvSpPr>
+          <p:cNvPr id="2" name="Title 1"/>
+          <p:cNvSpPr>
+            <a:spLocks noGrp="1"/>
+          </p:cNvSpPr>
+          <p:nvPr>
+            <p:ph type="title"/>
+          </p:nvPr>
+        </p:nvSpPr>
+        <p:spPr/>
+        <p:txBody>
           <a:bodyPr>
             <a:normAutofit/>
           </a:bodyPr>
@@ -9076,7 +7828,7 @@
           <a:p>
             <a:fld id="{5C6BB475-B640-4DD3-A1AA-1CF10A44AA06}" type="slidenum">
               <a:rPr lang="en-US" smtClean="0"/>
-              <a:t>18</a:t>
+              <a:t>19</a:t>
             </a:fld>
             <a:endParaRPr lang="en-US"/>
           </a:p>
@@ -9102,7 +7854,7 @@
 </p:sld>
 </file>
 
-<file path=ppt/slides/slide19.xml><?xml version="1.0" encoding="utf-8"?>
+<file path=ppt/slides/slide2.xml><?xml version="1.0" encoding="utf-8"?>
 <p:sld xmlns:a="http://schemas.openxmlformats.org/drawingml/2006/main" xmlns:r="http://schemas.openxmlformats.org/officeDocument/2006/relationships" xmlns:p="http://schemas.openxmlformats.org/presentationml/2006/main">
   <p:cSld>
     <p:spTree>
@@ -9131,6 +7883,151 @@
         </p:nvSpPr>
         <p:spPr/>
         <p:txBody>
+          <a:bodyPr>
+            <a:normAutofit/>
+          </a:bodyPr>
+          <a:lstStyle/>
+          <a:p>
+            <a:r>
+              <a:rPr lang="en-US" dirty="0" smtClean="0"/>
+              <a:t>Team 75 </a:t>
+            </a:r>
+            <a:r>
+              <a:rPr lang="en-US" dirty="0" smtClean="0"/>
+              <a:t>Organization</a:t>
+            </a:r>
+            <a:endParaRPr lang="en-US" dirty="0"/>
+          </a:p>
+        </p:txBody>
+      </p:sp>
+      <p:pic>
+        <p:nvPicPr>
+          <p:cNvPr id="6" name="Content Placeholder 5"/>
+          <p:cNvPicPr>
+            <a:picLocks noGrp="1" noChangeAspect="1"/>
+          </p:cNvPicPr>
+          <p:nvPr>
+            <p:ph idx="1"/>
+          </p:nvPr>
+        </p:nvPicPr>
+        <p:blipFill>
+          <a:blip r:embed="rId2"/>
+          <a:stretch>
+            <a:fillRect/>
+          </a:stretch>
+        </p:blipFill>
+        <p:spPr>
+          <a:xfrm>
+            <a:off x="2588467" y="1630363"/>
+            <a:ext cx="7924704" cy="4102100"/>
+          </a:xfrm>
+          <a:prstGeom prst="rect">
+            <a:avLst/>
+          </a:prstGeom>
+        </p:spPr>
+      </p:pic>
+      <p:sp>
+        <p:nvSpPr>
+          <p:cNvPr id="4" name="Slide Number Placeholder 3"/>
+          <p:cNvSpPr>
+            <a:spLocks noGrp="1"/>
+          </p:cNvSpPr>
+          <p:nvPr>
+            <p:ph type="sldNum" sz="quarter" idx="12"/>
+          </p:nvPr>
+        </p:nvSpPr>
+        <p:spPr/>
+        <p:txBody>
+          <a:bodyPr/>
+          <a:lstStyle/>
+          <a:p>
+            <a:fld id="{5C6BB475-B640-4DD3-A1AA-1CF10A44AA06}" type="slidenum">
+              <a:rPr lang="en-US" smtClean="0"/>
+              <a:t>2</a:t>
+            </a:fld>
+            <a:endParaRPr lang="en-US"/>
+          </a:p>
+        </p:txBody>
+      </p:sp>
+      <p:sp>
+        <p:nvSpPr>
+          <p:cNvPr id="7" name="TextBox 6"/>
+          <p:cNvSpPr txBox="1"/>
+          <p:nvPr/>
+        </p:nvSpPr>
+        <p:spPr>
+          <a:xfrm>
+            <a:off x="5046208" y="5884727"/>
+            <a:ext cx="3009222" cy="369332"/>
+          </a:xfrm>
+          <a:prstGeom prst="rect">
+            <a:avLst/>
+          </a:prstGeom>
+          <a:noFill/>
+        </p:spPr>
+        <p:txBody>
+          <a:bodyPr wrap="none" rtlCol="0">
+            <a:spAutoFit/>
+          </a:bodyPr>
+          <a:lstStyle/>
+          <a:p>
+            <a:r>
+              <a:rPr lang="en-US" dirty="0" smtClean="0"/>
+              <a:t>Figure 1. Project Organization</a:t>
+            </a:r>
+            <a:endParaRPr lang="en-US" dirty="0"/>
+          </a:p>
+        </p:txBody>
+      </p:sp>
+    </p:spTree>
+    <p:extLst>
+      <p:ext uri="{BB962C8B-B14F-4D97-AF65-F5344CB8AC3E}">
+        <p14:creationId xmlns:p14="http://schemas.microsoft.com/office/powerpoint/2010/main" val="1628288518"/>
+      </p:ext>
+    </p:extLst>
+  </p:cSld>
+  <p:clrMapOvr>
+    <a:masterClrMapping/>
+  </p:clrMapOvr>
+  <p:timing>
+    <p:tnLst>
+      <p:par>
+        <p:cTn id="1" dur="indefinite" restart="never" nodeType="tmRoot"/>
+      </p:par>
+    </p:tnLst>
+  </p:timing>
+</p:sld>
+</file>
+
+<file path=ppt/slides/slide20.xml><?xml version="1.0" encoding="utf-8"?>
+<p:sld xmlns:a="http://schemas.openxmlformats.org/drawingml/2006/main" xmlns:r="http://schemas.openxmlformats.org/officeDocument/2006/relationships" xmlns:p="http://schemas.openxmlformats.org/presentationml/2006/main">
+  <p:cSld>
+    <p:spTree>
+      <p:nvGrpSpPr>
+        <p:cNvPr id="1" name=""/>
+        <p:cNvGrpSpPr/>
+        <p:nvPr/>
+      </p:nvGrpSpPr>
+      <p:grpSpPr>
+        <a:xfrm>
+          <a:off x="0" y="0"/>
+          <a:ext cx="0" cy="0"/>
+          <a:chOff x="0" y="0"/>
+          <a:chExt cx="0" cy="0"/>
+        </a:xfrm>
+      </p:grpSpPr>
+      <p:sp>
+        <p:nvSpPr>
+          <p:cNvPr id="2" name="Title 1"/>
+          <p:cNvSpPr>
+            <a:spLocks noGrp="1"/>
+          </p:cNvSpPr>
+          <p:nvPr>
+            <p:ph type="title"/>
+          </p:nvPr>
+        </p:nvSpPr>
+        <p:spPr/>
+        <p:txBody>
           <a:bodyPr/>
           <a:lstStyle/>
           <a:p>
@@ -9159,7 +8056,7 @@
           <a:p>
             <a:fld id="{5C6BB475-B640-4DD3-A1AA-1CF10A44AA06}" type="slidenum">
               <a:rPr lang="en-US" smtClean="0"/>
-              <a:t>19</a:t>
+              <a:t>20</a:t>
             </a:fld>
             <a:endParaRPr lang="en-US"/>
           </a:p>
@@ -9605,311 +8502,6 @@
 </p:sld>
 </file>
 
-<file path=ppt/slides/slide2.xml><?xml version="1.0" encoding="utf-8"?>
-<p:sld xmlns:a="http://schemas.openxmlformats.org/drawingml/2006/main" xmlns:r="http://schemas.openxmlformats.org/officeDocument/2006/relationships" xmlns:p="http://schemas.openxmlformats.org/presentationml/2006/main">
-  <p:cSld>
-    <p:spTree>
-      <p:nvGrpSpPr>
-        <p:cNvPr id="1" name=""/>
-        <p:cNvGrpSpPr/>
-        <p:nvPr/>
-      </p:nvGrpSpPr>
-      <p:grpSpPr>
-        <a:xfrm>
-          <a:off x="0" y="0"/>
-          <a:ext cx="0" cy="0"/>
-          <a:chOff x="0" y="0"/>
-          <a:chExt cx="0" cy="0"/>
-        </a:xfrm>
-      </p:grpSpPr>
-      <p:sp>
-        <p:nvSpPr>
-          <p:cNvPr id="2" name="Title 1"/>
-          <p:cNvSpPr>
-            <a:spLocks noGrp="1"/>
-          </p:cNvSpPr>
-          <p:nvPr>
-            <p:ph type="title"/>
-          </p:nvPr>
-        </p:nvSpPr>
-        <p:spPr/>
-        <p:txBody>
-          <a:bodyPr>
-            <a:normAutofit/>
-          </a:bodyPr>
-          <a:lstStyle/>
-          <a:p>
-            <a:r>
-              <a:rPr lang="en-US" dirty="0" smtClean="0"/>
-              <a:t>Team 75 Organization</a:t>
-            </a:r>
-            <a:endParaRPr lang="en-US" dirty="0"/>
-          </a:p>
-        </p:txBody>
-      </p:sp>
-      <p:sp>
-        <p:nvSpPr>
-          <p:cNvPr id="4" name="Slide Number Placeholder 3"/>
-          <p:cNvSpPr>
-            <a:spLocks noGrp="1"/>
-          </p:cNvSpPr>
-          <p:nvPr>
-            <p:ph type="sldNum" sz="quarter" idx="12"/>
-          </p:nvPr>
-        </p:nvSpPr>
-        <p:spPr/>
-        <p:txBody>
-          <a:bodyPr/>
-          <a:lstStyle/>
-          <a:p>
-            <a:fld id="{5C6BB475-B640-4DD3-A1AA-1CF10A44AA06}" type="slidenum">
-              <a:rPr lang="en-US" smtClean="0"/>
-              <a:t>2</a:t>
-            </a:fld>
-            <a:endParaRPr lang="en-US"/>
-          </a:p>
-        </p:txBody>
-      </p:sp>
-      <p:sp>
-        <p:nvSpPr>
-          <p:cNvPr id="7" name="TextBox 6"/>
-          <p:cNvSpPr txBox="1"/>
-          <p:nvPr/>
-        </p:nvSpPr>
-        <p:spPr>
-          <a:xfrm>
-            <a:off x="5046208" y="5884727"/>
-            <a:ext cx="3009222" cy="369332"/>
-          </a:xfrm>
-          <a:prstGeom prst="rect">
-            <a:avLst/>
-          </a:prstGeom>
-          <a:noFill/>
-        </p:spPr>
-        <p:txBody>
-          <a:bodyPr wrap="none" rtlCol="0">
-            <a:spAutoFit/>
-          </a:bodyPr>
-          <a:lstStyle/>
-          <a:p>
-            <a:r>
-              <a:rPr lang="en-US" dirty="0" smtClean="0"/>
-              <a:t>Figure 1. Project Organization</a:t>
-            </a:r>
-            <a:endParaRPr lang="en-US" dirty="0"/>
-          </a:p>
-        </p:txBody>
-      </p:sp>
-      <p:pic>
-        <p:nvPicPr>
-          <p:cNvPr id="8" name="Picture 7"/>
-          <p:cNvPicPr>
-            <a:picLocks noChangeAspect="1"/>
-          </p:cNvPicPr>
-          <p:nvPr/>
-        </p:nvPicPr>
-        <p:blipFill>
-          <a:blip r:embed="rId2"/>
-          <a:stretch>
-            <a:fillRect/>
-          </a:stretch>
-        </p:blipFill>
-        <p:spPr>
-          <a:xfrm>
-            <a:off x="1681325" y="1663240"/>
-            <a:ext cx="9738987" cy="4001154"/>
-          </a:xfrm>
-          <a:prstGeom prst="rect">
-            <a:avLst/>
-          </a:prstGeom>
-        </p:spPr>
-      </p:pic>
-    </p:spTree>
-    <p:extLst>
-      <p:ext uri="{BB962C8B-B14F-4D97-AF65-F5344CB8AC3E}">
-        <p14:creationId xmlns:p14="http://schemas.microsoft.com/office/powerpoint/2010/main" val="1628288518"/>
-      </p:ext>
-    </p:extLst>
-  </p:cSld>
-  <p:clrMapOvr>
-    <a:masterClrMapping/>
-  </p:clrMapOvr>
-  <p:timing>
-    <p:tnLst>
-      <p:par>
-        <p:cTn id="1" dur="indefinite" restart="never" nodeType="tmRoot"/>
-      </p:par>
-    </p:tnLst>
-  </p:timing>
-</p:sld>
-</file>
-
-<file path=ppt/slides/slide20.xml><?xml version="1.0" encoding="utf-8"?>
-<p:sld xmlns:a="http://schemas.openxmlformats.org/drawingml/2006/main" xmlns:r="http://schemas.openxmlformats.org/officeDocument/2006/relationships" xmlns:p="http://schemas.openxmlformats.org/presentationml/2006/main">
-  <p:cSld>
-    <p:spTree>
-      <p:nvGrpSpPr>
-        <p:cNvPr id="1" name=""/>
-        <p:cNvGrpSpPr/>
-        <p:nvPr/>
-      </p:nvGrpSpPr>
-      <p:grpSpPr>
-        <a:xfrm>
-          <a:off x="0" y="0"/>
-          <a:ext cx="0" cy="0"/>
-          <a:chOff x="0" y="0"/>
-          <a:chExt cx="0" cy="0"/>
-        </a:xfrm>
-      </p:grpSpPr>
-      <p:sp>
-        <p:nvSpPr>
-          <p:cNvPr id="2" name="Title 1"/>
-          <p:cNvSpPr>
-            <a:spLocks noGrp="1"/>
-          </p:cNvSpPr>
-          <p:nvPr>
-            <p:ph type="title"/>
-          </p:nvPr>
-        </p:nvSpPr>
-        <p:spPr/>
-        <p:txBody>
-          <a:bodyPr/>
-          <a:lstStyle/>
-          <a:p>
-            <a:r>
-              <a:rPr lang="en-US" dirty="0" smtClean="0"/>
-              <a:t>Summary</a:t>
-            </a:r>
-            <a:endParaRPr lang="en-US" dirty="0"/>
-          </a:p>
-        </p:txBody>
-      </p:sp>
-      <p:sp>
-        <p:nvSpPr>
-          <p:cNvPr id="3" name="Content Placeholder 2"/>
-          <p:cNvSpPr>
-            <a:spLocks noGrp="1"/>
-          </p:cNvSpPr>
-          <p:nvPr>
-            <p:ph idx="1"/>
-          </p:nvPr>
-        </p:nvSpPr>
-        <p:spPr/>
-        <p:txBody>
-          <a:bodyPr>
-            <a:normAutofit fontScale="92500" lnSpcReduction="20000"/>
-          </a:bodyPr>
-          <a:lstStyle/>
-          <a:p>
-            <a:pPr marL="0" indent="0" fontAlgn="base">
-              <a:buNone/>
-            </a:pPr>
-            <a:r>
-              <a:rPr lang="en-US" dirty="0"/>
-              <a:t>Problem Statement</a:t>
-            </a:r>
-          </a:p>
-          <a:p>
-            <a:pPr lvl="1" fontAlgn="base"/>
-            <a:r>
-              <a:rPr lang="en-US" dirty="0"/>
-              <a:t>Current hobbyist 3D printers are imprecise and fault-prone</a:t>
-            </a:r>
-          </a:p>
-          <a:p>
-            <a:pPr lvl="1" fontAlgn="base"/>
-            <a:r>
-              <a:rPr lang="en-US" dirty="0"/>
-              <a:t>High resolution additive manufacturing is currently not accessible for hobbyists (under $1,000)</a:t>
-            </a:r>
-          </a:p>
-          <a:p>
-            <a:pPr lvl="1" fontAlgn="base"/>
-            <a:r>
-              <a:rPr lang="en-US" dirty="0"/>
-              <a:t>Available PAM systems use proprietary hardware and software</a:t>
-            </a:r>
-          </a:p>
-          <a:p>
-            <a:pPr marL="0" indent="0" fontAlgn="base">
-              <a:buNone/>
-            </a:pPr>
-            <a:r>
-              <a:rPr lang="en-US" dirty="0"/>
-              <a:t>Our Solution</a:t>
-            </a:r>
-          </a:p>
-          <a:p>
-            <a:pPr lvl="1"/>
-            <a:r>
-              <a:rPr lang="en-US" dirty="0"/>
-              <a:t>A DLP PAM system can produce high quality and fast prints</a:t>
-            </a:r>
-          </a:p>
-          <a:p>
-            <a:pPr lvl="1"/>
-            <a:r>
-              <a:rPr lang="en-US" dirty="0"/>
-              <a:t>Use off-the-shelf open-source hardware</a:t>
-            </a:r>
-          </a:p>
-          <a:p>
-            <a:pPr lvl="1"/>
-            <a:r>
-              <a:rPr lang="en-US" dirty="0"/>
-              <a:t>Create a thoroughly documented reference </a:t>
-            </a:r>
-            <a:r>
-              <a:rPr lang="en-US" dirty="0" smtClean="0"/>
-              <a:t>design</a:t>
-            </a:r>
-            <a:endParaRPr lang="en-US" dirty="0"/>
-          </a:p>
-        </p:txBody>
-      </p:sp>
-      <p:sp>
-        <p:nvSpPr>
-          <p:cNvPr id="4" name="Slide Number Placeholder 3"/>
-          <p:cNvSpPr>
-            <a:spLocks noGrp="1"/>
-          </p:cNvSpPr>
-          <p:nvPr>
-            <p:ph type="sldNum" sz="quarter" idx="12"/>
-          </p:nvPr>
-        </p:nvSpPr>
-        <p:spPr/>
-        <p:txBody>
-          <a:bodyPr/>
-          <a:lstStyle/>
-          <a:p>
-            <a:fld id="{5C6BB475-B640-4DD3-A1AA-1CF10A44AA06}" type="slidenum">
-              <a:rPr lang="en-US" smtClean="0"/>
-              <a:t>20</a:t>
-            </a:fld>
-            <a:endParaRPr lang="en-US"/>
-          </a:p>
-        </p:txBody>
-      </p:sp>
-    </p:spTree>
-    <p:extLst>
-      <p:ext uri="{BB962C8B-B14F-4D97-AF65-F5344CB8AC3E}">
-        <p14:creationId xmlns:p14="http://schemas.microsoft.com/office/powerpoint/2010/main" val="2150469081"/>
-      </p:ext>
-    </p:extLst>
-  </p:cSld>
-  <p:clrMapOvr>
-    <a:masterClrMapping/>
-  </p:clrMapOvr>
-  <p:timing>
-    <p:tnLst>
-      <p:par>
-        <p:cTn id="1" dur="indefinite" restart="never" nodeType="tmRoot"/>
-      </p:par>
-    </p:tnLst>
-  </p:timing>
-</p:sld>
-</file>
-
 <file path=ppt/slides/slide21.xml><?xml version="1.0" encoding="utf-8"?>
 <p:sld xmlns:a="http://schemas.openxmlformats.org/drawingml/2006/main" xmlns:r="http://schemas.openxmlformats.org/officeDocument/2006/relationships" xmlns:p="http://schemas.openxmlformats.org/presentationml/2006/main">
   <p:cSld>
@@ -9944,1117 +8536,95 @@
           <a:p>
             <a:r>
               <a:rPr lang="en-US" dirty="0" smtClean="0"/>
-              <a:t>Acknowledgements	</a:t>
+              <a:t>Summary</a:t>
             </a:r>
             <a:endParaRPr lang="en-US" dirty="0"/>
           </a:p>
         </p:txBody>
       </p:sp>
-      <p:graphicFrame>
-        <p:nvGraphicFramePr>
-          <p:cNvPr id="5" name="Content Placeholder 4"/>
-          <p:cNvGraphicFramePr>
-            <a:graphicFrameLocks noGrp="1"/>
-          </p:cNvGraphicFramePr>
+      <p:sp>
+        <p:nvSpPr>
+          <p:cNvPr id="3" name="Content Placeholder 2"/>
+          <p:cNvSpPr>
+            <a:spLocks noGrp="1"/>
+          </p:cNvSpPr>
           <p:nvPr>
             <p:ph idx="1"/>
-            <p:extLst/>
-          </p:nvPr>
-        </p:nvGraphicFramePr>
-        <p:xfrm>
-          <a:off x="2808407" y="2366742"/>
-          <a:ext cx="7513068" cy="2359804"/>
-        </p:xfrm>
-        <a:graphic>
-          <a:graphicData uri="http://schemas.openxmlformats.org/drawingml/2006/table">
-            <a:tbl>
-              <a:tblPr>
-                <a:effectLst/>
-                <a:tableStyleId>{5C22544A-7EE6-4342-B048-85BDC9FD1C3A}</a:tableStyleId>
-              </a:tblPr>
-              <a:tblGrid>
-                <a:gridCol w="2240111"/>
-                <a:gridCol w="2640169"/>
-                <a:gridCol w="2632788"/>
-              </a:tblGrid>
-              <a:tr h="300860">
-                <a:tc>
-                  <a:txBody>
-                    <a:bodyPr/>
-                    <a:lstStyle/>
-                    <a:p>
-                      <a:r>
-                        <a:rPr lang="en-US" sz="1800" b="0" kern="1200" dirty="0" smtClean="0">
-                          <a:solidFill>
-                            <a:schemeClr val="tx1"/>
-                          </a:solidFill>
-                          <a:effectLst/>
-                          <a:latin typeface="+mn-lt"/>
-                          <a:ea typeface="+mn-ea"/>
-                          <a:cs typeface="+mn-cs"/>
-                        </a:rPr>
-                        <a:t>Dr. Spyros </a:t>
-                      </a:r>
-                      <a:r>
-                        <a:rPr lang="en-US" sz="1800" b="0" kern="1200" dirty="0" err="1" smtClean="0">
-                          <a:solidFill>
-                            <a:schemeClr val="tx1"/>
-                          </a:solidFill>
-                          <a:effectLst/>
-                          <a:latin typeface="+mn-lt"/>
-                          <a:ea typeface="+mn-ea"/>
-                          <a:cs typeface="+mn-cs"/>
-                        </a:rPr>
-                        <a:t>Tragoudas</a:t>
-                      </a:r>
-                      <a:r>
-                        <a:rPr lang="en-US" sz="1800" b="0" kern="1200" dirty="0" smtClean="0">
-                          <a:solidFill>
-                            <a:schemeClr val="tx1"/>
-                          </a:solidFill>
-                          <a:effectLst/>
-                          <a:latin typeface="+mn-lt"/>
-                          <a:ea typeface="+mn-ea"/>
-                          <a:cs typeface="+mn-cs"/>
-                        </a:rPr>
-                        <a:t> </a:t>
-                      </a:r>
-                      <a:endParaRPr lang="en-US" b="0" dirty="0">
-                        <a:solidFill>
-                          <a:schemeClr val="tx1"/>
-                        </a:solidFill>
-                      </a:endParaRPr>
-                    </a:p>
-                  </a:txBody>
-                  <a:tcPr>
-                    <a:lnL w="12700" cmpd="sng">
-                      <a:noFill/>
-                    </a:lnL>
-                    <a:lnR w="12700" cmpd="sng">
-                      <a:noFill/>
-                    </a:lnR>
-                    <a:lnT w="12700" cmpd="sng">
-                      <a:noFill/>
-                    </a:lnT>
-                    <a:lnB w="12700" cmpd="sng">
-                      <a:noFill/>
-                    </a:lnB>
-                    <a:lnTlToBr w="12700" cmpd="sng">
-                      <a:noFill/>
-                      <a:prstDash val="solid"/>
-                    </a:lnTlToBr>
-                    <a:lnBlToTr w="12700" cmpd="sng">
-                      <a:noFill/>
-                      <a:prstDash val="solid"/>
-                    </a:lnBlToTr>
-                    <a:noFill/>
-                  </a:tcPr>
-                </a:tc>
-                <a:tc>
-                  <a:txBody>
-                    <a:bodyPr/>
-                    <a:lstStyle/>
-                    <a:p>
-                      <a:r>
-                        <a:rPr lang="en-US" sz="1800" b="0" kern="1200" dirty="0" smtClean="0">
-                          <a:solidFill>
-                            <a:schemeClr val="tx1"/>
-                          </a:solidFill>
-                          <a:effectLst/>
-                          <a:latin typeface="+mn-lt"/>
-                          <a:ea typeface="+mn-ea"/>
-                          <a:cs typeface="+mn-cs"/>
-                        </a:rPr>
-                        <a:t>Dr. </a:t>
-                      </a:r>
-                      <a:r>
-                        <a:rPr lang="en-US" sz="1800" b="0" kern="1200" dirty="0" err="1" smtClean="0">
-                          <a:solidFill>
-                            <a:schemeClr val="tx1"/>
-                          </a:solidFill>
-                          <a:effectLst/>
-                          <a:latin typeface="+mn-lt"/>
-                          <a:ea typeface="+mn-ea"/>
-                          <a:cs typeface="+mn-cs"/>
-                        </a:rPr>
-                        <a:t>Tod</a:t>
-                      </a:r>
-                      <a:r>
-                        <a:rPr lang="en-US" sz="1800" b="0" kern="1200" dirty="0" smtClean="0">
-                          <a:solidFill>
-                            <a:schemeClr val="tx1"/>
-                          </a:solidFill>
-                          <a:effectLst/>
-                          <a:latin typeface="+mn-lt"/>
-                          <a:ea typeface="+mn-ea"/>
-                          <a:cs typeface="+mn-cs"/>
-                        </a:rPr>
-                        <a:t> </a:t>
-                      </a:r>
-                      <a:r>
-                        <a:rPr lang="en-US" sz="1800" b="0" kern="1200" dirty="0" err="1" smtClean="0">
-                          <a:solidFill>
-                            <a:schemeClr val="tx1"/>
-                          </a:solidFill>
-                          <a:effectLst/>
-                          <a:latin typeface="+mn-lt"/>
-                          <a:ea typeface="+mn-ea"/>
-                          <a:cs typeface="+mn-cs"/>
-                        </a:rPr>
-                        <a:t>Policandriotes</a:t>
-                      </a:r>
-                      <a:endParaRPr lang="en-US" b="0" dirty="0">
-                        <a:solidFill>
-                          <a:schemeClr val="tx1"/>
-                        </a:solidFill>
-                      </a:endParaRPr>
-                    </a:p>
-                  </a:txBody>
-                  <a:tcPr>
-                    <a:lnL w="12700" cmpd="sng">
-                      <a:noFill/>
-                    </a:lnL>
-                    <a:lnR w="12700" cmpd="sng">
-                      <a:noFill/>
-                    </a:lnR>
-                    <a:lnT w="12700" cmpd="sng">
-                      <a:noFill/>
-                    </a:lnT>
-                    <a:lnB w="12700" cmpd="sng">
-                      <a:noFill/>
-                    </a:lnB>
-                    <a:lnTlToBr w="12700" cmpd="sng">
-                      <a:noFill/>
-                      <a:prstDash val="solid"/>
-                    </a:lnTlToBr>
-                    <a:lnBlToTr w="12700" cmpd="sng">
-                      <a:noFill/>
-                      <a:prstDash val="solid"/>
-                    </a:lnBlToTr>
-                    <a:noFill/>
-                  </a:tcPr>
-                </a:tc>
-                <a:tc>
-                  <a:txBody>
-                    <a:bodyPr/>
-                    <a:lstStyle/>
-                    <a:p>
-                      <a:r>
-                        <a:rPr lang="en-US" sz="1800" b="0" kern="1200" dirty="0" err="1" smtClean="0">
-                          <a:solidFill>
-                            <a:schemeClr val="tx1"/>
-                          </a:solidFill>
-                          <a:effectLst/>
-                          <a:latin typeface="+mn-lt"/>
-                          <a:ea typeface="+mn-ea"/>
-                          <a:cs typeface="+mn-cs"/>
-                        </a:rPr>
-                        <a:t>Lakendria</a:t>
-                      </a:r>
-                      <a:r>
-                        <a:rPr lang="en-US" sz="1800" b="0" kern="1200" dirty="0" smtClean="0">
-                          <a:solidFill>
-                            <a:schemeClr val="tx1"/>
-                          </a:solidFill>
-                          <a:effectLst/>
-                          <a:latin typeface="+mn-lt"/>
-                          <a:ea typeface="+mn-ea"/>
-                          <a:cs typeface="+mn-cs"/>
-                        </a:rPr>
-                        <a:t> Kenner </a:t>
-                      </a:r>
-                      <a:endParaRPr lang="en-US" b="0" dirty="0">
-                        <a:solidFill>
-                          <a:schemeClr val="tx1"/>
-                        </a:solidFill>
-                      </a:endParaRPr>
-                    </a:p>
-                  </a:txBody>
-                  <a:tcPr>
-                    <a:lnL w="12700" cmpd="sng">
-                      <a:noFill/>
-                    </a:lnL>
-                    <a:lnR w="12700" cmpd="sng">
-                      <a:noFill/>
-                    </a:lnR>
-                    <a:lnT w="12700" cmpd="sng">
-                      <a:noFill/>
-                    </a:lnT>
-                    <a:lnB w="12700" cmpd="sng">
-                      <a:noFill/>
-                    </a:lnB>
-                    <a:lnTlToBr w="12700" cmpd="sng">
-                      <a:noFill/>
-                      <a:prstDash val="solid"/>
-                    </a:lnTlToBr>
-                    <a:lnBlToTr w="12700" cmpd="sng">
-                      <a:noFill/>
-                      <a:prstDash val="solid"/>
-                    </a:lnBlToTr>
-                    <a:noFill/>
-                  </a:tcPr>
-                </a:tc>
-              </a:tr>
-              <a:tr h="448580">
-                <a:tc>
-                  <a:txBody>
-                    <a:bodyPr/>
-                    <a:lstStyle/>
-                    <a:p>
-                      <a:r>
-                        <a:rPr lang="en-US" b="0" dirty="0" smtClean="0">
-                          <a:solidFill>
-                            <a:schemeClr val="tx1"/>
-                          </a:solidFill>
-                        </a:rPr>
-                        <a:t>Dr. </a:t>
-                      </a:r>
-                      <a:r>
-                        <a:rPr lang="en-US" b="0" dirty="0" err="1" smtClean="0">
-                          <a:solidFill>
-                            <a:schemeClr val="tx1"/>
-                          </a:solidFill>
-                        </a:rPr>
-                        <a:t>Rasit</a:t>
-                      </a:r>
-                      <a:r>
-                        <a:rPr lang="en-US" b="0" dirty="0" smtClean="0">
-                          <a:solidFill>
-                            <a:schemeClr val="tx1"/>
-                          </a:solidFill>
-                        </a:rPr>
-                        <a:t> </a:t>
-                      </a:r>
-                      <a:r>
-                        <a:rPr lang="en-US" b="0" dirty="0" err="1" smtClean="0">
-                          <a:solidFill>
-                            <a:schemeClr val="tx1"/>
-                          </a:solidFill>
-                        </a:rPr>
-                        <a:t>Koc</a:t>
-                      </a:r>
-                      <a:r>
-                        <a:rPr lang="en-US" b="0" dirty="0" smtClean="0">
-                          <a:solidFill>
-                            <a:schemeClr val="tx1"/>
-                          </a:solidFill>
-                        </a:rPr>
-                        <a:t> </a:t>
-                      </a:r>
-                      <a:endParaRPr lang="en-US" b="0" dirty="0">
-                        <a:solidFill>
-                          <a:schemeClr val="tx1"/>
-                        </a:solidFill>
-                      </a:endParaRPr>
-                    </a:p>
-                  </a:txBody>
-                  <a:tcPr>
-                    <a:lnL w="12700" cmpd="sng">
-                      <a:noFill/>
-                    </a:lnL>
-                    <a:lnR w="12700" cmpd="sng">
-                      <a:noFill/>
-                    </a:lnR>
-                    <a:lnT w="12700" cmpd="sng">
-                      <a:noFill/>
-                    </a:lnT>
-                    <a:lnB w="12700" cmpd="sng">
-                      <a:noFill/>
-                    </a:lnB>
-                    <a:lnTlToBr w="12700" cmpd="sng">
-                      <a:noFill/>
-                      <a:prstDash val="solid"/>
-                    </a:lnTlToBr>
-                    <a:lnBlToTr w="12700" cmpd="sng">
-                      <a:noFill/>
-                      <a:prstDash val="solid"/>
-                    </a:lnBlToTr>
-                    <a:noFill/>
-                  </a:tcPr>
-                </a:tc>
-                <a:tc>
-                  <a:txBody>
-                    <a:bodyPr/>
-                    <a:lstStyle/>
-                    <a:p>
-                      <a:r>
-                        <a:rPr lang="en-US" sz="1800" b="0" kern="1200" dirty="0" smtClean="0">
-                          <a:solidFill>
-                            <a:schemeClr val="tx1"/>
-                          </a:solidFill>
-                          <a:effectLst/>
-                          <a:latin typeface="+mn-lt"/>
-                          <a:ea typeface="+mn-ea"/>
-                          <a:cs typeface="+mn-cs"/>
-                        </a:rPr>
-                        <a:t>Dr. </a:t>
-                      </a:r>
-                      <a:r>
-                        <a:rPr lang="en-US" sz="1800" b="0" kern="1200" dirty="0" err="1" smtClean="0">
-                          <a:solidFill>
-                            <a:schemeClr val="tx1"/>
-                          </a:solidFill>
-                          <a:effectLst/>
-                          <a:latin typeface="+mn-lt"/>
-                          <a:ea typeface="+mn-ea"/>
-                          <a:cs typeface="+mn-cs"/>
-                        </a:rPr>
-                        <a:t>Vidya</a:t>
-                      </a:r>
-                      <a:r>
-                        <a:rPr lang="en-US" sz="1800" b="0" kern="1200" dirty="0" smtClean="0">
-                          <a:solidFill>
-                            <a:schemeClr val="tx1"/>
-                          </a:solidFill>
-                          <a:effectLst/>
-                          <a:latin typeface="+mn-lt"/>
-                          <a:ea typeface="+mn-ea"/>
-                          <a:cs typeface="+mn-cs"/>
-                        </a:rPr>
-                        <a:t> Singh-Gupta</a:t>
-                      </a:r>
-                      <a:endParaRPr lang="en-US" b="0" dirty="0">
-                        <a:solidFill>
-                          <a:schemeClr val="tx1"/>
-                        </a:solidFill>
-                      </a:endParaRPr>
-                    </a:p>
-                  </a:txBody>
-                  <a:tcPr>
-                    <a:lnL w="12700" cmpd="sng">
-                      <a:noFill/>
-                    </a:lnL>
-                    <a:lnR w="12700" cmpd="sng">
-                      <a:noFill/>
-                    </a:lnR>
-                    <a:lnT w="12700" cmpd="sng">
-                      <a:noFill/>
-                    </a:lnT>
-                    <a:lnB w="12700" cmpd="sng">
-                      <a:noFill/>
-                    </a:lnB>
-                    <a:lnTlToBr w="12700" cmpd="sng">
-                      <a:noFill/>
-                      <a:prstDash val="solid"/>
-                    </a:lnTlToBr>
-                    <a:lnBlToTr w="12700" cmpd="sng">
-                      <a:noFill/>
-                      <a:prstDash val="solid"/>
-                    </a:lnBlToTr>
-                    <a:noFill/>
-                  </a:tcPr>
-                </a:tc>
-                <a:tc>
-                  <a:txBody>
-                    <a:bodyPr/>
-                    <a:lstStyle/>
-                    <a:p>
-                      <a:r>
-                        <a:rPr lang="en-US" sz="1800" b="0" kern="1200" dirty="0" smtClean="0">
-                          <a:solidFill>
-                            <a:schemeClr val="tx1"/>
-                          </a:solidFill>
-                          <a:effectLst/>
-                          <a:latin typeface="+mn-lt"/>
-                          <a:ea typeface="+mn-ea"/>
-                          <a:cs typeface="+mn-cs"/>
-                        </a:rPr>
-                        <a:t>Scott J. Grunewald </a:t>
-                      </a:r>
-                      <a:endParaRPr lang="en-US" b="0" dirty="0">
-                        <a:solidFill>
-                          <a:schemeClr val="tx1"/>
-                        </a:solidFill>
-                      </a:endParaRPr>
-                    </a:p>
-                  </a:txBody>
-                  <a:tcPr>
-                    <a:lnL w="12700" cmpd="sng">
-                      <a:noFill/>
-                    </a:lnL>
-                    <a:lnR w="12700" cmpd="sng">
-                      <a:noFill/>
-                    </a:lnR>
-                    <a:lnT w="12700" cmpd="sng">
-                      <a:noFill/>
-                    </a:lnT>
-                    <a:lnB w="12700" cmpd="sng">
-                      <a:noFill/>
-                    </a:lnB>
-                    <a:lnTlToBr w="12700" cmpd="sng">
-                      <a:noFill/>
-                      <a:prstDash val="solid"/>
-                    </a:lnTlToBr>
-                    <a:lnBlToTr w="12700" cmpd="sng">
-                      <a:noFill/>
-                      <a:prstDash val="solid"/>
-                    </a:lnBlToTr>
-                    <a:noFill/>
-                  </a:tcPr>
-                </a:tc>
-              </a:tr>
-              <a:tr h="386366">
-                <a:tc>
-                  <a:txBody>
-                    <a:bodyPr/>
-                    <a:lstStyle/>
-                    <a:p>
-                      <a:r>
-                        <a:rPr lang="en-US" b="0" dirty="0" smtClean="0">
-                          <a:solidFill>
-                            <a:schemeClr val="tx1"/>
-                          </a:solidFill>
-                        </a:rPr>
-                        <a:t>Dr. Lizette Chevalier </a:t>
-                      </a:r>
-                      <a:endParaRPr lang="en-US" b="0" dirty="0">
-                        <a:solidFill>
-                          <a:schemeClr val="tx1"/>
-                        </a:solidFill>
-                      </a:endParaRPr>
-                    </a:p>
-                  </a:txBody>
-                  <a:tcPr>
-                    <a:lnL w="12700" cmpd="sng">
-                      <a:noFill/>
-                    </a:lnL>
-                    <a:lnR w="12700" cmpd="sng">
-                      <a:noFill/>
-                    </a:lnR>
-                    <a:lnT w="12700" cmpd="sng">
-                      <a:noFill/>
-                    </a:lnT>
-                    <a:lnB w="12700" cmpd="sng">
-                      <a:noFill/>
-                    </a:lnB>
-                    <a:lnTlToBr w="12700" cmpd="sng">
-                      <a:noFill/>
-                      <a:prstDash val="solid"/>
-                    </a:lnTlToBr>
-                    <a:lnBlToTr w="12700" cmpd="sng">
-                      <a:noFill/>
-                      <a:prstDash val="solid"/>
-                    </a:lnBlToTr>
-                    <a:noFill/>
-                  </a:tcPr>
-                </a:tc>
-                <a:tc>
-                  <a:txBody>
-                    <a:bodyPr/>
-                    <a:lstStyle/>
-                    <a:p>
-                      <a:r>
-                        <a:rPr lang="en-US" sz="1800" b="0" kern="1200" dirty="0" smtClean="0">
-                          <a:solidFill>
-                            <a:schemeClr val="tx1"/>
-                          </a:solidFill>
-                          <a:effectLst/>
-                          <a:latin typeface="+mn-lt"/>
-                          <a:ea typeface="+mn-ea"/>
-                          <a:cs typeface="+mn-cs"/>
-                        </a:rPr>
-                        <a:t>Dr. Frances </a:t>
-                      </a:r>
-                      <a:r>
-                        <a:rPr lang="en-US" sz="1800" b="0" kern="1200" dirty="0" err="1" smtClean="0">
-                          <a:solidFill>
-                            <a:schemeClr val="tx1"/>
-                          </a:solidFill>
-                          <a:effectLst/>
-                          <a:latin typeface="+mn-lt"/>
-                          <a:ea typeface="+mn-ea"/>
-                          <a:cs typeface="+mn-cs"/>
-                        </a:rPr>
-                        <a:t>Harackiewicz</a:t>
-                      </a:r>
-                      <a:endParaRPr lang="en-US" b="0" dirty="0">
-                        <a:solidFill>
-                          <a:schemeClr val="tx1"/>
-                        </a:solidFill>
-                      </a:endParaRPr>
-                    </a:p>
-                  </a:txBody>
-                  <a:tcPr>
-                    <a:lnL w="12700" cmpd="sng">
-                      <a:noFill/>
-                    </a:lnL>
-                    <a:lnR w="12700" cmpd="sng">
-                      <a:noFill/>
-                    </a:lnR>
-                    <a:lnT w="12700" cmpd="sng">
-                      <a:noFill/>
-                    </a:lnT>
-                    <a:lnB w="12700" cmpd="sng">
-                      <a:noFill/>
-                    </a:lnB>
-                    <a:lnTlToBr w="12700" cmpd="sng">
-                      <a:noFill/>
-                      <a:prstDash val="solid"/>
-                    </a:lnTlToBr>
-                    <a:lnBlToTr w="12700" cmpd="sng">
-                      <a:noFill/>
-                      <a:prstDash val="solid"/>
-                    </a:lnBlToTr>
-                    <a:noFill/>
-                  </a:tcPr>
-                </a:tc>
-                <a:tc>
-                  <a:txBody>
-                    <a:bodyPr/>
-                    <a:lstStyle/>
-                    <a:p>
-                      <a:r>
-                        <a:rPr lang="en-US" sz="1800" b="0" kern="1200" dirty="0" smtClean="0">
-                          <a:solidFill>
-                            <a:schemeClr val="tx1"/>
-                          </a:solidFill>
-                          <a:effectLst/>
-                          <a:latin typeface="+mn-lt"/>
-                          <a:ea typeface="+mn-ea"/>
-                          <a:cs typeface="+mn-cs"/>
-                        </a:rPr>
-                        <a:t>Eddie </a:t>
-                      </a:r>
-                      <a:r>
-                        <a:rPr lang="en-US" sz="1800" b="0" kern="1200" dirty="0" err="1" smtClean="0">
-                          <a:solidFill>
-                            <a:schemeClr val="tx1"/>
-                          </a:solidFill>
-                          <a:effectLst/>
-                          <a:latin typeface="+mn-lt"/>
-                          <a:ea typeface="+mn-ea"/>
-                          <a:cs typeface="+mn-cs"/>
-                        </a:rPr>
-                        <a:t>Krassenstein</a:t>
-                      </a:r>
-                      <a:r>
-                        <a:rPr lang="en-US" sz="1800" b="0" kern="1200" dirty="0" smtClean="0">
-                          <a:solidFill>
-                            <a:schemeClr val="tx1"/>
-                          </a:solidFill>
-                          <a:effectLst/>
-                          <a:latin typeface="+mn-lt"/>
-                          <a:ea typeface="+mn-ea"/>
-                          <a:cs typeface="+mn-cs"/>
-                        </a:rPr>
-                        <a:t> </a:t>
-                      </a:r>
-                      <a:endParaRPr lang="en-US" b="0" dirty="0">
-                        <a:solidFill>
-                          <a:schemeClr val="tx1"/>
-                        </a:solidFill>
-                      </a:endParaRPr>
-                    </a:p>
-                  </a:txBody>
-                  <a:tcPr>
-                    <a:lnL w="12700" cmpd="sng">
-                      <a:noFill/>
-                    </a:lnL>
-                    <a:lnR w="12700" cmpd="sng">
-                      <a:noFill/>
-                    </a:lnR>
-                    <a:lnT w="12700" cmpd="sng">
-                      <a:noFill/>
-                    </a:lnT>
-                    <a:lnB w="12700" cmpd="sng">
-                      <a:noFill/>
-                    </a:lnB>
-                    <a:lnTlToBr w="12700" cmpd="sng">
-                      <a:noFill/>
-                      <a:prstDash val="solid"/>
-                    </a:lnTlToBr>
-                    <a:lnBlToTr w="12700" cmpd="sng">
-                      <a:noFill/>
-                      <a:prstDash val="solid"/>
-                    </a:lnBlToTr>
-                    <a:noFill/>
-                  </a:tcPr>
-                </a:tc>
-              </a:tr>
-              <a:tr h="399245">
-                <a:tc>
-                  <a:txBody>
-                    <a:bodyPr/>
-                    <a:lstStyle/>
-                    <a:p>
-                      <a:r>
-                        <a:rPr lang="en-US" sz="1800" b="0" kern="1200" dirty="0" smtClean="0">
-                          <a:solidFill>
-                            <a:schemeClr val="tx1"/>
-                          </a:solidFill>
-                          <a:effectLst/>
-                          <a:latin typeface="+mn-lt"/>
-                          <a:ea typeface="+mn-ea"/>
-                          <a:cs typeface="+mn-cs"/>
-                        </a:rPr>
-                        <a:t>Dr. James Mathias </a:t>
-                      </a:r>
-                      <a:endParaRPr lang="en-US" b="0" dirty="0">
-                        <a:solidFill>
-                          <a:schemeClr val="tx1"/>
-                        </a:solidFill>
-                      </a:endParaRPr>
-                    </a:p>
-                  </a:txBody>
-                  <a:tcPr>
-                    <a:lnL w="12700" cmpd="sng">
-                      <a:noFill/>
-                    </a:lnL>
-                    <a:lnR w="12700" cmpd="sng">
-                      <a:noFill/>
-                    </a:lnR>
-                    <a:lnT w="12700" cmpd="sng">
-                      <a:noFill/>
-                    </a:lnT>
-                    <a:lnB w="12700" cmpd="sng">
-                      <a:noFill/>
-                    </a:lnB>
-                    <a:lnTlToBr w="12700" cmpd="sng">
-                      <a:noFill/>
-                      <a:prstDash val="solid"/>
-                    </a:lnTlToBr>
-                    <a:lnBlToTr w="12700" cmpd="sng">
-                      <a:noFill/>
-                      <a:prstDash val="solid"/>
-                    </a:lnBlToTr>
-                    <a:noFill/>
-                  </a:tcPr>
-                </a:tc>
-                <a:tc>
-                  <a:txBody>
-                    <a:bodyPr/>
-                    <a:lstStyle/>
-                    <a:p>
-                      <a:r>
-                        <a:rPr lang="en-US" sz="1800" b="0" kern="1200" dirty="0" smtClean="0">
-                          <a:solidFill>
-                            <a:schemeClr val="tx1"/>
-                          </a:solidFill>
-                          <a:effectLst/>
-                          <a:latin typeface="+mn-lt"/>
-                          <a:ea typeface="+mn-ea"/>
-                          <a:cs typeface="+mn-cs"/>
-                        </a:rPr>
-                        <a:t>Dr. Alan J. Weston </a:t>
-                      </a:r>
-                      <a:endParaRPr lang="en-US" b="0" dirty="0">
-                        <a:solidFill>
-                          <a:schemeClr val="tx1"/>
-                        </a:solidFill>
-                      </a:endParaRPr>
-                    </a:p>
-                  </a:txBody>
-                  <a:tcPr>
-                    <a:lnL w="12700" cmpd="sng">
-                      <a:noFill/>
-                    </a:lnL>
-                    <a:lnR w="12700" cmpd="sng">
-                      <a:noFill/>
-                    </a:lnR>
-                    <a:lnT w="12700" cmpd="sng">
-                      <a:noFill/>
-                    </a:lnT>
-                    <a:lnB w="12700" cmpd="sng">
-                      <a:noFill/>
-                    </a:lnB>
-                    <a:lnTlToBr w="12700" cmpd="sng">
-                      <a:noFill/>
-                      <a:prstDash val="solid"/>
-                    </a:lnTlToBr>
-                    <a:lnBlToTr w="12700" cmpd="sng">
-                      <a:noFill/>
-                      <a:prstDash val="solid"/>
-                    </a:lnBlToTr>
-                    <a:noFill/>
-                  </a:tcPr>
-                </a:tc>
-                <a:tc>
-                  <a:txBody>
-                    <a:bodyPr/>
-                    <a:lstStyle/>
-                    <a:p>
-                      <a:r>
-                        <a:rPr lang="en-US" sz="1800" b="0" kern="1200" dirty="0" smtClean="0">
-                          <a:solidFill>
-                            <a:schemeClr val="tx1"/>
-                          </a:solidFill>
-                          <a:effectLst/>
-                          <a:latin typeface="+mn-lt"/>
-                          <a:ea typeface="+mn-ea"/>
-                          <a:cs typeface="+mn-cs"/>
-                        </a:rPr>
-                        <a:t>Austin Miller </a:t>
-                      </a:r>
-                      <a:endParaRPr lang="en-US" b="0" dirty="0">
-                        <a:solidFill>
-                          <a:schemeClr val="tx1"/>
-                        </a:solidFill>
-                      </a:endParaRPr>
-                    </a:p>
-                  </a:txBody>
-                  <a:tcPr>
-                    <a:lnL w="12700" cmpd="sng">
-                      <a:noFill/>
-                    </a:lnL>
-                    <a:lnR w="12700" cmpd="sng">
-                      <a:noFill/>
-                    </a:lnR>
-                    <a:lnT w="12700" cmpd="sng">
-                      <a:noFill/>
-                    </a:lnT>
-                    <a:lnB w="12700" cmpd="sng">
-                      <a:noFill/>
-                    </a:lnB>
-                    <a:lnTlToBr w="12700" cmpd="sng">
-                      <a:noFill/>
-                      <a:prstDash val="solid"/>
-                    </a:lnTlToBr>
-                    <a:lnBlToTr w="12700" cmpd="sng">
-                      <a:noFill/>
-                      <a:prstDash val="solid"/>
-                    </a:lnBlToTr>
-                    <a:noFill/>
-                  </a:tcPr>
-                </a:tc>
-              </a:tr>
-              <a:tr h="347729">
-                <a:tc>
-                  <a:txBody>
-                    <a:bodyPr/>
-                    <a:lstStyle/>
-                    <a:p>
-                      <a:r>
-                        <a:rPr lang="en-US" sz="1800" b="0" kern="1200" dirty="0" smtClean="0">
-                          <a:solidFill>
-                            <a:schemeClr val="tx1"/>
-                          </a:solidFill>
-                          <a:effectLst/>
-                          <a:latin typeface="+mn-lt"/>
-                          <a:ea typeface="+mn-ea"/>
-                          <a:cs typeface="+mn-cs"/>
-                        </a:rPr>
-                        <a:t>Dr. James Mabry </a:t>
-                      </a:r>
-                      <a:endParaRPr lang="en-US" b="0" dirty="0">
-                        <a:solidFill>
-                          <a:schemeClr val="tx1"/>
-                        </a:solidFill>
-                      </a:endParaRPr>
-                    </a:p>
-                  </a:txBody>
-                  <a:tcPr>
-                    <a:lnL w="12700" cmpd="sng">
-                      <a:noFill/>
-                    </a:lnL>
-                    <a:lnR w="12700" cmpd="sng">
-                      <a:noFill/>
-                    </a:lnR>
-                    <a:lnT w="12700" cmpd="sng">
-                      <a:noFill/>
-                    </a:lnT>
-                    <a:lnB w="12700" cmpd="sng">
-                      <a:noFill/>
-                    </a:lnB>
-                    <a:lnTlToBr w="12700" cmpd="sng">
-                      <a:noFill/>
-                      <a:prstDash val="solid"/>
-                    </a:lnTlToBr>
-                    <a:lnBlToTr w="12700" cmpd="sng">
-                      <a:noFill/>
-                      <a:prstDash val="solid"/>
-                    </a:lnBlToTr>
-                    <a:noFill/>
-                  </a:tcPr>
-                </a:tc>
-                <a:tc>
-                  <a:txBody>
-                    <a:bodyPr/>
-                    <a:lstStyle/>
-                    <a:p>
-                      <a:r>
-                        <a:rPr lang="en-US" sz="1800" b="0" i="0" kern="1200" dirty="0" smtClean="0">
-                          <a:solidFill>
-                            <a:schemeClr val="dk1"/>
-                          </a:solidFill>
-                          <a:effectLst/>
-                          <a:latin typeface="+mn-lt"/>
-                          <a:ea typeface="+mn-ea"/>
-                          <a:cs typeface="+mn-cs"/>
-                        </a:rPr>
-                        <a:t>Kay Purcell</a:t>
-                      </a:r>
-                      <a:endParaRPr lang="en-US" dirty="0"/>
-                    </a:p>
-                  </a:txBody>
-                  <a:tcPr>
-                    <a:lnL w="12700" cmpd="sng">
-                      <a:noFill/>
-                    </a:lnL>
-                    <a:lnR w="12700" cmpd="sng">
-                      <a:noFill/>
-                    </a:lnR>
-                    <a:lnT w="12700" cmpd="sng">
-                      <a:noFill/>
-                    </a:lnT>
-                    <a:lnB w="12700" cmpd="sng">
-                      <a:noFill/>
-                    </a:lnB>
-                    <a:lnTlToBr w="12700" cmpd="sng">
-                      <a:noFill/>
-                      <a:prstDash val="solid"/>
-                    </a:lnTlToBr>
-                    <a:lnBlToTr w="12700" cmpd="sng">
-                      <a:noFill/>
-                      <a:prstDash val="solid"/>
-                    </a:lnBlToTr>
-                    <a:noFill/>
-                  </a:tcPr>
-                </a:tc>
-                <a:tc>
-                  <a:txBody>
-                    <a:bodyPr/>
-                    <a:lstStyle/>
-                    <a:p>
-                      <a:r>
-                        <a:rPr lang="en-US" b="0" dirty="0" err="1" smtClean="0">
-                          <a:solidFill>
-                            <a:schemeClr val="tx1"/>
-                          </a:solidFill>
-                        </a:rPr>
-                        <a:t>Indiegogo</a:t>
-                      </a:r>
-                      <a:r>
-                        <a:rPr lang="en-US" b="0" dirty="0" smtClean="0">
-                          <a:solidFill>
-                            <a:schemeClr val="tx1"/>
-                          </a:solidFill>
-                        </a:rPr>
-                        <a:t> Funders</a:t>
-                      </a:r>
-                      <a:endParaRPr lang="en-US" b="0" dirty="0">
-                        <a:solidFill>
-                          <a:schemeClr val="tx1"/>
-                        </a:solidFill>
-                      </a:endParaRPr>
-                    </a:p>
-                  </a:txBody>
-                  <a:tcPr>
-                    <a:lnL w="12700" cmpd="sng">
-                      <a:noFill/>
-                    </a:lnL>
-                    <a:lnR w="12700" cmpd="sng">
-                      <a:noFill/>
-                    </a:lnR>
-                    <a:lnT w="12700" cmpd="sng">
-                      <a:noFill/>
-                    </a:lnT>
-                    <a:lnB w="12700" cmpd="sng">
-                      <a:noFill/>
-                    </a:lnB>
-                    <a:lnTlToBr w="12700" cmpd="sng">
-                      <a:noFill/>
-                      <a:prstDash val="solid"/>
-                    </a:lnTlToBr>
-                    <a:lnBlToTr w="12700" cmpd="sng">
-                      <a:noFill/>
-                      <a:prstDash val="solid"/>
-                    </a:lnBlToTr>
-                    <a:noFill/>
-                  </a:tcPr>
-                </a:tc>
-              </a:tr>
-              <a:tr h="394093">
-                <a:tc>
-                  <a:txBody>
-                    <a:bodyPr/>
-                    <a:lstStyle/>
-                    <a:p>
-                      <a:pPr marL="0" marR="0" indent="0" algn="l" defTabSz="457200" rtl="0" eaLnBrk="1" fontAlgn="auto" latinLnBrk="0" hangingPunct="1">
-                        <a:lnSpc>
-                          <a:spcPct val="100000"/>
-                        </a:lnSpc>
-                        <a:spcBef>
-                          <a:spcPts val="0"/>
-                        </a:spcBef>
-                        <a:spcAft>
-                          <a:spcPts val="0"/>
-                        </a:spcAft>
-                        <a:buClrTx/>
-                        <a:buSzTx/>
-                        <a:buFontTx/>
-                        <a:buNone/>
-                        <a:tabLst/>
-                        <a:defRPr/>
-                      </a:pPr>
-                      <a:r>
-                        <a:rPr lang="en-US" sz="1800" b="0" kern="1200" dirty="0" smtClean="0">
-                          <a:solidFill>
-                            <a:schemeClr val="tx1"/>
-                          </a:solidFill>
-                          <a:effectLst/>
-                          <a:latin typeface="+mn-lt"/>
-                          <a:ea typeface="+mn-ea"/>
-                          <a:cs typeface="+mn-cs"/>
-                        </a:rPr>
-                        <a:t>Tim </a:t>
-                      </a:r>
-                      <a:r>
-                        <a:rPr lang="en-US" sz="1800" b="0" kern="1200" dirty="0" err="1" smtClean="0">
-                          <a:solidFill>
-                            <a:schemeClr val="tx1"/>
-                          </a:solidFill>
-                          <a:effectLst/>
-                          <a:latin typeface="+mn-lt"/>
-                          <a:ea typeface="+mn-ea"/>
-                          <a:cs typeface="+mn-cs"/>
-                        </a:rPr>
-                        <a:t>Attig</a:t>
-                      </a:r>
-                      <a:r>
-                        <a:rPr lang="en-US" sz="1800" b="0" kern="1200" dirty="0" smtClean="0">
-                          <a:solidFill>
-                            <a:schemeClr val="tx1"/>
-                          </a:solidFill>
-                          <a:effectLst/>
-                          <a:latin typeface="+mn-lt"/>
-                          <a:ea typeface="+mn-ea"/>
-                          <a:cs typeface="+mn-cs"/>
-                        </a:rPr>
-                        <a:t> </a:t>
-                      </a:r>
-                      <a:endParaRPr lang="en-US" b="0" dirty="0" smtClean="0">
-                        <a:solidFill>
-                          <a:schemeClr val="tx1"/>
-                        </a:solidFill>
-                      </a:endParaRPr>
-                    </a:p>
-                  </a:txBody>
-                  <a:tcPr>
-                    <a:lnL w="12700" cmpd="sng">
-                      <a:noFill/>
-                    </a:lnL>
-                    <a:lnR w="12700" cmpd="sng">
-                      <a:noFill/>
-                    </a:lnR>
-                    <a:lnT w="12700" cmpd="sng">
-                      <a:noFill/>
-                    </a:lnT>
-                    <a:lnB w="12700" cmpd="sng">
-                      <a:noFill/>
-                    </a:lnB>
-                    <a:lnTlToBr w="12700" cmpd="sng">
-                      <a:noFill/>
-                      <a:prstDash val="solid"/>
-                    </a:lnTlToBr>
-                    <a:lnBlToTr w="12700" cmpd="sng">
-                      <a:noFill/>
-                      <a:prstDash val="solid"/>
-                    </a:lnBlToTr>
-                    <a:noFill/>
-                  </a:tcPr>
-                </a:tc>
-                <a:tc>
-                  <a:txBody>
-                    <a:bodyPr/>
-                    <a:lstStyle/>
-                    <a:p>
-                      <a:pPr marL="0" marR="0" indent="0" algn="l" defTabSz="457200" rtl="0" eaLnBrk="1" fontAlgn="auto" latinLnBrk="0" hangingPunct="1">
-                        <a:lnSpc>
-                          <a:spcPct val="100000"/>
-                        </a:lnSpc>
-                        <a:spcBef>
-                          <a:spcPts val="0"/>
-                        </a:spcBef>
-                        <a:spcAft>
-                          <a:spcPts val="0"/>
-                        </a:spcAft>
-                        <a:buClrTx/>
-                        <a:buSzTx/>
-                        <a:buFontTx/>
-                        <a:buNone/>
-                        <a:tabLst/>
-                        <a:defRPr/>
-                      </a:pPr>
-                      <a:r>
-                        <a:rPr lang="en-US" sz="1800" b="0" kern="1200" dirty="0" smtClean="0">
-                          <a:solidFill>
-                            <a:schemeClr val="tx1"/>
-                          </a:solidFill>
-                          <a:effectLst/>
-                          <a:latin typeface="+mn-lt"/>
-                          <a:ea typeface="+mn-ea"/>
-                          <a:cs typeface="+mn-cs"/>
-                        </a:rPr>
-                        <a:t>Joe Lennox</a:t>
-                      </a:r>
-                      <a:endParaRPr lang="en-US" b="0" dirty="0" smtClean="0">
-                        <a:solidFill>
-                          <a:schemeClr val="tx1"/>
-                        </a:solidFill>
-                      </a:endParaRPr>
-                    </a:p>
-                  </a:txBody>
-                  <a:tcPr>
-                    <a:lnL w="12700" cmpd="sng">
-                      <a:noFill/>
-                    </a:lnL>
-                    <a:lnR w="12700" cmpd="sng">
-                      <a:noFill/>
-                    </a:lnR>
-                    <a:lnT w="12700" cmpd="sng">
-                      <a:noFill/>
-                    </a:lnT>
-                    <a:lnB w="12700" cmpd="sng">
-                      <a:noFill/>
-                    </a:lnB>
-                    <a:lnTlToBr w="12700" cmpd="sng">
-                      <a:noFill/>
-                      <a:prstDash val="solid"/>
-                    </a:lnTlToBr>
-                    <a:lnBlToTr w="12700" cmpd="sng">
-                      <a:noFill/>
-                      <a:prstDash val="solid"/>
-                    </a:lnBlToTr>
-                    <a:noFill/>
-                  </a:tcPr>
-                </a:tc>
-                <a:tc>
-                  <a:txBody>
-                    <a:bodyPr/>
-                    <a:lstStyle/>
-                    <a:p>
-                      <a:endParaRPr lang="en-US" dirty="0"/>
-                    </a:p>
-                  </a:txBody>
-                  <a:tcPr>
-                    <a:lnL w="12700" cmpd="sng">
-                      <a:noFill/>
-                    </a:lnL>
-                    <a:lnR w="12700" cmpd="sng">
-                      <a:noFill/>
-                    </a:lnR>
-                    <a:lnT w="12700" cmpd="sng">
-                      <a:noFill/>
-                    </a:lnT>
-                    <a:lnB w="12700" cmpd="sng">
-                      <a:noFill/>
-                    </a:lnB>
-                    <a:lnTlToBr w="12700" cmpd="sng">
-                      <a:noFill/>
-                      <a:prstDash val="solid"/>
-                    </a:lnTlToBr>
-                    <a:lnBlToTr w="12700" cmpd="sng">
-                      <a:noFill/>
-                      <a:prstDash val="solid"/>
-                    </a:lnBlToTr>
-                    <a:noFill/>
-                  </a:tcPr>
-                </a:tc>
-              </a:tr>
-            </a:tbl>
-          </a:graphicData>
-        </a:graphic>
-      </p:graphicFrame>
+          </p:nvPr>
+        </p:nvSpPr>
+        <p:spPr/>
+        <p:txBody>
+          <a:bodyPr>
+            <a:normAutofit fontScale="92500" lnSpcReduction="20000"/>
+          </a:bodyPr>
+          <a:lstStyle/>
+          <a:p>
+            <a:pPr marL="0" indent="0" fontAlgn="base">
+              <a:buNone/>
+            </a:pPr>
+            <a:r>
+              <a:rPr lang="en-US" dirty="0"/>
+              <a:t>Problem Statement</a:t>
+            </a:r>
+          </a:p>
+          <a:p>
+            <a:pPr lvl="1" fontAlgn="base"/>
+            <a:r>
+              <a:rPr lang="en-US" dirty="0"/>
+              <a:t>Current hobbyist 3D printers are imprecise and fault-prone</a:t>
+            </a:r>
+          </a:p>
+          <a:p>
+            <a:pPr lvl="1" fontAlgn="base"/>
+            <a:r>
+              <a:rPr lang="en-US" dirty="0"/>
+              <a:t>High resolution additive manufacturing is currently not accessible for hobbyists (under $1,000)</a:t>
+            </a:r>
+          </a:p>
+          <a:p>
+            <a:pPr lvl="1" fontAlgn="base"/>
+            <a:r>
+              <a:rPr lang="en-US" dirty="0"/>
+              <a:t>Available PAM systems use proprietary hardware and software</a:t>
+            </a:r>
+          </a:p>
+          <a:p>
+            <a:pPr marL="0" indent="0" fontAlgn="base">
+              <a:buNone/>
+            </a:pPr>
+            <a:r>
+              <a:rPr lang="en-US" dirty="0"/>
+              <a:t>Our Solution</a:t>
+            </a:r>
+          </a:p>
+          <a:p>
+            <a:pPr lvl="1"/>
+            <a:r>
+              <a:rPr lang="en-US" dirty="0"/>
+              <a:t>A DLP PAM system can produce high quality and fast prints</a:t>
+            </a:r>
+          </a:p>
+          <a:p>
+            <a:pPr lvl="1"/>
+            <a:r>
+              <a:rPr lang="en-US" dirty="0"/>
+              <a:t>Use off-the-shelf open-source hardware</a:t>
+            </a:r>
+          </a:p>
+          <a:p>
+            <a:pPr lvl="1"/>
+            <a:r>
+              <a:rPr lang="en-US" dirty="0"/>
+              <a:t>Create a thoroughly documented reference </a:t>
+            </a:r>
+            <a:r>
+              <a:rPr lang="en-US" dirty="0" smtClean="0"/>
+              <a:t>design</a:t>
+            </a:r>
+            <a:endParaRPr lang="en-US" dirty="0"/>
+          </a:p>
+        </p:txBody>
+      </p:sp>
       <p:sp>
         <p:nvSpPr>
           <p:cNvPr id="4" name="Slide Number Placeholder 3"/>
@@ -11072,17 +8642,16 @@
           <a:p>
             <a:fld id="{5C6BB475-B640-4DD3-A1AA-1CF10A44AA06}" type="slidenum">
               <a:rPr lang="en-US" smtClean="0"/>
-              <a:pPr/>
               <a:t>21</a:t>
             </a:fld>
-            <a:endParaRPr lang="en-US" dirty="0"/>
+            <a:endParaRPr lang="en-US"/>
           </a:p>
         </p:txBody>
       </p:sp>
     </p:spTree>
     <p:extLst>
       <p:ext uri="{BB962C8B-B14F-4D97-AF65-F5344CB8AC3E}">
-        <p14:creationId xmlns:p14="http://schemas.microsoft.com/office/powerpoint/2010/main" val="767577116"/>
+        <p14:creationId xmlns:p14="http://schemas.microsoft.com/office/powerpoint/2010/main" val="2150469081"/>
       </p:ext>
     </p:extLst>
   </p:cSld>
@@ -11128,6 +8697,101 @@
         </p:nvSpPr>
         <p:spPr/>
         <p:txBody>
+          <a:bodyPr/>
+          <a:lstStyle/>
+          <a:p>
+            <a:r>
+              <a:rPr lang="en-US" dirty="0" smtClean="0"/>
+              <a:t>Acknowledgments</a:t>
+            </a:r>
+            <a:endParaRPr lang="en-US" dirty="0"/>
+          </a:p>
+        </p:txBody>
+      </p:sp>
+      <p:sp>
+        <p:nvSpPr>
+          <p:cNvPr id="3" name="Content Placeholder 2"/>
+          <p:cNvSpPr>
+            <a:spLocks noGrp="1"/>
+          </p:cNvSpPr>
+          <p:nvPr>
+            <p:ph idx="1"/>
+          </p:nvPr>
+        </p:nvSpPr>
+        <p:spPr/>
+        <p:txBody>
+          <a:bodyPr/>
+          <a:lstStyle/>
+          <a:p>
+            <a:endParaRPr lang="en-US" dirty="0"/>
+          </a:p>
+        </p:txBody>
+      </p:sp>
+      <p:sp>
+        <p:nvSpPr>
+          <p:cNvPr id="4" name="Slide Number Placeholder 3"/>
+          <p:cNvSpPr>
+            <a:spLocks noGrp="1"/>
+          </p:cNvSpPr>
+          <p:nvPr>
+            <p:ph type="sldNum" sz="quarter" idx="12"/>
+          </p:nvPr>
+        </p:nvSpPr>
+        <p:spPr/>
+        <p:txBody>
+          <a:bodyPr/>
+          <a:lstStyle/>
+          <a:p>
+            <a:fld id="{5C6BB475-B640-4DD3-A1AA-1CF10A44AA06}" type="slidenum">
+              <a:rPr lang="en-US" smtClean="0"/>
+              <a:t>22</a:t>
+            </a:fld>
+            <a:endParaRPr lang="en-US"/>
+          </a:p>
+        </p:txBody>
+      </p:sp>
+    </p:spTree>
+    <p:extLst>
+      <p:ext uri="{BB962C8B-B14F-4D97-AF65-F5344CB8AC3E}">
+        <p14:creationId xmlns:p14="http://schemas.microsoft.com/office/powerpoint/2010/main" val="4148977491"/>
+      </p:ext>
+    </p:extLst>
+  </p:cSld>
+  <p:clrMapOvr>
+    <a:masterClrMapping/>
+  </p:clrMapOvr>
+</p:sld>
+</file>
+
+<file path=ppt/slides/slide23.xml><?xml version="1.0" encoding="utf-8"?>
+<p:sld xmlns:a="http://schemas.openxmlformats.org/drawingml/2006/main" xmlns:r="http://schemas.openxmlformats.org/officeDocument/2006/relationships" xmlns:p="http://schemas.openxmlformats.org/presentationml/2006/main">
+  <p:cSld>
+    <p:spTree>
+      <p:nvGrpSpPr>
+        <p:cNvPr id="1" name=""/>
+        <p:cNvGrpSpPr/>
+        <p:nvPr/>
+      </p:nvGrpSpPr>
+      <p:grpSpPr>
+        <a:xfrm>
+          <a:off x="0" y="0"/>
+          <a:ext cx="0" cy="0"/>
+          <a:chOff x="0" y="0"/>
+          <a:chExt cx="0" cy="0"/>
+        </a:xfrm>
+      </p:grpSpPr>
+      <p:sp>
+        <p:nvSpPr>
+          <p:cNvPr id="2" name="Title 1"/>
+          <p:cNvSpPr>
+            <a:spLocks noGrp="1"/>
+          </p:cNvSpPr>
+          <p:nvPr>
+            <p:ph type="title"/>
+          </p:nvPr>
+        </p:nvSpPr>
+        <p:spPr/>
+        <p:txBody>
           <a:bodyPr>
             <a:normAutofit/>
           </a:bodyPr>
@@ -11411,7 +9075,7 @@
           <a:p>
             <a:fld id="{5C6BB475-B640-4DD3-A1AA-1CF10A44AA06}" type="slidenum">
               <a:rPr lang="en-US" smtClean="0"/>
-              <a:t>22</a:t>
+              <a:t>23</a:t>
             </a:fld>
             <a:endParaRPr lang="en-US"/>
           </a:p>
@@ -11641,7 +9305,7 @@
         <p:spPr/>
         <p:txBody>
           <a:bodyPr>
-            <a:normAutofit fontScale="70000" lnSpcReduction="20000"/>
+            <a:normAutofit fontScale="92500" lnSpcReduction="20000"/>
           </a:bodyPr>
           <a:lstStyle/>
           <a:p>
@@ -11650,22 +9314,25 @@
             </a:pPr>
             <a:r>
               <a:rPr lang="en-US" dirty="0" smtClean="0"/>
-              <a:t>Problem</a:t>
+              <a:t>Problem Statement</a:t>
             </a:r>
           </a:p>
           <a:p>
             <a:pPr lvl="1" fontAlgn="base"/>
             <a:r>
+              <a:rPr lang="en-US" dirty="0" smtClean="0"/>
+              <a:t>Current </a:t>
+            </a:r>
+            <a:r>
               <a:rPr lang="en-US" dirty="0"/>
-              <a:t>High resolution additive manufacturing </a:t>
-            </a:r>
-            <a:r>
-              <a:rPr lang="en-US" dirty="0" smtClean="0"/>
-              <a:t>is </a:t>
-            </a:r>
+              <a:t>hobbyist 3D printers are imprecise and fault-prone</a:t>
+            </a:r>
+          </a:p>
+          <a:p>
+            <a:pPr lvl="1" fontAlgn="base"/>
             <a:r>
               <a:rPr lang="en-US" dirty="0"/>
-              <a:t>not accessible for hobbyists (under $1,000</a:t>
+              <a:t>High resolution additive manufacturing is currently not accessible for hobbyists (under $1,000</a:t>
             </a:r>
             <a:r>
               <a:rPr lang="en-US" dirty="0" smtClean="0"/>
@@ -11675,36 +9342,8 @@
           <a:p>
             <a:pPr lvl="1" fontAlgn="base"/>
             <a:r>
-              <a:rPr lang="en-US" dirty="0" smtClean="0"/>
-              <a:t>Current </a:t>
-            </a:r>
-            <a:r>
               <a:rPr lang="en-US" dirty="0"/>
-              <a:t>hobbyist 3D printers are </a:t>
-            </a:r>
-            <a:r>
-              <a:rPr lang="en-US" dirty="0" smtClean="0"/>
-              <a:t>imprecise, fault-prone, and poorly documented</a:t>
-            </a:r>
-            <a:endParaRPr lang="en-US" dirty="0"/>
-          </a:p>
-          <a:p>
-            <a:pPr lvl="1" fontAlgn="base"/>
-            <a:r>
-              <a:rPr lang="en-US" dirty="0" smtClean="0"/>
-              <a:t>Available </a:t>
-            </a:r>
-            <a:r>
-              <a:rPr lang="en-US" dirty="0"/>
-              <a:t>PAM </a:t>
-            </a:r>
-            <a:r>
-              <a:rPr lang="en-US" dirty="0" smtClean="0"/>
-              <a:t>systems are inflexible, </a:t>
-            </a:r>
-            <a:r>
-              <a:rPr lang="en-US" dirty="0"/>
-              <a:t>use proprietary hardware and </a:t>
+              <a:t>Available PAM systems use proprietary hardware and </a:t>
             </a:r>
             <a:r>
               <a:rPr lang="en-US" dirty="0" smtClean="0"/>
@@ -11717,63 +9356,33 @@
             </a:pPr>
             <a:r>
               <a:rPr lang="en-US" dirty="0" smtClean="0"/>
-              <a:t>Solution</a:t>
+              <a:t>Our Solution</a:t>
             </a:r>
           </a:p>
           <a:p>
             <a:pPr lvl="1"/>
             <a:r>
-              <a:rPr lang="en-US" dirty="0" err="1" smtClean="0"/>
-              <a:t>Libre</a:t>
-            </a:r>
-            <a:endParaRPr lang="en-US" dirty="0" smtClean="0"/>
+              <a:rPr lang="en-US" dirty="0" smtClean="0"/>
+              <a:t>A </a:t>
+            </a:r>
+            <a:r>
+              <a:rPr lang="en-US" dirty="0"/>
+              <a:t>DLP PAM system can produce high quality and fast </a:t>
+            </a:r>
+            <a:r>
+              <a:rPr lang="en-US" dirty="0" smtClean="0"/>
+              <a:t>prints</a:t>
+            </a:r>
           </a:p>
           <a:p>
             <a:pPr lvl="1"/>
             <a:r>
               <a:rPr lang="en-US" dirty="0" smtClean="0"/>
-              <a:t>Accessible </a:t>
+              <a:t>Use </a:t>
             </a:r>
             <a:r>
               <a:rPr lang="en-US" dirty="0"/>
-              <a:t>to the hobbyist</a:t>
-            </a:r>
-          </a:p>
-          <a:p>
-            <a:pPr lvl="1"/>
-            <a:r>
-              <a:rPr lang="en-US" dirty="0" smtClean="0"/>
-              <a:t>Precise </a:t>
-            </a:r>
-            <a:r>
-              <a:rPr lang="en-US" dirty="0"/>
-              <a:t>and repeatable</a:t>
-            </a:r>
-          </a:p>
-          <a:p>
-            <a:pPr lvl="1"/>
-            <a:r>
-              <a:rPr lang="en-US" dirty="0"/>
-              <a:t>Flexible for the end </a:t>
-            </a:r>
-            <a:r>
-              <a:rPr lang="en-US" dirty="0" smtClean="0"/>
-              <a:t>user</a:t>
-            </a:r>
-          </a:p>
-          <a:p>
-            <a:pPr lvl="1"/>
-            <a:r>
-              <a:rPr lang="en-US" dirty="0"/>
-              <a:t>O</a:t>
-            </a:r>
-            <a:r>
-              <a:rPr lang="en-US" dirty="0" smtClean="0"/>
-              <a:t>ff-the-shelf </a:t>
-            </a:r>
-            <a:r>
-              <a:rPr lang="en-US" dirty="0"/>
-              <a:t>open-source </a:t>
+              <a:t>off-the-shelf open-source </a:t>
             </a:r>
             <a:r>
               <a:rPr lang="en-US" dirty="0" smtClean="0"/>
@@ -11784,11 +9393,11 @@
             <a:pPr lvl="1"/>
             <a:r>
               <a:rPr lang="en-US" dirty="0" smtClean="0"/>
-              <a:t>A </a:t>
+              <a:t>Create </a:t>
             </a:r>
             <a:r>
               <a:rPr lang="en-US" dirty="0"/>
-              <a:t>thoroughly documented reference </a:t>
+              <a:t>a thoroughly documented reference </a:t>
             </a:r>
             <a:r>
               <a:rPr lang="en-US" dirty="0" smtClean="0"/>
@@ -11824,7 +9433,7 @@
     </p:spTree>
     <p:extLst>
       <p:ext uri="{BB962C8B-B14F-4D97-AF65-F5344CB8AC3E}">
-        <p14:creationId xmlns:p14="http://schemas.microsoft.com/office/powerpoint/2010/main" val="4273748684"/>
+        <p14:creationId xmlns:p14="http://schemas.microsoft.com/office/powerpoint/2010/main" val="4029967778"/>
       </p:ext>
     </p:extLst>
   </p:cSld>
@@ -11868,12 +9477,7 @@
             <p:ph type="title"/>
           </p:nvPr>
         </p:nvSpPr>
-        <p:spPr>
-          <a:xfrm>
-            <a:off x="1541985" y="372698"/>
-            <a:ext cx="10018713" cy="1057275"/>
-          </a:xfrm>
-        </p:spPr>
+        <p:spPr/>
         <p:txBody>
           <a:bodyPr/>
           <a:lstStyle/>
@@ -11939,30 +9543,34 @@
           </a:p>
         </p:txBody>
       </p:sp>
-      <p:graphicFrame>
-        <p:nvGraphicFramePr>
-          <p:cNvPr id="9" name="Chart 8"/>
-          <p:cNvGraphicFramePr>
-            <a:graphicFrameLocks noGrp="1"/>
-          </p:cNvGraphicFramePr>
-          <p:nvPr>
-            <p:extLst/>
-          </p:nvPr>
-        </p:nvGraphicFramePr>
-        <p:xfrm>
-          <a:off x="2711903" y="1295400"/>
-          <a:ext cx="7937047" cy="5203371"/>
-        </p:xfrm>
-        <a:graphic>
-          <a:graphicData uri="http://schemas.openxmlformats.org/drawingml/2006/chart">
-            <c:chart xmlns:c="http://schemas.openxmlformats.org/drawingml/2006/chart" xmlns:r="http://schemas.openxmlformats.org/officeDocument/2006/relationships" r:id="rId2"/>
-          </a:graphicData>
-        </a:graphic>
-      </p:graphicFrame>
+      <p:pic>
+        <p:nvPicPr>
+          <p:cNvPr id="2" name="Picture 1"/>
+          <p:cNvPicPr>
+            <a:picLocks noChangeAspect="1"/>
+          </p:cNvPicPr>
+          <p:nvPr/>
+        </p:nvPicPr>
+        <p:blipFill>
+          <a:blip r:embed="rId2"/>
+          <a:stretch>
+            <a:fillRect/>
+          </a:stretch>
+        </p:blipFill>
+        <p:spPr>
+          <a:xfrm>
+            <a:off x="3189963" y="1478099"/>
+            <a:ext cx="6722761" cy="4887131"/>
+          </a:xfrm>
+          <a:prstGeom prst="rect">
+            <a:avLst/>
+          </a:prstGeom>
+        </p:spPr>
+      </p:pic>
     </p:spTree>
     <p:extLst>
       <p:ext uri="{BB962C8B-B14F-4D97-AF65-F5344CB8AC3E}">
-        <p14:creationId xmlns:p14="http://schemas.microsoft.com/office/powerpoint/2010/main" val="3408471816"/>
+        <p14:creationId xmlns:p14="http://schemas.microsoft.com/office/powerpoint/2010/main" val="147561124"/>
       </p:ext>
     </p:extLst>
   </p:cSld>
@@ -12012,29 +9620,67 @@
           <a:lstStyle/>
           <a:p>
             <a:r>
+              <a:rPr lang="en-US" dirty="0"/>
+              <a:t>Criteria</a:t>
+            </a:r>
+          </a:p>
+        </p:txBody>
+      </p:sp>
+      <p:sp>
+        <p:nvSpPr>
+          <p:cNvPr id="3" name="Content Placeholder 2"/>
+          <p:cNvSpPr>
+            <a:spLocks noGrp="1"/>
+          </p:cNvSpPr>
+          <p:nvPr>
+            <p:ph idx="1"/>
+          </p:nvPr>
+        </p:nvSpPr>
+        <p:spPr/>
+        <p:txBody>
+          <a:bodyPr/>
+          <a:lstStyle/>
+          <a:p>
+            <a:r>
+              <a:rPr lang="en-US" dirty="0"/>
+              <a:t>Accessible to the hobbyist</a:t>
+            </a:r>
+          </a:p>
+          <a:p>
+            <a:r>
+              <a:rPr lang="en-US" dirty="0"/>
+              <a:t>Open Source and Free </a:t>
+            </a:r>
+            <a:r>
               <a:rPr lang="en-US" dirty="0" smtClean="0"/>
-              <a:t>Top Down vs. Bottom Up</a:t>
+              <a:t>(as </a:t>
+            </a:r>
+            <a:r>
+              <a:rPr lang="en-US" dirty="0"/>
+              <a:t>in </a:t>
+            </a:r>
+            <a:r>
+              <a:rPr lang="en-US" dirty="0" smtClean="0"/>
+              <a:t>speech)</a:t>
             </a:r>
             <a:endParaRPr lang="en-US" dirty="0"/>
           </a:p>
-        </p:txBody>
-      </p:sp>
-      <p:sp>
-        <p:nvSpPr>
-          <p:cNvPr id="3" name="Content Placeholder 2"/>
-          <p:cNvSpPr>
-            <a:spLocks noGrp="1"/>
-          </p:cNvSpPr>
-          <p:nvPr>
-            <p:ph idx="1"/>
-          </p:nvPr>
-        </p:nvSpPr>
-        <p:spPr/>
-        <p:txBody>
-          <a:bodyPr/>
-          <a:lstStyle/>
-          <a:p>
-            <a:endParaRPr lang="en-US"/>
+          <a:p>
+            <a:r>
+              <a:rPr lang="en-US" dirty="0"/>
+              <a:t>Precise and </a:t>
+            </a:r>
+            <a:r>
+              <a:rPr lang="en-US" dirty="0" smtClean="0"/>
+              <a:t>repeatable</a:t>
+            </a:r>
+          </a:p>
+          <a:p>
+            <a:r>
+              <a:rPr lang="en-US" dirty="0" smtClean="0"/>
+              <a:t>Flexible for the end user</a:t>
+            </a:r>
+            <a:endParaRPr lang="en-US" dirty="0"/>
           </a:p>
         </p:txBody>
       </p:sp>
@@ -12064,13 +9710,20 @@
     </p:spTree>
     <p:extLst>
       <p:ext uri="{BB962C8B-B14F-4D97-AF65-F5344CB8AC3E}">
-        <p14:creationId xmlns:p14="http://schemas.microsoft.com/office/powerpoint/2010/main" val="3047169888"/>
+        <p14:creationId xmlns:p14="http://schemas.microsoft.com/office/powerpoint/2010/main" val="539541693"/>
       </p:ext>
     </p:extLst>
   </p:cSld>
   <p:clrMapOvr>
     <a:masterClrMapping/>
   </p:clrMapOvr>
+  <p:timing>
+    <p:tnLst>
+      <p:par>
+        <p:cTn id="1" dur="indefinite" restart="never" nodeType="tmRoot"/>
+      </p:par>
+    </p:tnLst>
+  </p:timing>
 </p:sld>
 </file>
 
@@ -12108,6 +9761,101 @@
           <a:p>
             <a:r>
               <a:rPr lang="en-US" dirty="0" smtClean="0"/>
+              <a:t>Top Down vs. Bottom Up</a:t>
+            </a:r>
+            <a:endParaRPr lang="en-US" dirty="0"/>
+          </a:p>
+        </p:txBody>
+      </p:sp>
+      <p:sp>
+        <p:nvSpPr>
+          <p:cNvPr id="3" name="Content Placeholder 2"/>
+          <p:cNvSpPr>
+            <a:spLocks noGrp="1"/>
+          </p:cNvSpPr>
+          <p:nvPr>
+            <p:ph idx="1"/>
+          </p:nvPr>
+        </p:nvSpPr>
+        <p:spPr/>
+        <p:txBody>
+          <a:bodyPr/>
+          <a:lstStyle/>
+          <a:p>
+            <a:endParaRPr lang="en-US"/>
+          </a:p>
+        </p:txBody>
+      </p:sp>
+      <p:sp>
+        <p:nvSpPr>
+          <p:cNvPr id="4" name="Slide Number Placeholder 3"/>
+          <p:cNvSpPr>
+            <a:spLocks noGrp="1"/>
+          </p:cNvSpPr>
+          <p:nvPr>
+            <p:ph type="sldNum" sz="quarter" idx="12"/>
+          </p:nvPr>
+        </p:nvSpPr>
+        <p:spPr/>
+        <p:txBody>
+          <a:bodyPr/>
+          <a:lstStyle/>
+          <a:p>
+            <a:fld id="{5C6BB475-B640-4DD3-A1AA-1CF10A44AA06}" type="slidenum">
+              <a:rPr lang="en-US" smtClean="0"/>
+              <a:t>7</a:t>
+            </a:fld>
+            <a:endParaRPr lang="en-US"/>
+          </a:p>
+        </p:txBody>
+      </p:sp>
+    </p:spTree>
+    <p:extLst>
+      <p:ext uri="{BB962C8B-B14F-4D97-AF65-F5344CB8AC3E}">
+        <p14:creationId xmlns:p14="http://schemas.microsoft.com/office/powerpoint/2010/main" val="3047169888"/>
+      </p:ext>
+    </p:extLst>
+  </p:cSld>
+  <p:clrMapOvr>
+    <a:masterClrMapping/>
+  </p:clrMapOvr>
+</p:sld>
+</file>
+
+<file path=ppt/slides/slide8.xml><?xml version="1.0" encoding="utf-8"?>
+<p:sld xmlns:a="http://schemas.openxmlformats.org/drawingml/2006/main" xmlns:r="http://schemas.openxmlformats.org/officeDocument/2006/relationships" xmlns:p="http://schemas.openxmlformats.org/presentationml/2006/main">
+  <p:cSld>
+    <p:spTree>
+      <p:nvGrpSpPr>
+        <p:cNvPr id="1" name=""/>
+        <p:cNvGrpSpPr/>
+        <p:nvPr/>
+      </p:nvGrpSpPr>
+      <p:grpSpPr>
+        <a:xfrm>
+          <a:off x="0" y="0"/>
+          <a:ext cx="0" cy="0"/>
+          <a:chOff x="0" y="0"/>
+          <a:chExt cx="0" cy="0"/>
+        </a:xfrm>
+      </p:grpSpPr>
+      <p:sp>
+        <p:nvSpPr>
+          <p:cNvPr id="2" name="Title 1"/>
+          <p:cNvSpPr>
+            <a:spLocks noGrp="1"/>
+          </p:cNvSpPr>
+          <p:nvPr>
+            <p:ph type="title"/>
+          </p:nvPr>
+        </p:nvSpPr>
+        <p:spPr/>
+        <p:txBody>
+          <a:bodyPr/>
+          <a:lstStyle/>
+          <a:p>
+            <a:r>
+              <a:rPr lang="en-US" dirty="0" smtClean="0"/>
               <a:t>System Block </a:t>
             </a:r>
             <a:r>
@@ -12134,7 +9882,7 @@
           <a:p>
             <a:fld id="{5C6BB475-B640-4DD3-A1AA-1CF10A44AA06}" type="slidenum">
               <a:rPr lang="en-US" smtClean="0"/>
-              <a:t>7</a:t>
+              <a:t>8</a:t>
             </a:fld>
             <a:endParaRPr lang="en-US"/>
           </a:p>
@@ -12198,223 +9946,6 @@
     <p:extLst>
       <p:ext uri="{BB962C8B-B14F-4D97-AF65-F5344CB8AC3E}">
         <p14:creationId xmlns:p14="http://schemas.microsoft.com/office/powerpoint/2010/main" val="3997829335"/>
-      </p:ext>
-    </p:extLst>
-  </p:cSld>
-  <p:clrMapOvr>
-    <a:masterClrMapping/>
-  </p:clrMapOvr>
-  <p:timing>
-    <p:tnLst>
-      <p:par>
-        <p:cTn id="1" dur="indefinite" restart="never" nodeType="tmRoot"/>
-      </p:par>
-    </p:tnLst>
-  </p:timing>
-</p:sld>
-</file>
-
-<file path=ppt/slides/slide8.xml><?xml version="1.0" encoding="utf-8"?>
-<p:sld xmlns:a="http://schemas.openxmlformats.org/drawingml/2006/main" xmlns:r="http://schemas.openxmlformats.org/officeDocument/2006/relationships" xmlns:p="http://schemas.openxmlformats.org/presentationml/2006/main">
-  <p:cSld>
-    <p:spTree>
-      <p:nvGrpSpPr>
-        <p:cNvPr id="1" name=""/>
-        <p:cNvGrpSpPr/>
-        <p:nvPr/>
-      </p:nvGrpSpPr>
-      <p:grpSpPr>
-        <a:xfrm>
-          <a:off x="0" y="0"/>
-          <a:ext cx="0" cy="0"/>
-          <a:chOff x="0" y="0"/>
-          <a:chExt cx="0" cy="0"/>
-        </a:xfrm>
-      </p:grpSpPr>
-      <p:sp>
-        <p:nvSpPr>
-          <p:cNvPr id="5" name="Title 4"/>
-          <p:cNvSpPr>
-            <a:spLocks noGrp="1"/>
-          </p:cNvSpPr>
-          <p:nvPr>
-            <p:ph type="title"/>
-          </p:nvPr>
-        </p:nvSpPr>
-        <p:spPr/>
-        <p:txBody>
-          <a:bodyPr>
-            <a:normAutofit fontScale="90000"/>
-          </a:bodyPr>
-          <a:lstStyle/>
-          <a:p>
-            <a:r>
-              <a:rPr lang="en-US" dirty="0"/>
-              <a:t>Chassis Design</a:t>
-            </a:r>
-          </a:p>
-        </p:txBody>
-      </p:sp>
-      <p:pic>
-        <p:nvPicPr>
-          <p:cNvPr id="10" name="Content Placeholder 9"/>
-          <p:cNvPicPr>
-            <a:picLocks noGrp="1" noChangeAspect="1"/>
-          </p:cNvPicPr>
-          <p:nvPr>
-            <p:ph sz="half" idx="1"/>
-          </p:nvPr>
-        </p:nvPicPr>
-        <p:blipFill rotWithShape="1">
-          <a:blip r:embed="rId2" cstate="print">
-            <a:extLst>
-              <a:ext uri="{28A0092B-C50C-407E-A947-70E740481C1C}">
-                <a14:useLocalDpi xmlns:a14="http://schemas.microsoft.com/office/drawing/2010/main" val="0"/>
-              </a:ext>
-            </a:extLst>
-          </a:blip>
-          <a:srcRect t="19571"/>
-          <a:stretch/>
-        </p:blipFill>
-        <p:spPr>
-          <a:xfrm>
-            <a:off x="1484311" y="1910075"/>
-            <a:ext cx="6072843" cy="3460124"/>
-          </a:xfrm>
-        </p:spPr>
-      </p:pic>
-      <p:pic>
-        <p:nvPicPr>
-          <p:cNvPr id="9" name="Content Placeholder 8"/>
-          <p:cNvPicPr>
-            <a:picLocks noGrp="1" noChangeAspect="1"/>
-          </p:cNvPicPr>
-          <p:nvPr>
-            <p:ph sz="half" idx="2"/>
-          </p:nvPr>
-        </p:nvPicPr>
-        <p:blipFill rotWithShape="1">
-          <a:blip r:embed="rId3">
-            <a:extLst>
-              <a:ext uri="{28A0092B-C50C-407E-A947-70E740481C1C}">
-                <a14:useLocalDpi xmlns:a14="http://schemas.microsoft.com/office/drawing/2010/main" val="0"/>
-              </a:ext>
-            </a:extLst>
-          </a:blip>
-          <a:srcRect r="12302"/>
-          <a:stretch/>
-        </p:blipFill>
-        <p:spPr>
-          <a:xfrm>
-            <a:off x="8154545" y="1489074"/>
-            <a:ext cx="2843364" cy="4302125"/>
-          </a:xfrm>
-        </p:spPr>
-      </p:pic>
-      <p:sp>
-        <p:nvSpPr>
-          <p:cNvPr id="4" name="Slide Number Placeholder 3"/>
-          <p:cNvSpPr>
-            <a:spLocks noGrp="1"/>
-          </p:cNvSpPr>
-          <p:nvPr>
-            <p:ph type="sldNum" sz="quarter" idx="12"/>
-          </p:nvPr>
-        </p:nvSpPr>
-        <p:spPr/>
-        <p:txBody>
-          <a:bodyPr/>
-          <a:lstStyle/>
-          <a:p>
-            <a:fld id="{5C6BB475-B640-4DD3-A1AA-1CF10A44AA06}" type="slidenum">
-              <a:rPr lang="en-US" smtClean="0"/>
-              <a:t>8</a:t>
-            </a:fld>
-            <a:endParaRPr lang="en-US"/>
-          </a:p>
-        </p:txBody>
-      </p:sp>
-      <p:sp>
-        <p:nvSpPr>
-          <p:cNvPr id="6" name="TextBox 5"/>
-          <p:cNvSpPr txBox="1"/>
-          <p:nvPr/>
-        </p:nvSpPr>
-        <p:spPr>
-          <a:xfrm>
-            <a:off x="2823793" y="5513942"/>
-            <a:ext cx="3393878" cy="369332"/>
-          </a:xfrm>
-          <a:prstGeom prst="rect">
-            <a:avLst/>
-          </a:prstGeom>
-          <a:noFill/>
-        </p:spPr>
-        <p:txBody>
-          <a:bodyPr wrap="none" rtlCol="0">
-            <a:spAutoFit/>
-          </a:bodyPr>
-          <a:lstStyle/>
-          <a:p>
-            <a:r>
-              <a:rPr lang="en-US" dirty="0" smtClean="0"/>
-              <a:t>Figure 4. </a:t>
-            </a:r>
-            <a:r>
-              <a:rPr lang="en-US" dirty="0"/>
-              <a:t>Proposed chassis design </a:t>
-            </a:r>
-          </a:p>
-        </p:txBody>
-      </p:sp>
-      <p:sp>
-        <p:nvSpPr>
-          <p:cNvPr id="7" name="TextBox 6"/>
-          <p:cNvSpPr txBox="1"/>
-          <p:nvPr/>
-        </p:nvSpPr>
-        <p:spPr>
-          <a:xfrm>
-            <a:off x="8337747" y="5883273"/>
-            <a:ext cx="2476960" cy="646331"/>
-          </a:xfrm>
-          <a:prstGeom prst="rect">
-            <a:avLst/>
-          </a:prstGeom>
-          <a:noFill/>
-        </p:spPr>
-        <p:txBody>
-          <a:bodyPr wrap="none" rtlCol="0">
-            <a:spAutoFit/>
-          </a:bodyPr>
-          <a:lstStyle/>
-          <a:p>
-            <a:r>
-              <a:rPr lang="en-US" dirty="0" smtClean="0"/>
-              <a:t>Figure 5. </a:t>
-            </a:r>
-            <a:r>
-              <a:rPr lang="en-US" dirty="0"/>
-              <a:t>Isometric view </a:t>
-            </a:r>
-            <a:endParaRPr lang="en-US" dirty="0" smtClean="0"/>
-          </a:p>
-          <a:p>
-            <a:r>
-              <a:rPr lang="en-US" dirty="0" smtClean="0"/>
-              <a:t>of </a:t>
-            </a:r>
-            <a:r>
-              <a:rPr lang="en-US" dirty="0"/>
-              <a:t>proposed chassis </a:t>
-            </a:r>
-          </a:p>
-        </p:txBody>
-      </p:sp>
-    </p:spTree>
-    <p:extLst>
-      <p:ext uri="{BB962C8B-B14F-4D97-AF65-F5344CB8AC3E}">
-        <p14:creationId xmlns:p14="http://schemas.microsoft.com/office/powerpoint/2010/main" val="341879816"/>
       </p:ext>
     </p:extLst>
   </p:cSld>
@@ -12531,12 +10062,16 @@
             <a:graphicFrameLocks/>
           </p:cNvGraphicFramePr>
           <p:nvPr>
-            <p:extLst/>
+            <p:extLst>
+              <p:ext uri="{D42A27DB-BD31-4B8C-83A1-F6EECF244321}">
+                <p14:modId xmlns:p14="http://schemas.microsoft.com/office/powerpoint/2010/main" val="2704818691"/>
+              </p:ext>
+            </p:extLst>
           </p:nvPr>
         </p:nvGraphicFramePr>
         <p:xfrm>
           <a:off x="1970468" y="2288539"/>
-          <a:ext cx="8991746" cy="3840480"/>
+          <a:ext cx="8991746" cy="3200400"/>
         </p:xfrm>
         <a:graphic>
           <a:graphicData uri="http://schemas.openxmlformats.org/drawingml/2006/table">
@@ -12588,41 +10123,6 @@
                     <a:p>
                       <a:r>
                         <a:rPr lang="en-US" dirty="0" smtClean="0"/>
-                        <a:t>Build Volume Size</a:t>
-                      </a:r>
-                      <a:endParaRPr lang="en-US" dirty="0"/>
-                    </a:p>
-                  </a:txBody>
-                  <a:tcPr anchor="ctr"/>
-                </a:tc>
-                <a:tc>
-                  <a:txBody>
-                    <a:bodyPr/>
-                    <a:lstStyle/>
-                    <a:p>
-                      <a:pPr algn="r"/>
-                      <a:r>
-                        <a:rPr lang="en-US" dirty="0" smtClean="0"/>
-                        <a:t>192</a:t>
-                      </a:r>
-                      <a:r>
-                        <a:rPr lang="en-US" baseline="0" dirty="0" smtClean="0"/>
-                        <a:t> mm x 216 mm x 216 mm</a:t>
-                      </a:r>
-                      <a:endParaRPr lang="en-US" dirty="0"/>
-                    </a:p>
-                  </a:txBody>
-                  <a:tcPr anchor="ctr"/>
-                </a:tc>
-              </a:tr>
-              <a:tr h="640080">
-                <a:tc>
-                  <a:txBody>
-                    <a:bodyPr/>
-                    <a:lstStyle/>
-                    <a:p>
-                      <a:r>
-                        <a:rPr lang="en-US" dirty="0" smtClean="0"/>
                         <a:t>X</a:t>
                       </a:r>
                       <a:r>
@@ -12658,11 +10158,7 @@
                     <a:p>
                       <a:r>
                         <a:rPr lang="en-US" dirty="0" smtClean="0"/>
-                        <a:t>Minimum</a:t>
-                      </a:r>
-                      <a:r>
-                        <a:rPr lang="en-US" baseline="0" dirty="0" smtClean="0"/>
-                        <a:t> Layer Height</a:t>
+                        <a:t>Z Axis Resolution</a:t>
                       </a:r>
                       <a:endParaRPr lang="en-US" dirty="0"/>
                     </a:p>
@@ -12692,12 +10188,8 @@
                         <a:defRPr/>
                       </a:pPr>
                       <a:r>
-                        <a:rPr lang="en-US" smtClean="0"/>
-                        <a:t>0.015 ± 0.002 </a:t>
-                      </a:r>
-                      <a:r>
                         <a:rPr lang="en-US" dirty="0" smtClean="0"/>
-                        <a:t>mm</a:t>
+                        <a:t>0.100 ± 0.005 mm</a:t>
                       </a:r>
                     </a:p>
                   </a:txBody>
@@ -12800,7 +10292,7 @@
     </p:spTree>
     <p:extLst>
       <p:ext uri="{BB962C8B-B14F-4D97-AF65-F5344CB8AC3E}">
-        <p14:creationId xmlns:p14="http://schemas.microsoft.com/office/powerpoint/2010/main" val="2866729988"/>
+        <p14:creationId xmlns:p14="http://schemas.microsoft.com/office/powerpoint/2010/main" val="245815682"/>
       </p:ext>
     </p:extLst>
   </p:cSld>

</xml_diff>